<commit_message>
implementado processo de incompleto e não conformes em SAMPS
</commit_message>
<xml_diff>
--- a/docs/PROCESSO DETALHADO FABIO.pptx
+++ b/docs/PROCESSO DETALHADO FABIO.pptx
@@ -108,6 +108,11 @@
       </a:defRPr>
     </a:lvl9pPr>
   </p:defaultTextStyle>
+  <p:extLst>
+    <p:ext uri="{EFAFB233-063F-42B5-8137-9DF3F51BA10A}">
+      <p15:sldGuideLst xmlns:p15="http://schemas.microsoft.com/office/powerpoint/2012/main"/>
+    </p:ext>
+  </p:extLst>
 </p:presentation>
 </file>
 
@@ -260,7 +265,7 @@
           <a:p>
             <a:fld id="{31610600-DFD7-DD4B-8A38-5782773CE7CB}" type="datetimeFigureOut">
               <a:rPr lang="en-BR" smtClean="0"/>
-              <a:t>19/09/24</a:t>
+              <a:t>20/09/24</a:t>
             </a:fld>
             <a:endParaRPr lang="en-BR"/>
           </a:p>
@@ -460,7 +465,7 @@
           <a:p>
             <a:fld id="{31610600-DFD7-DD4B-8A38-5782773CE7CB}" type="datetimeFigureOut">
               <a:rPr lang="en-BR" smtClean="0"/>
-              <a:t>19/09/24</a:t>
+              <a:t>20/09/24</a:t>
             </a:fld>
             <a:endParaRPr lang="en-BR"/>
           </a:p>
@@ -670,7 +675,7 @@
           <a:p>
             <a:fld id="{31610600-DFD7-DD4B-8A38-5782773CE7CB}" type="datetimeFigureOut">
               <a:rPr lang="en-BR" smtClean="0"/>
-              <a:t>19/09/24</a:t>
+              <a:t>20/09/24</a:t>
             </a:fld>
             <a:endParaRPr lang="en-BR"/>
           </a:p>
@@ -870,7 +875,7 @@
           <a:p>
             <a:fld id="{31610600-DFD7-DD4B-8A38-5782773CE7CB}" type="datetimeFigureOut">
               <a:rPr lang="en-BR" smtClean="0"/>
-              <a:t>19/09/24</a:t>
+              <a:t>20/09/24</a:t>
             </a:fld>
             <a:endParaRPr lang="en-BR"/>
           </a:p>
@@ -1146,7 +1151,7 @@
           <a:p>
             <a:fld id="{31610600-DFD7-DD4B-8A38-5782773CE7CB}" type="datetimeFigureOut">
               <a:rPr lang="en-BR" smtClean="0"/>
-              <a:t>19/09/24</a:t>
+              <a:t>20/09/24</a:t>
             </a:fld>
             <a:endParaRPr lang="en-BR"/>
           </a:p>
@@ -1414,7 +1419,7 @@
           <a:p>
             <a:fld id="{31610600-DFD7-DD4B-8A38-5782773CE7CB}" type="datetimeFigureOut">
               <a:rPr lang="en-BR" smtClean="0"/>
-              <a:t>19/09/24</a:t>
+              <a:t>20/09/24</a:t>
             </a:fld>
             <a:endParaRPr lang="en-BR"/>
           </a:p>
@@ -1829,7 +1834,7 @@
           <a:p>
             <a:fld id="{31610600-DFD7-DD4B-8A38-5782773CE7CB}" type="datetimeFigureOut">
               <a:rPr lang="en-BR" smtClean="0"/>
-              <a:t>19/09/24</a:t>
+              <a:t>20/09/24</a:t>
             </a:fld>
             <a:endParaRPr lang="en-BR"/>
           </a:p>
@@ -1971,7 +1976,7 @@
           <a:p>
             <a:fld id="{31610600-DFD7-DD4B-8A38-5782773CE7CB}" type="datetimeFigureOut">
               <a:rPr lang="en-BR" smtClean="0"/>
-              <a:t>19/09/24</a:t>
+              <a:t>20/09/24</a:t>
             </a:fld>
             <a:endParaRPr lang="en-BR"/>
           </a:p>
@@ -2084,7 +2089,7 @@
           <a:p>
             <a:fld id="{31610600-DFD7-DD4B-8A38-5782773CE7CB}" type="datetimeFigureOut">
               <a:rPr lang="en-BR" smtClean="0"/>
-              <a:t>19/09/24</a:t>
+              <a:t>20/09/24</a:t>
             </a:fld>
             <a:endParaRPr lang="en-BR"/>
           </a:p>
@@ -2397,7 +2402,7 @@
           <a:p>
             <a:fld id="{31610600-DFD7-DD4B-8A38-5782773CE7CB}" type="datetimeFigureOut">
               <a:rPr lang="en-BR" smtClean="0"/>
-              <a:t>19/09/24</a:t>
+              <a:t>20/09/24</a:t>
             </a:fld>
             <a:endParaRPr lang="en-BR"/>
           </a:p>
@@ -2686,7 +2691,7 @@
           <a:p>
             <a:fld id="{31610600-DFD7-DD4B-8A38-5782773CE7CB}" type="datetimeFigureOut">
               <a:rPr lang="en-BR" smtClean="0"/>
-              <a:t>19/09/24</a:t>
+              <a:t>20/09/24</a:t>
             </a:fld>
             <a:endParaRPr lang="en-BR"/>
           </a:p>
@@ -2929,7 +2934,7 @@
           <a:p>
             <a:fld id="{31610600-DFD7-DD4B-8A38-5782773CE7CB}" type="datetimeFigureOut">
               <a:rPr lang="en-BR" smtClean="0"/>
-              <a:t>19/09/24</a:t>
+              <a:t>20/09/24</a:t>
             </a:fld>
             <a:endParaRPr lang="en-BR"/>
           </a:p>
@@ -3719,7 +3724,7 @@
         <p:spPr>
           <a:xfrm>
             <a:off x="8507136" y="1847446"/>
-            <a:ext cx="2743200" cy="3025768"/>
+            <a:ext cx="2743200" cy="2656437"/>
           </a:xfrm>
           <a:prstGeom prst="frame">
             <a:avLst>
@@ -3805,7 +3810,7 @@
         </p:nvSpPr>
         <p:spPr>
           <a:xfrm>
-            <a:off x="8557058" y="2643267"/>
+            <a:off x="8516752" y="4515136"/>
             <a:ext cx="2723967" cy="269322"/>
           </a:xfrm>
           <a:prstGeom prst="frame">
@@ -3857,7 +3862,7 @@
         </p:nvSpPr>
         <p:spPr>
           <a:xfrm>
-            <a:off x="8576705" y="2593262"/>
+            <a:off x="8541754" y="4415126"/>
             <a:ext cx="2241191" cy="369332"/>
           </a:xfrm>
           <a:prstGeom prst="rect">
@@ -4678,45 +4683,6 @@
       </p:sp>
       <p:sp>
         <p:nvSpPr>
-          <p:cNvPr id="13" name="TextBox 12">
-            <a:extLst>
-              <a:ext uri="{FF2B5EF4-FFF2-40B4-BE49-F238E27FC236}">
-                <a16:creationId xmlns:a16="http://schemas.microsoft.com/office/drawing/2014/main" id="{E7F07D35-5DA4-9E49-A9E8-AE387744341E}"/>
-              </a:ext>
-            </a:extLst>
-          </p:cNvPr>
-          <p:cNvSpPr txBox="1"/>
-          <p:nvPr/>
-        </p:nvSpPr>
-        <p:spPr>
-          <a:xfrm>
-            <a:off x="7515054" y="3793810"/>
-            <a:ext cx="1401163" cy="646331"/>
-          </a:xfrm>
-          <a:prstGeom prst="rect">
-            <a:avLst/>
-          </a:prstGeom>
-          <a:noFill/>
-        </p:spPr>
-        <p:txBody>
-          <a:bodyPr wrap="square" rtlCol="0">
-            <a:spAutoFit/>
-          </a:bodyPr>
-          <a:lstStyle/>
-          <a:p>
-            <a:r>
-              <a:rPr lang="en-US" dirty="0"/>
-              <a:t>I</a:t>
-            </a:r>
-            <a:r>
-              <a:rPr lang="en-BR" dirty="0"/>
-              <a:t>ncompletos??</a:t>
-            </a:r>
-          </a:p>
-        </p:txBody>
-      </p:sp>
-      <p:sp>
-        <p:nvSpPr>
           <p:cNvPr id="14" name="Frame 13">
             <a:extLst>
               <a:ext uri="{FF2B5EF4-FFF2-40B4-BE49-F238E27FC236}">
@@ -4816,8 +4782,8 @@
         </p:nvSpPr>
         <p:spPr>
           <a:xfrm>
-            <a:off x="7394640" y="1928470"/>
-            <a:ext cx="3767753" cy="1708582"/>
+            <a:off x="7394640" y="1928469"/>
+            <a:ext cx="3767753" cy="2678091"/>
           </a:xfrm>
           <a:prstGeom prst="frame">
             <a:avLst>
@@ -4868,8 +4834,8 @@
         </p:nvSpPr>
         <p:spPr>
           <a:xfrm>
-            <a:off x="7468190" y="1255557"/>
-            <a:ext cx="2074022" cy="646331"/>
+            <a:off x="7468189" y="1255557"/>
+            <a:ext cx="3216748" cy="646331"/>
           </a:xfrm>
           <a:prstGeom prst="rect">
             <a:avLst/>
@@ -4884,23 +4850,23 @@
           <a:p>
             <a:r>
               <a:rPr lang="en-BR" dirty="0"/>
-              <a:t>Não Conformes</a:t>
+              <a:t>Não Conformes / incompletos</a:t>
             </a:r>
           </a:p>
           <a:p>
             <a:r>
               <a:rPr lang="en-BR" dirty="0"/>
-              <a:t>2x6</a:t>
-            </a:r>
-          </a:p>
-        </p:txBody>
-      </p:sp>
-      <p:sp>
-        <p:nvSpPr>
-          <p:cNvPr id="19" name="Frame 18">
-            <a:extLst>
-              <a:ext uri="{FF2B5EF4-FFF2-40B4-BE49-F238E27FC236}">
-                <a16:creationId xmlns:a16="http://schemas.microsoft.com/office/drawing/2014/main" id="{DA231526-5005-A54C-9EC5-C725AB6A45A5}"/>
+              <a:t>1x6</a:t>
+            </a:r>
+          </a:p>
+        </p:txBody>
+      </p:sp>
+      <p:sp>
+        <p:nvSpPr>
+          <p:cNvPr id="20" name="Rectangle 19">
+            <a:extLst>
+              <a:ext uri="{FF2B5EF4-FFF2-40B4-BE49-F238E27FC236}">
+                <a16:creationId xmlns:a16="http://schemas.microsoft.com/office/drawing/2014/main" id="{D75473D0-E5F5-404B-82C1-5792D5BE1AC0}"/>
               </a:ext>
             </a:extLst>
           </p:cNvPr>
@@ -4909,60 +4875,8 @@
         </p:nvSpPr>
         <p:spPr>
           <a:xfrm>
-            <a:off x="7394640" y="3587044"/>
-            <a:ext cx="3767753" cy="983942"/>
-          </a:xfrm>
-          <a:prstGeom prst="frame">
-            <a:avLst>
-              <a:gd name="adj1" fmla="val 5875"/>
-            </a:avLst>
-          </a:prstGeom>
-        </p:spPr>
-        <p:style>
-          <a:lnRef idx="2">
-            <a:schemeClr val="accent1">
-              <a:shade val="50000"/>
-            </a:schemeClr>
-          </a:lnRef>
-          <a:fillRef idx="1">
-            <a:schemeClr val="accent1"/>
-          </a:fillRef>
-          <a:effectRef idx="0">
-            <a:schemeClr val="accent1"/>
-          </a:effectRef>
-          <a:fontRef idx="minor">
-            <a:schemeClr val="lt1"/>
-          </a:fontRef>
-        </p:style>
-        <p:txBody>
-          <a:bodyPr rtlCol="0" anchor="ctr"/>
-          <a:lstStyle/>
-          <a:p>
-            <a:pPr algn="ctr"/>
-            <a:endParaRPr lang="en-BR">
-              <a:solidFill>
-                <a:schemeClr val="tx1"/>
-              </a:solidFill>
-            </a:endParaRPr>
-          </a:p>
-        </p:txBody>
-      </p:sp>
-      <p:sp>
-        <p:nvSpPr>
-          <p:cNvPr id="20" name="Rectangle 19">
-            <a:extLst>
-              <a:ext uri="{FF2B5EF4-FFF2-40B4-BE49-F238E27FC236}">
-                <a16:creationId xmlns:a16="http://schemas.microsoft.com/office/drawing/2014/main" id="{D75473D0-E5F5-404B-82C1-5792D5BE1AC0}"/>
-              </a:ext>
-            </a:extLst>
-          </p:cNvPr>
-          <p:cNvSpPr/>
-          <p:nvPr/>
-        </p:nvSpPr>
-        <p:spPr>
-          <a:xfrm>
-            <a:off x="8440339" y="4650653"/>
-            <a:ext cx="3343095" cy="1200329"/>
+            <a:off x="7865015" y="4583835"/>
+            <a:ext cx="4188711" cy="646331"/>
           </a:xfrm>
           <a:prstGeom prst="rect">
             <a:avLst/>
@@ -4998,42 +4912,31 @@
               </a:rPr>
               <a:t> misturados.</a:t>
             </a:r>
-            <a:br>
+          </a:p>
+          <a:p>
+            <a:r>
               <a:rPr lang="pt-BR" dirty="0">
                 <a:highlight>
                   <a:srgbClr val="FFFF00"/>
                 </a:highlight>
               </a:rPr>
-            </a:br>
-            <a:endParaRPr lang="pt-BR" dirty="0">
-              <a:highlight>
-                <a:srgbClr val="FFFF00"/>
-              </a:highlight>
-            </a:endParaRPr>
-          </a:p>
-          <a:p>
+              <a:t>Incompletos: pode colocar </a:t>
+            </a:r>
+            <a:r>
+              <a:rPr lang="pt-BR" dirty="0" err="1">
+                <a:highlight>
+                  <a:srgbClr val="FFFF00"/>
+                </a:highlight>
+              </a:rPr>
+              <a:t>skus</a:t>
+            </a:r>
             <a:r>
               <a:rPr lang="pt-BR" dirty="0">
                 <a:highlight>
                   <a:srgbClr val="FFFF00"/>
                 </a:highlight>
               </a:rPr>
-              <a:t>Incompletos: Aguardando cliente </a:t>
-            </a:r>
-            <a:br>
-              <a:rPr lang="pt-BR" dirty="0">
-                <a:highlight>
-                  <a:srgbClr val="FFFF00"/>
-                </a:highlight>
-              </a:rPr>
-            </a:br>
-            <a:r>
-              <a:rPr lang="pt-BR" dirty="0">
-                <a:highlight>
-                  <a:srgbClr val="FFFF00"/>
-                </a:highlight>
-              </a:rPr>
-              <a:t>sobre segregação ou misturado.</a:t>
+              <a:t> misturado.</a:t>
             </a:r>
             <a:endParaRPr lang="en-BR" dirty="0"/>
           </a:p>

</xml_diff>

<commit_message>
implementado - mas falta testar: - REENROLADOR - SPIDER - BARRICA - CAPA CAPA
</commit_message>
<xml_diff>
--- a/docs/PROCESSO DETALHADO FABIO.pptx
+++ b/docs/PROCESSO DETALHADO FABIO.pptx
@@ -10,6 +10,21 @@
     <p:sldId id="259" r:id="rId4"/>
     <p:sldId id="260" r:id="rId5"/>
     <p:sldId id="261" r:id="rId6"/>
+    <p:sldId id="262" r:id="rId7"/>
+    <p:sldId id="267" r:id="rId8"/>
+    <p:sldId id="263" r:id="rId9"/>
+    <p:sldId id="268" r:id="rId10"/>
+    <p:sldId id="264" r:id="rId11"/>
+    <p:sldId id="269" r:id="rId12"/>
+    <p:sldId id="265" r:id="rId13"/>
+    <p:sldId id="266" r:id="rId14"/>
+    <p:sldId id="270" r:id="rId15"/>
+    <p:sldId id="271" r:id="rId16"/>
+    <p:sldId id="272" r:id="rId17"/>
+    <p:sldId id="273" r:id="rId18"/>
+    <p:sldId id="274" r:id="rId19"/>
+    <p:sldId id="275" r:id="rId20"/>
+    <p:sldId id="276" r:id="rId21"/>
   </p:sldIdLst>
   <p:sldSz cx="12192000" cy="6858000"/>
   <p:notesSz cx="6858000" cy="9144000"/>
@@ -265,7 +280,7 @@
           <a:p>
             <a:fld id="{31610600-DFD7-DD4B-8A38-5782773CE7CB}" type="datetimeFigureOut">
               <a:rPr lang="en-BR" smtClean="0"/>
-              <a:t>20/09/24</a:t>
+              <a:t>30/09/24</a:t>
             </a:fld>
             <a:endParaRPr lang="en-BR"/>
           </a:p>
@@ -465,7 +480,7 @@
           <a:p>
             <a:fld id="{31610600-DFD7-DD4B-8A38-5782773CE7CB}" type="datetimeFigureOut">
               <a:rPr lang="en-BR" smtClean="0"/>
-              <a:t>20/09/24</a:t>
+              <a:t>30/09/24</a:t>
             </a:fld>
             <a:endParaRPr lang="en-BR"/>
           </a:p>
@@ -675,7 +690,7 @@
           <a:p>
             <a:fld id="{31610600-DFD7-DD4B-8A38-5782773CE7CB}" type="datetimeFigureOut">
               <a:rPr lang="en-BR" smtClean="0"/>
-              <a:t>20/09/24</a:t>
+              <a:t>30/09/24</a:t>
             </a:fld>
             <a:endParaRPr lang="en-BR"/>
           </a:p>
@@ -875,7 +890,7 @@
           <a:p>
             <a:fld id="{31610600-DFD7-DD4B-8A38-5782773CE7CB}" type="datetimeFigureOut">
               <a:rPr lang="en-BR" smtClean="0"/>
-              <a:t>20/09/24</a:t>
+              <a:t>30/09/24</a:t>
             </a:fld>
             <a:endParaRPr lang="en-BR"/>
           </a:p>
@@ -1151,7 +1166,7 @@
           <a:p>
             <a:fld id="{31610600-DFD7-DD4B-8A38-5782773CE7CB}" type="datetimeFigureOut">
               <a:rPr lang="en-BR" smtClean="0"/>
-              <a:t>20/09/24</a:t>
+              <a:t>30/09/24</a:t>
             </a:fld>
             <a:endParaRPr lang="en-BR"/>
           </a:p>
@@ -1419,7 +1434,7 @@
           <a:p>
             <a:fld id="{31610600-DFD7-DD4B-8A38-5782773CE7CB}" type="datetimeFigureOut">
               <a:rPr lang="en-BR" smtClean="0"/>
-              <a:t>20/09/24</a:t>
+              <a:t>30/09/24</a:t>
             </a:fld>
             <a:endParaRPr lang="en-BR"/>
           </a:p>
@@ -1834,7 +1849,7 @@
           <a:p>
             <a:fld id="{31610600-DFD7-DD4B-8A38-5782773CE7CB}" type="datetimeFigureOut">
               <a:rPr lang="en-BR" smtClean="0"/>
-              <a:t>20/09/24</a:t>
+              <a:t>30/09/24</a:t>
             </a:fld>
             <a:endParaRPr lang="en-BR"/>
           </a:p>
@@ -1976,7 +1991,7 @@
           <a:p>
             <a:fld id="{31610600-DFD7-DD4B-8A38-5782773CE7CB}" type="datetimeFigureOut">
               <a:rPr lang="en-BR" smtClean="0"/>
-              <a:t>20/09/24</a:t>
+              <a:t>30/09/24</a:t>
             </a:fld>
             <a:endParaRPr lang="en-BR"/>
           </a:p>
@@ -2089,7 +2104,7 @@
           <a:p>
             <a:fld id="{31610600-DFD7-DD4B-8A38-5782773CE7CB}" type="datetimeFigureOut">
               <a:rPr lang="en-BR" smtClean="0"/>
-              <a:t>20/09/24</a:t>
+              <a:t>30/09/24</a:t>
             </a:fld>
             <a:endParaRPr lang="en-BR"/>
           </a:p>
@@ -2402,7 +2417,7 @@
           <a:p>
             <a:fld id="{31610600-DFD7-DD4B-8A38-5782773CE7CB}" type="datetimeFigureOut">
               <a:rPr lang="en-BR" smtClean="0"/>
-              <a:t>20/09/24</a:t>
+              <a:t>30/09/24</a:t>
             </a:fld>
             <a:endParaRPr lang="en-BR"/>
           </a:p>
@@ -2691,7 +2706,7 @@
           <a:p>
             <a:fld id="{31610600-DFD7-DD4B-8A38-5782773CE7CB}" type="datetimeFigureOut">
               <a:rPr lang="en-BR" smtClean="0"/>
-              <a:t>20/09/24</a:t>
+              <a:t>30/09/24</a:t>
             </a:fld>
             <a:endParaRPr lang="en-BR"/>
           </a:p>
@@ -2934,7 +2949,7 @@
           <a:p>
             <a:fld id="{31610600-DFD7-DD4B-8A38-5782773CE7CB}" type="datetimeFigureOut">
               <a:rPr lang="en-BR" smtClean="0"/>
-              <a:t>20/09/24</a:t>
+              <a:t>30/09/24</a:t>
             </a:fld>
             <a:endParaRPr lang="en-BR"/>
           </a:p>
@@ -3947,6 +3962,1652 @@
 </p:sld>
 </file>
 
+<file path=ppt/slides/slide10.xml><?xml version="1.0" encoding="utf-8"?>
+<p:sld xmlns:a="http://schemas.openxmlformats.org/drawingml/2006/main" xmlns:r="http://schemas.openxmlformats.org/officeDocument/2006/relationships" xmlns:p="http://schemas.openxmlformats.org/presentationml/2006/main">
+  <p:cSld>
+    <p:spTree>
+      <p:nvGrpSpPr>
+        <p:cNvPr id="1" name=""/>
+        <p:cNvGrpSpPr/>
+        <p:nvPr/>
+      </p:nvGrpSpPr>
+      <p:grpSpPr>
+        <a:xfrm>
+          <a:off x="0" y="0"/>
+          <a:ext cx="0" cy="0"/>
+          <a:chOff x="0" y="0"/>
+          <a:chExt cx="0" cy="0"/>
+        </a:xfrm>
+      </p:grpSpPr>
+      <p:sp>
+        <p:nvSpPr>
+          <p:cNvPr id="2" name="TextBox 1">
+            <a:extLst>
+              <a:ext uri="{FF2B5EF4-FFF2-40B4-BE49-F238E27FC236}">
+                <a16:creationId xmlns:a16="http://schemas.microsoft.com/office/drawing/2014/main" id="{02D75FF5-A64B-C54E-A8E3-7832CC325AD2}"/>
+              </a:ext>
+            </a:extLst>
+          </p:cNvPr>
+          <p:cNvSpPr txBox="1"/>
+          <p:nvPr/>
+        </p:nvSpPr>
+        <p:spPr>
+          <a:xfrm>
+            <a:off x="539930" y="544076"/>
+            <a:ext cx="4223657" cy="954107"/>
+          </a:xfrm>
+          <a:prstGeom prst="rect">
+            <a:avLst/>
+          </a:prstGeom>
+          <a:noFill/>
+        </p:spPr>
+        <p:txBody>
+          <a:bodyPr wrap="square" rtlCol="0">
+            <a:spAutoFit/>
+          </a:bodyPr>
+          <a:lstStyle/>
+          <a:p>
+            <a:r>
+              <a:rPr lang="en-BR" sz="1400" b="1" dirty="0"/>
+              <a:t>CALL 1 – RETIRA PALETE  CHEIO</a:t>
+            </a:r>
+          </a:p>
+          <a:p>
+            <a:endParaRPr lang="en-BR" sz="1400" b="1" dirty="0"/>
+          </a:p>
+          <a:p>
+            <a:r>
+              <a:rPr lang="en-BR" sz="1400" b="1" dirty="0"/>
+              <a:t>1 – CARGA PALLETE MAQUINA</a:t>
+            </a:r>
+          </a:p>
+          <a:p>
+            <a:r>
+              <a:rPr lang="en-BR" sz="1400" b="1" dirty="0"/>
+              <a:t>2 – DESCARGA PALLETE BUFFER </a:t>
+            </a:r>
+          </a:p>
+        </p:txBody>
+      </p:sp>
+      <p:sp>
+        <p:nvSpPr>
+          <p:cNvPr id="3" name="TextBox 2">
+            <a:extLst>
+              <a:ext uri="{FF2B5EF4-FFF2-40B4-BE49-F238E27FC236}">
+                <a16:creationId xmlns:a16="http://schemas.microsoft.com/office/drawing/2014/main" id="{EEBA9034-E063-5345-A24C-0DAF8829E341}"/>
+              </a:ext>
+            </a:extLst>
+          </p:cNvPr>
+          <p:cNvSpPr txBox="1"/>
+          <p:nvPr/>
+        </p:nvSpPr>
+        <p:spPr>
+          <a:xfrm>
+            <a:off x="539929" y="1873766"/>
+            <a:ext cx="4223657" cy="954107"/>
+          </a:xfrm>
+          <a:prstGeom prst="rect">
+            <a:avLst/>
+          </a:prstGeom>
+          <a:noFill/>
+        </p:spPr>
+        <p:txBody>
+          <a:bodyPr wrap="square" rtlCol="0">
+            <a:spAutoFit/>
+          </a:bodyPr>
+          <a:lstStyle/>
+          <a:p>
+            <a:r>
+              <a:rPr lang="en-BR" sz="1400" b="1" dirty="0"/>
+              <a:t>CALL 2 – RETIRA PALETE  INCOMPLETO</a:t>
+            </a:r>
+          </a:p>
+          <a:p>
+            <a:endParaRPr lang="en-BR" sz="1400" b="1" dirty="0"/>
+          </a:p>
+          <a:p>
+            <a:r>
+              <a:rPr lang="en-BR" sz="1400" b="1" dirty="0"/>
+              <a:t>1 – CARGA PALLETE MAQUINA</a:t>
+            </a:r>
+          </a:p>
+          <a:p>
+            <a:r>
+              <a:rPr lang="en-BR" sz="1400" b="1" dirty="0"/>
+              <a:t>2 – DESCARGA PALLETE BUFFER INCOMPLETOS</a:t>
+            </a:r>
+          </a:p>
+        </p:txBody>
+      </p:sp>
+      <p:sp>
+        <p:nvSpPr>
+          <p:cNvPr id="4" name="TextBox 3">
+            <a:extLst>
+              <a:ext uri="{FF2B5EF4-FFF2-40B4-BE49-F238E27FC236}">
+                <a16:creationId xmlns:a16="http://schemas.microsoft.com/office/drawing/2014/main" id="{771D51CC-3EA5-8B40-A473-94795BA7AE12}"/>
+              </a:ext>
+            </a:extLst>
+          </p:cNvPr>
+          <p:cNvSpPr txBox="1"/>
+          <p:nvPr/>
+        </p:nvSpPr>
+        <p:spPr>
+          <a:xfrm>
+            <a:off x="539928" y="3203456"/>
+            <a:ext cx="4223657" cy="738664"/>
+          </a:xfrm>
+          <a:prstGeom prst="rect">
+            <a:avLst/>
+          </a:prstGeom>
+          <a:noFill/>
+        </p:spPr>
+        <p:txBody>
+          <a:bodyPr wrap="square" rtlCol="0">
+            <a:spAutoFit/>
+          </a:bodyPr>
+          <a:lstStyle/>
+          <a:p>
+            <a:r>
+              <a:rPr lang="en-BR" sz="1400" b="1" dirty="0"/>
+              <a:t>CALL 3 – ABASTECE PALETE  INCOMPLETO</a:t>
+            </a:r>
+          </a:p>
+          <a:p>
+            <a:endParaRPr lang="en-BR" sz="1400" b="1" dirty="0"/>
+          </a:p>
+          <a:p>
+            <a:r>
+              <a:rPr lang="en-BR" sz="1400" b="1" dirty="0">
+                <a:highlight>
+                  <a:srgbClr val="FFFF00"/>
+                </a:highlight>
+              </a:rPr>
+              <a:t>1 – IMPOSSIVEL – SKUS MISTURADOS</a:t>
+            </a:r>
+            <a:r>
+              <a:rPr lang="en-BR" sz="1400" b="1" dirty="0"/>
+              <a:t> </a:t>
+            </a:r>
+          </a:p>
+        </p:txBody>
+      </p:sp>
+      <p:sp>
+        <p:nvSpPr>
+          <p:cNvPr id="5" name="TextBox 4">
+            <a:extLst>
+              <a:ext uri="{FF2B5EF4-FFF2-40B4-BE49-F238E27FC236}">
+                <a16:creationId xmlns:a16="http://schemas.microsoft.com/office/drawing/2014/main" id="{4BC474DE-E6BB-734F-A5A6-386F4CEBC7B6}"/>
+              </a:ext>
+            </a:extLst>
+          </p:cNvPr>
+          <p:cNvSpPr txBox="1"/>
+          <p:nvPr/>
+        </p:nvSpPr>
+        <p:spPr>
+          <a:xfrm>
+            <a:off x="6095999" y="2243098"/>
+            <a:ext cx="4223657" cy="1169551"/>
+          </a:xfrm>
+          <a:prstGeom prst="rect">
+            <a:avLst/>
+          </a:prstGeom>
+          <a:noFill/>
+        </p:spPr>
+        <p:txBody>
+          <a:bodyPr wrap="square" rtlCol="0">
+            <a:spAutoFit/>
+          </a:bodyPr>
+          <a:lstStyle/>
+          <a:p>
+            <a:r>
+              <a:rPr lang="en-BR" sz="1400" b="1" dirty="0"/>
+              <a:t>CALL 5 – RETIRA BOBINA ERRADO</a:t>
+            </a:r>
+          </a:p>
+          <a:p>
+            <a:endParaRPr lang="en-BR" sz="1400" b="1" dirty="0"/>
+          </a:p>
+          <a:p>
+            <a:r>
+              <a:rPr lang="en-BR" sz="1400" b="1" dirty="0"/>
+              <a:t>1 – CARGA carretel ERRADO na MAQUINA</a:t>
+            </a:r>
+          </a:p>
+          <a:p>
+            <a:r>
+              <a:rPr lang="en-BR" sz="1400" b="1" dirty="0"/>
+              <a:t>2 – DESCARGA no BUFFER SKU CORRIGIDO</a:t>
+            </a:r>
+          </a:p>
+          <a:p>
+            <a:r>
+              <a:rPr lang="en-BR" sz="1400" b="1" dirty="0"/>
+              <a:t> </a:t>
+            </a:r>
+          </a:p>
+        </p:txBody>
+      </p:sp>
+      <p:sp>
+        <p:nvSpPr>
+          <p:cNvPr id="6" name="TextBox 5">
+            <a:extLst>
+              <a:ext uri="{FF2B5EF4-FFF2-40B4-BE49-F238E27FC236}">
+                <a16:creationId xmlns:a16="http://schemas.microsoft.com/office/drawing/2014/main" id="{0FC353A9-91B4-AF4A-9890-FD619709F632}"/>
+              </a:ext>
+            </a:extLst>
+          </p:cNvPr>
+          <p:cNvSpPr txBox="1"/>
+          <p:nvPr/>
+        </p:nvSpPr>
+        <p:spPr>
+          <a:xfrm>
+            <a:off x="6095999" y="5062916"/>
+            <a:ext cx="4223657" cy="954107"/>
+          </a:xfrm>
+          <a:prstGeom prst="rect">
+            <a:avLst/>
+          </a:prstGeom>
+          <a:noFill/>
+        </p:spPr>
+        <p:txBody>
+          <a:bodyPr wrap="square" rtlCol="0">
+            <a:spAutoFit/>
+          </a:bodyPr>
+          <a:lstStyle/>
+          <a:p>
+            <a:r>
+              <a:rPr lang="en-BR" sz="1400" b="1" dirty="0"/>
+              <a:t>CALL 7 – RETIRA BOBINA NAO CONFORME</a:t>
+            </a:r>
+          </a:p>
+          <a:p>
+            <a:endParaRPr lang="en-BR" sz="1400" b="1" dirty="0"/>
+          </a:p>
+          <a:p>
+            <a:r>
+              <a:rPr lang="en-BR" sz="1400" b="1" dirty="0"/>
+              <a:t>1 – CARGA BOBINA NC na MAQUINA</a:t>
+            </a:r>
+          </a:p>
+          <a:p>
+            <a:r>
+              <a:rPr lang="en-BR" sz="1400" b="1" dirty="0"/>
+              <a:t>2 – DESCARGA BOBINA no BUFFER NC </a:t>
+            </a:r>
+          </a:p>
+        </p:txBody>
+      </p:sp>
+      <p:sp>
+        <p:nvSpPr>
+          <p:cNvPr id="7" name="TextBox 6">
+            <a:extLst>
+              <a:ext uri="{FF2B5EF4-FFF2-40B4-BE49-F238E27FC236}">
+                <a16:creationId xmlns:a16="http://schemas.microsoft.com/office/drawing/2014/main" id="{A2C0F638-92C3-2346-BCD6-7735CF274B86}"/>
+              </a:ext>
+            </a:extLst>
+          </p:cNvPr>
+          <p:cNvSpPr txBox="1"/>
+          <p:nvPr/>
+        </p:nvSpPr>
+        <p:spPr>
+          <a:xfrm>
+            <a:off x="6096000" y="410090"/>
+            <a:ext cx="4223657" cy="1384995"/>
+          </a:xfrm>
+          <a:prstGeom prst="rect">
+            <a:avLst/>
+          </a:prstGeom>
+          <a:noFill/>
+        </p:spPr>
+        <p:txBody>
+          <a:bodyPr wrap="square" rtlCol="0">
+            <a:spAutoFit/>
+          </a:bodyPr>
+          <a:lstStyle/>
+          <a:p>
+            <a:r>
+              <a:rPr lang="en-BR" sz="1400" b="1" dirty="0"/>
+              <a:t>CALL 4 – ABASTECE BOBINA</a:t>
+            </a:r>
+          </a:p>
+          <a:p>
+            <a:endParaRPr lang="en-BR" sz="1400" b="1" dirty="0"/>
+          </a:p>
+          <a:p>
+            <a:r>
+              <a:rPr lang="en-BR" sz="1400" b="1" dirty="0"/>
+              <a:t>1 – CARGA Bobina CHEIO no Buffer</a:t>
+            </a:r>
+          </a:p>
+          <a:p>
+            <a:r>
+              <a:rPr lang="en-BR" sz="1400" b="1" dirty="0"/>
+              <a:t>2 – Descarga na MAQUINA</a:t>
+            </a:r>
+          </a:p>
+          <a:p>
+            <a:r>
+              <a:rPr lang="en-BR" sz="1400" b="1" dirty="0"/>
+              <a:t>3 – CARGA carretel VAZIO na MAQUINA</a:t>
+            </a:r>
+          </a:p>
+          <a:p>
+            <a:r>
+              <a:rPr lang="en-BR" sz="1400" b="1" dirty="0"/>
+              <a:t>4 – DESCARGA no BUFFER VAZIOS </a:t>
+            </a:r>
+          </a:p>
+        </p:txBody>
+      </p:sp>
+      <p:sp>
+        <p:nvSpPr>
+          <p:cNvPr id="9" name="TextBox 8">
+            <a:extLst>
+              <a:ext uri="{FF2B5EF4-FFF2-40B4-BE49-F238E27FC236}">
+                <a16:creationId xmlns:a16="http://schemas.microsoft.com/office/drawing/2014/main" id="{FADFBECC-186A-AC4E-9B7F-C1DD19579640}"/>
+              </a:ext>
+            </a:extLst>
+          </p:cNvPr>
+          <p:cNvSpPr txBox="1"/>
+          <p:nvPr/>
+        </p:nvSpPr>
+        <p:spPr>
+          <a:xfrm>
+            <a:off x="6095999" y="3572788"/>
+            <a:ext cx="4223657" cy="1169551"/>
+          </a:xfrm>
+          <a:prstGeom prst="rect">
+            <a:avLst/>
+          </a:prstGeom>
+          <a:noFill/>
+        </p:spPr>
+        <p:txBody>
+          <a:bodyPr wrap="square" rtlCol="0">
+            <a:spAutoFit/>
+          </a:bodyPr>
+          <a:lstStyle/>
+          <a:p>
+            <a:r>
+              <a:rPr lang="en-BR" sz="1400" b="1" dirty="0"/>
+              <a:t>CALL 6 – SO ABASTECE</a:t>
+            </a:r>
+          </a:p>
+          <a:p>
+            <a:endParaRPr lang="en-BR" sz="1400" b="1" dirty="0"/>
+          </a:p>
+          <a:p>
+            <a:r>
+              <a:rPr lang="en-BR" sz="1400" b="1" dirty="0"/>
+              <a:t>1 – CARGA Bobina CHEIO no Buffer</a:t>
+            </a:r>
+          </a:p>
+          <a:p>
+            <a:r>
+              <a:rPr lang="en-BR" sz="1400" b="1" dirty="0"/>
+              <a:t>2 – Descarga na MAQUINA</a:t>
+            </a:r>
+          </a:p>
+          <a:p>
+            <a:r>
+              <a:rPr lang="en-BR" sz="1400" b="1" dirty="0"/>
+              <a:t> </a:t>
+            </a:r>
+          </a:p>
+        </p:txBody>
+      </p:sp>
+    </p:spTree>
+    <p:extLst>
+      <p:ext uri="{BB962C8B-B14F-4D97-AF65-F5344CB8AC3E}">
+        <p14:creationId xmlns:p14="http://schemas.microsoft.com/office/powerpoint/2010/main" val="3700113427"/>
+      </p:ext>
+    </p:extLst>
+  </p:cSld>
+  <p:clrMapOvr>
+    <a:masterClrMapping/>
+  </p:clrMapOvr>
+</p:sld>
+</file>
+
+<file path=ppt/slides/slide11.xml><?xml version="1.0" encoding="utf-8"?>
+<p:sld xmlns:a="http://schemas.openxmlformats.org/drawingml/2006/main" xmlns:r="http://schemas.openxmlformats.org/officeDocument/2006/relationships" xmlns:p="http://schemas.openxmlformats.org/presentationml/2006/main">
+  <p:cSld>
+    <p:spTree>
+      <p:nvGrpSpPr>
+        <p:cNvPr id="1" name=""/>
+        <p:cNvGrpSpPr/>
+        <p:nvPr/>
+      </p:nvGrpSpPr>
+      <p:grpSpPr>
+        <a:xfrm>
+          <a:off x="0" y="0"/>
+          <a:ext cx="0" cy="0"/>
+          <a:chOff x="0" y="0"/>
+          <a:chExt cx="0" cy="0"/>
+        </a:xfrm>
+      </p:grpSpPr>
+      <p:sp>
+        <p:nvSpPr>
+          <p:cNvPr id="2" name="TextBox 1">
+            <a:extLst>
+              <a:ext uri="{FF2B5EF4-FFF2-40B4-BE49-F238E27FC236}">
+                <a16:creationId xmlns:a16="http://schemas.microsoft.com/office/drawing/2014/main" id="{A3472355-9901-AF4B-8744-CC51F1ACA6A8}"/>
+              </a:ext>
+            </a:extLst>
+          </p:cNvPr>
+          <p:cNvSpPr txBox="1"/>
+          <p:nvPr/>
+        </p:nvSpPr>
+        <p:spPr>
+          <a:xfrm>
+            <a:off x="595086" y="544285"/>
+            <a:ext cx="3684278" cy="584775"/>
+          </a:xfrm>
+          <a:prstGeom prst="rect">
+            <a:avLst/>
+          </a:prstGeom>
+          <a:noFill/>
+        </p:spPr>
+        <p:txBody>
+          <a:bodyPr wrap="none" rtlCol="0">
+            <a:spAutoFit/>
+          </a:bodyPr>
+          <a:lstStyle/>
+          <a:p>
+            <a:r>
+              <a:rPr lang="en-BR" sz="3200" b="1" dirty="0"/>
+              <a:t>AREA F – CAPA CAPA</a:t>
+            </a:r>
+          </a:p>
+        </p:txBody>
+      </p:sp>
+      <p:pic>
+        <p:nvPicPr>
+          <p:cNvPr id="3" name="Picture 2">
+            <a:extLst>
+              <a:ext uri="{FF2B5EF4-FFF2-40B4-BE49-F238E27FC236}">
+                <a16:creationId xmlns:a16="http://schemas.microsoft.com/office/drawing/2014/main" id="{FCFC09F5-8DB9-1F45-9233-73452C29162B}"/>
+              </a:ext>
+            </a:extLst>
+          </p:cNvPr>
+          <p:cNvPicPr>
+            <a:picLocks noChangeAspect="1"/>
+          </p:cNvPicPr>
+          <p:nvPr/>
+        </p:nvPicPr>
+        <p:blipFill>
+          <a:blip r:embed="rId2"/>
+          <a:stretch>
+            <a:fillRect/>
+          </a:stretch>
+        </p:blipFill>
+        <p:spPr>
+          <a:xfrm>
+            <a:off x="1022350" y="1950458"/>
+            <a:ext cx="10147300" cy="4140200"/>
+          </a:xfrm>
+          <a:prstGeom prst="rect">
+            <a:avLst/>
+          </a:prstGeom>
+        </p:spPr>
+      </p:pic>
+      <p:sp>
+        <p:nvSpPr>
+          <p:cNvPr id="5" name="TextBox 4">
+            <a:extLst>
+              <a:ext uri="{FF2B5EF4-FFF2-40B4-BE49-F238E27FC236}">
+                <a16:creationId xmlns:a16="http://schemas.microsoft.com/office/drawing/2014/main" id="{CA2EE05F-6941-C940-98AE-44A5FB8A8251}"/>
+              </a:ext>
+            </a:extLst>
+          </p:cNvPr>
+          <p:cNvSpPr txBox="1"/>
+          <p:nvPr/>
+        </p:nvSpPr>
+        <p:spPr>
+          <a:xfrm>
+            <a:off x="1223334" y="1598197"/>
+            <a:ext cx="2427781" cy="369332"/>
+          </a:xfrm>
+          <a:prstGeom prst="rect">
+            <a:avLst/>
+          </a:prstGeom>
+          <a:noFill/>
+        </p:spPr>
+        <p:txBody>
+          <a:bodyPr wrap="none" rtlCol="0">
+            <a:spAutoFit/>
+          </a:bodyPr>
+          <a:lstStyle/>
+          <a:p>
+            <a:r>
+              <a:rPr lang="en-US" dirty="0"/>
+              <a:t>E</a:t>
+            </a:r>
+            <a:r>
+              <a:rPr lang="en-BR" dirty="0"/>
+              <a:t>ntrada carreteis cheios</a:t>
+            </a:r>
+          </a:p>
+        </p:txBody>
+      </p:sp>
+      <p:sp>
+        <p:nvSpPr>
+          <p:cNvPr id="6" name="TextBox 5">
+            <a:extLst>
+              <a:ext uri="{FF2B5EF4-FFF2-40B4-BE49-F238E27FC236}">
+                <a16:creationId xmlns:a16="http://schemas.microsoft.com/office/drawing/2014/main" id="{BE2778E9-39EA-0A48-90F8-3637DC33CE96}"/>
+              </a:ext>
+            </a:extLst>
+          </p:cNvPr>
+          <p:cNvSpPr txBox="1"/>
+          <p:nvPr/>
+        </p:nvSpPr>
+        <p:spPr>
+          <a:xfrm>
+            <a:off x="1101283" y="2906263"/>
+            <a:ext cx="2272160" cy="369332"/>
+          </a:xfrm>
+          <a:prstGeom prst="rect">
+            <a:avLst/>
+          </a:prstGeom>
+          <a:noFill/>
+        </p:spPr>
+        <p:txBody>
+          <a:bodyPr wrap="none" rtlCol="0">
+            <a:spAutoFit/>
+          </a:bodyPr>
+          <a:lstStyle/>
+          <a:p>
+            <a:r>
+              <a:rPr lang="pt-BR" dirty="0"/>
+              <a:t>Retirada carretel vazio</a:t>
+            </a:r>
+            <a:endParaRPr lang="en-BR" dirty="0"/>
+          </a:p>
+        </p:txBody>
+      </p:sp>
+      <p:sp>
+        <p:nvSpPr>
+          <p:cNvPr id="7" name="TextBox 6">
+            <a:extLst>
+              <a:ext uri="{FF2B5EF4-FFF2-40B4-BE49-F238E27FC236}">
+                <a16:creationId xmlns:a16="http://schemas.microsoft.com/office/drawing/2014/main" id="{75D84354-C343-4048-8811-CF4C2CDACDD0}"/>
+              </a:ext>
+            </a:extLst>
+          </p:cNvPr>
+          <p:cNvSpPr txBox="1"/>
+          <p:nvPr/>
+        </p:nvSpPr>
+        <p:spPr>
+          <a:xfrm>
+            <a:off x="874837" y="5259803"/>
+            <a:ext cx="2173095" cy="369332"/>
+          </a:xfrm>
+          <a:prstGeom prst="rect">
+            <a:avLst/>
+          </a:prstGeom>
+          <a:noFill/>
+        </p:spPr>
+        <p:txBody>
+          <a:bodyPr wrap="none" rtlCol="0">
+            <a:spAutoFit/>
+          </a:bodyPr>
+          <a:lstStyle/>
+          <a:p>
+            <a:r>
+              <a:rPr lang="pt-BR" dirty="0"/>
+              <a:t>Retirada </a:t>
+            </a:r>
+            <a:r>
+              <a:rPr lang="pt-BR" dirty="0" err="1"/>
+              <a:t>palete</a:t>
+            </a:r>
+            <a:r>
+              <a:rPr lang="pt-BR" dirty="0"/>
+              <a:t> cheio</a:t>
+            </a:r>
+            <a:endParaRPr lang="en-BR" dirty="0"/>
+          </a:p>
+        </p:txBody>
+      </p:sp>
+      <p:pic>
+        <p:nvPicPr>
+          <p:cNvPr id="4" name="Picture 3">
+            <a:extLst>
+              <a:ext uri="{FF2B5EF4-FFF2-40B4-BE49-F238E27FC236}">
+                <a16:creationId xmlns:a16="http://schemas.microsoft.com/office/drawing/2014/main" id="{B5398BC8-7F8E-6F4C-8E16-03569EE03E20}"/>
+              </a:ext>
+            </a:extLst>
+          </p:cNvPr>
+          <p:cNvPicPr>
+            <a:picLocks noChangeAspect="1"/>
+          </p:cNvPicPr>
+          <p:nvPr/>
+        </p:nvPicPr>
+        <p:blipFill>
+          <a:blip r:embed="rId3"/>
+          <a:stretch>
+            <a:fillRect/>
+          </a:stretch>
+        </p:blipFill>
+        <p:spPr>
+          <a:xfrm>
+            <a:off x="4991638" y="219183"/>
+            <a:ext cx="5842000" cy="1701800"/>
+          </a:xfrm>
+          <a:prstGeom prst="rect">
+            <a:avLst/>
+          </a:prstGeom>
+        </p:spPr>
+      </p:pic>
+    </p:spTree>
+    <p:extLst>
+      <p:ext uri="{BB962C8B-B14F-4D97-AF65-F5344CB8AC3E}">
+        <p14:creationId xmlns:p14="http://schemas.microsoft.com/office/powerpoint/2010/main" val="3091927832"/>
+      </p:ext>
+    </p:extLst>
+  </p:cSld>
+  <p:clrMapOvr>
+    <a:masterClrMapping/>
+  </p:clrMapOvr>
+</p:sld>
+</file>
+
+<file path=ppt/slides/slide12.xml><?xml version="1.0" encoding="utf-8"?>
+<p:sld xmlns:a="http://schemas.openxmlformats.org/drawingml/2006/main" xmlns:r="http://schemas.openxmlformats.org/officeDocument/2006/relationships" xmlns:p="http://schemas.openxmlformats.org/presentationml/2006/main">
+  <p:cSld>
+    <p:spTree>
+      <p:nvGrpSpPr>
+        <p:cNvPr id="1" name=""/>
+        <p:cNvGrpSpPr/>
+        <p:nvPr/>
+      </p:nvGrpSpPr>
+      <p:grpSpPr>
+        <a:xfrm>
+          <a:off x="0" y="0"/>
+          <a:ext cx="0" cy="0"/>
+          <a:chOff x="0" y="0"/>
+          <a:chExt cx="0" cy="0"/>
+        </a:xfrm>
+      </p:grpSpPr>
+      <p:sp>
+        <p:nvSpPr>
+          <p:cNvPr id="2" name="TextBox 1">
+            <a:extLst>
+              <a:ext uri="{FF2B5EF4-FFF2-40B4-BE49-F238E27FC236}">
+                <a16:creationId xmlns:a16="http://schemas.microsoft.com/office/drawing/2014/main" id="{355D4B17-FAA9-2246-880F-B624AC139319}"/>
+              </a:ext>
+            </a:extLst>
+          </p:cNvPr>
+          <p:cNvSpPr txBox="1"/>
+          <p:nvPr/>
+        </p:nvSpPr>
+        <p:spPr>
+          <a:xfrm>
+            <a:off x="539930" y="544076"/>
+            <a:ext cx="4223657" cy="954107"/>
+          </a:xfrm>
+          <a:prstGeom prst="rect">
+            <a:avLst/>
+          </a:prstGeom>
+          <a:noFill/>
+        </p:spPr>
+        <p:txBody>
+          <a:bodyPr wrap="square" rtlCol="0">
+            <a:spAutoFit/>
+          </a:bodyPr>
+          <a:lstStyle/>
+          <a:p>
+            <a:r>
+              <a:rPr lang="en-BR" sz="1400" b="1" dirty="0"/>
+              <a:t>CALL 1 – RETIRA PALETE  CHEIO</a:t>
+            </a:r>
+          </a:p>
+          <a:p>
+            <a:endParaRPr lang="en-BR" sz="1400" b="1" dirty="0"/>
+          </a:p>
+          <a:p>
+            <a:r>
+              <a:rPr lang="en-BR" sz="1400" b="1" dirty="0"/>
+              <a:t>1 – CARGA PALLETE MAQUINA</a:t>
+            </a:r>
+          </a:p>
+          <a:p>
+            <a:r>
+              <a:rPr lang="en-BR" sz="1400" b="1" dirty="0"/>
+              <a:t>2 – DESCARGA PALLETE BUFFER </a:t>
+            </a:r>
+          </a:p>
+        </p:txBody>
+      </p:sp>
+      <p:sp>
+        <p:nvSpPr>
+          <p:cNvPr id="3" name="TextBox 2">
+            <a:extLst>
+              <a:ext uri="{FF2B5EF4-FFF2-40B4-BE49-F238E27FC236}">
+                <a16:creationId xmlns:a16="http://schemas.microsoft.com/office/drawing/2014/main" id="{7EE6EAA5-43F3-794C-8A34-21DD38BEBDB1}"/>
+              </a:ext>
+            </a:extLst>
+          </p:cNvPr>
+          <p:cNvSpPr txBox="1"/>
+          <p:nvPr/>
+        </p:nvSpPr>
+        <p:spPr>
+          <a:xfrm>
+            <a:off x="539929" y="1873766"/>
+            <a:ext cx="4223657" cy="954107"/>
+          </a:xfrm>
+          <a:prstGeom prst="rect">
+            <a:avLst/>
+          </a:prstGeom>
+          <a:noFill/>
+        </p:spPr>
+        <p:txBody>
+          <a:bodyPr wrap="square" rtlCol="0">
+            <a:spAutoFit/>
+          </a:bodyPr>
+          <a:lstStyle/>
+          <a:p>
+            <a:r>
+              <a:rPr lang="en-BR" sz="1400" b="1" dirty="0"/>
+              <a:t>CALL 2 – RETIRA PALETE  INCOMPLETO</a:t>
+            </a:r>
+          </a:p>
+          <a:p>
+            <a:endParaRPr lang="en-BR" sz="1400" b="1" dirty="0"/>
+          </a:p>
+          <a:p>
+            <a:r>
+              <a:rPr lang="en-BR" sz="1400" b="1" dirty="0"/>
+              <a:t>1 – CARGA PALLETE MAQUINA</a:t>
+            </a:r>
+          </a:p>
+          <a:p>
+            <a:r>
+              <a:rPr lang="en-BR" sz="1400" b="1" dirty="0"/>
+              <a:t>2 – DESCARGA PALLETE BUFFER INCOMPLETOS</a:t>
+            </a:r>
+          </a:p>
+        </p:txBody>
+      </p:sp>
+      <p:sp>
+        <p:nvSpPr>
+          <p:cNvPr id="4" name="TextBox 3">
+            <a:extLst>
+              <a:ext uri="{FF2B5EF4-FFF2-40B4-BE49-F238E27FC236}">
+                <a16:creationId xmlns:a16="http://schemas.microsoft.com/office/drawing/2014/main" id="{29B1FDE7-B120-4C40-BFEB-9087D0459BE0}"/>
+              </a:ext>
+            </a:extLst>
+          </p:cNvPr>
+          <p:cNvSpPr txBox="1"/>
+          <p:nvPr/>
+        </p:nvSpPr>
+        <p:spPr>
+          <a:xfrm>
+            <a:off x="539928" y="3203456"/>
+            <a:ext cx="4223657" cy="738664"/>
+          </a:xfrm>
+          <a:prstGeom prst="rect">
+            <a:avLst/>
+          </a:prstGeom>
+          <a:noFill/>
+        </p:spPr>
+        <p:txBody>
+          <a:bodyPr wrap="square" rtlCol="0">
+            <a:spAutoFit/>
+          </a:bodyPr>
+          <a:lstStyle/>
+          <a:p>
+            <a:r>
+              <a:rPr lang="en-BR" sz="1400" b="1" dirty="0"/>
+              <a:t>CALL 3 – ABASTECE PALETE  INCOMPLETO</a:t>
+            </a:r>
+          </a:p>
+          <a:p>
+            <a:endParaRPr lang="en-BR" sz="1400" b="1" dirty="0"/>
+          </a:p>
+          <a:p>
+            <a:r>
+              <a:rPr lang="en-BR" sz="1400" b="1" dirty="0">
+                <a:highlight>
+                  <a:srgbClr val="FFFF00"/>
+                </a:highlight>
+              </a:rPr>
+              <a:t>1 – IMPOSSIVEL – SKUS MISTURADOS</a:t>
+            </a:r>
+            <a:r>
+              <a:rPr lang="en-BR" sz="1400" b="1" dirty="0"/>
+              <a:t> </a:t>
+            </a:r>
+          </a:p>
+        </p:txBody>
+      </p:sp>
+      <p:sp>
+        <p:nvSpPr>
+          <p:cNvPr id="5" name="TextBox 4">
+            <a:extLst>
+              <a:ext uri="{FF2B5EF4-FFF2-40B4-BE49-F238E27FC236}">
+                <a16:creationId xmlns:a16="http://schemas.microsoft.com/office/drawing/2014/main" id="{3E4C0948-472F-4844-9919-63399CE33A92}"/>
+              </a:ext>
+            </a:extLst>
+          </p:cNvPr>
+          <p:cNvSpPr txBox="1"/>
+          <p:nvPr/>
+        </p:nvSpPr>
+        <p:spPr>
+          <a:xfrm>
+            <a:off x="6095999" y="2243098"/>
+            <a:ext cx="4223657" cy="1169551"/>
+          </a:xfrm>
+          <a:prstGeom prst="rect">
+            <a:avLst/>
+          </a:prstGeom>
+          <a:noFill/>
+        </p:spPr>
+        <p:txBody>
+          <a:bodyPr wrap="square" rtlCol="0">
+            <a:spAutoFit/>
+          </a:bodyPr>
+          <a:lstStyle/>
+          <a:p>
+            <a:r>
+              <a:rPr lang="en-BR" sz="1400" b="1" dirty="0"/>
+              <a:t>CALL 5 – RETIRA BOBINA ERRADO</a:t>
+            </a:r>
+          </a:p>
+          <a:p>
+            <a:endParaRPr lang="en-BR" sz="1400" b="1" dirty="0"/>
+          </a:p>
+          <a:p>
+            <a:r>
+              <a:rPr lang="en-BR" sz="1400" b="1" dirty="0"/>
+              <a:t>1 – CARGA carretel ERRADO na MAQUINA</a:t>
+            </a:r>
+          </a:p>
+          <a:p>
+            <a:r>
+              <a:rPr lang="en-BR" sz="1400" b="1" dirty="0"/>
+              <a:t>2 – DESCARGA no BUFFER SKU CORRIGIDO</a:t>
+            </a:r>
+          </a:p>
+          <a:p>
+            <a:r>
+              <a:rPr lang="en-BR" sz="1400" b="1" dirty="0"/>
+              <a:t> </a:t>
+            </a:r>
+          </a:p>
+        </p:txBody>
+      </p:sp>
+      <p:sp>
+        <p:nvSpPr>
+          <p:cNvPr id="6" name="TextBox 5">
+            <a:extLst>
+              <a:ext uri="{FF2B5EF4-FFF2-40B4-BE49-F238E27FC236}">
+                <a16:creationId xmlns:a16="http://schemas.microsoft.com/office/drawing/2014/main" id="{5299F8B4-B096-E74D-A993-ACD695CBD396}"/>
+              </a:ext>
+            </a:extLst>
+          </p:cNvPr>
+          <p:cNvSpPr txBox="1"/>
+          <p:nvPr/>
+        </p:nvSpPr>
+        <p:spPr>
+          <a:xfrm>
+            <a:off x="6095999" y="5062916"/>
+            <a:ext cx="4223657" cy="954107"/>
+          </a:xfrm>
+          <a:prstGeom prst="rect">
+            <a:avLst/>
+          </a:prstGeom>
+          <a:noFill/>
+        </p:spPr>
+        <p:txBody>
+          <a:bodyPr wrap="square" rtlCol="0">
+            <a:spAutoFit/>
+          </a:bodyPr>
+          <a:lstStyle/>
+          <a:p>
+            <a:r>
+              <a:rPr lang="en-BR" sz="1400" b="1" dirty="0"/>
+              <a:t>CALL 7 – RETIRA BOBINA NAO CONFORME</a:t>
+            </a:r>
+          </a:p>
+          <a:p>
+            <a:endParaRPr lang="en-BR" sz="1400" b="1" dirty="0"/>
+          </a:p>
+          <a:p>
+            <a:r>
+              <a:rPr lang="en-BR" sz="1400" b="1" dirty="0"/>
+              <a:t>1 – CARGA BOBINA NC na MAQUINA</a:t>
+            </a:r>
+          </a:p>
+          <a:p>
+            <a:r>
+              <a:rPr lang="en-BR" sz="1400" b="1" dirty="0"/>
+              <a:t>2 – DESCARGA BOBINA no BUFFER NC </a:t>
+            </a:r>
+          </a:p>
+        </p:txBody>
+      </p:sp>
+      <p:sp>
+        <p:nvSpPr>
+          <p:cNvPr id="7" name="TextBox 6">
+            <a:extLst>
+              <a:ext uri="{FF2B5EF4-FFF2-40B4-BE49-F238E27FC236}">
+                <a16:creationId xmlns:a16="http://schemas.microsoft.com/office/drawing/2014/main" id="{9D66BD97-CD94-B04F-8714-7957FD62460D}"/>
+              </a:ext>
+            </a:extLst>
+          </p:cNvPr>
+          <p:cNvSpPr txBox="1"/>
+          <p:nvPr/>
+        </p:nvSpPr>
+        <p:spPr>
+          <a:xfrm>
+            <a:off x="6096000" y="410090"/>
+            <a:ext cx="4223657" cy="1384995"/>
+          </a:xfrm>
+          <a:prstGeom prst="rect">
+            <a:avLst/>
+          </a:prstGeom>
+          <a:noFill/>
+        </p:spPr>
+        <p:txBody>
+          <a:bodyPr wrap="square" rtlCol="0">
+            <a:spAutoFit/>
+          </a:bodyPr>
+          <a:lstStyle/>
+          <a:p>
+            <a:r>
+              <a:rPr lang="en-BR" sz="1400" b="1" dirty="0"/>
+              <a:t>CALL 4 – ABASTECE BOBINA</a:t>
+            </a:r>
+          </a:p>
+          <a:p>
+            <a:endParaRPr lang="en-BR" sz="1400" b="1" dirty="0"/>
+          </a:p>
+          <a:p>
+            <a:r>
+              <a:rPr lang="en-BR" sz="1400" b="1" dirty="0"/>
+              <a:t>1 – CARGA Bobina CHEIO no Buffer</a:t>
+            </a:r>
+          </a:p>
+          <a:p>
+            <a:r>
+              <a:rPr lang="en-BR" sz="1400" b="1" dirty="0"/>
+              <a:t>2 – Descarga na MAQUINA</a:t>
+            </a:r>
+          </a:p>
+          <a:p>
+            <a:r>
+              <a:rPr lang="en-BR" sz="1400" b="1" dirty="0"/>
+              <a:t>3 – CARGA carretel VAZIO na MAQUINA</a:t>
+            </a:r>
+          </a:p>
+          <a:p>
+            <a:r>
+              <a:rPr lang="en-BR" sz="1400" b="1" dirty="0"/>
+              <a:t>4 – DESCARGA no BUFFER VAZIOS </a:t>
+            </a:r>
+          </a:p>
+        </p:txBody>
+      </p:sp>
+      <p:sp>
+        <p:nvSpPr>
+          <p:cNvPr id="8" name="TextBox 7">
+            <a:extLst>
+              <a:ext uri="{FF2B5EF4-FFF2-40B4-BE49-F238E27FC236}">
+                <a16:creationId xmlns:a16="http://schemas.microsoft.com/office/drawing/2014/main" id="{1A339EF1-8A6F-7E48-8A88-4BE399239380}"/>
+              </a:ext>
+            </a:extLst>
+          </p:cNvPr>
+          <p:cNvSpPr txBox="1"/>
+          <p:nvPr/>
+        </p:nvSpPr>
+        <p:spPr>
+          <a:xfrm>
+            <a:off x="6095999" y="3572788"/>
+            <a:ext cx="4223657" cy="1169551"/>
+          </a:xfrm>
+          <a:prstGeom prst="rect">
+            <a:avLst/>
+          </a:prstGeom>
+          <a:noFill/>
+        </p:spPr>
+        <p:txBody>
+          <a:bodyPr wrap="square" rtlCol="0">
+            <a:spAutoFit/>
+          </a:bodyPr>
+          <a:lstStyle/>
+          <a:p>
+            <a:r>
+              <a:rPr lang="en-BR" sz="1400" b="1" dirty="0"/>
+              <a:t>CALL 6 – SO ABASTECE</a:t>
+            </a:r>
+          </a:p>
+          <a:p>
+            <a:endParaRPr lang="en-BR" sz="1400" b="1" dirty="0"/>
+          </a:p>
+          <a:p>
+            <a:r>
+              <a:rPr lang="en-BR" sz="1400" b="1" dirty="0"/>
+              <a:t>1 – CARGA Bobina CHEIO no Buffer</a:t>
+            </a:r>
+          </a:p>
+          <a:p>
+            <a:r>
+              <a:rPr lang="en-BR" sz="1400" b="1" dirty="0"/>
+              <a:t>2 – Descarga na MAQUINA</a:t>
+            </a:r>
+          </a:p>
+          <a:p>
+            <a:r>
+              <a:rPr lang="en-BR" sz="1400" b="1" dirty="0"/>
+              <a:t> </a:t>
+            </a:r>
+          </a:p>
+        </p:txBody>
+      </p:sp>
+    </p:spTree>
+    <p:extLst>
+      <p:ext uri="{BB962C8B-B14F-4D97-AF65-F5344CB8AC3E}">
+        <p14:creationId xmlns:p14="http://schemas.microsoft.com/office/powerpoint/2010/main" val="3193168978"/>
+      </p:ext>
+    </p:extLst>
+  </p:cSld>
+  <p:clrMapOvr>
+    <a:masterClrMapping/>
+  </p:clrMapOvr>
+</p:sld>
+</file>
+
+<file path=ppt/slides/slide13.xml><?xml version="1.0" encoding="utf-8"?>
+<p:sld xmlns:a="http://schemas.openxmlformats.org/drawingml/2006/main" xmlns:r="http://schemas.openxmlformats.org/officeDocument/2006/relationships" xmlns:p="http://schemas.openxmlformats.org/presentationml/2006/main">
+  <p:cSld>
+    <p:spTree>
+      <p:nvGrpSpPr>
+        <p:cNvPr id="1" name=""/>
+        <p:cNvGrpSpPr/>
+        <p:nvPr/>
+      </p:nvGrpSpPr>
+      <p:grpSpPr>
+        <a:xfrm>
+          <a:off x="0" y="0"/>
+          <a:ext cx="0" cy="0"/>
+          <a:chOff x="0" y="0"/>
+          <a:chExt cx="0" cy="0"/>
+        </a:xfrm>
+      </p:grpSpPr>
+      <p:sp>
+        <p:nvSpPr>
+          <p:cNvPr id="2" name="TextBox 1">
+            <a:extLst>
+              <a:ext uri="{FF2B5EF4-FFF2-40B4-BE49-F238E27FC236}">
+                <a16:creationId xmlns:a16="http://schemas.microsoft.com/office/drawing/2014/main" id="{17BD675A-201F-F546-9F3B-1683770873E1}"/>
+              </a:ext>
+            </a:extLst>
+          </p:cNvPr>
+          <p:cNvSpPr txBox="1"/>
+          <p:nvPr/>
+        </p:nvSpPr>
+        <p:spPr>
+          <a:xfrm>
+            <a:off x="595086" y="544285"/>
+            <a:ext cx="5247334" cy="584775"/>
+          </a:xfrm>
+          <a:prstGeom prst="rect">
+            <a:avLst/>
+          </a:prstGeom>
+          <a:noFill/>
+        </p:spPr>
+        <p:txBody>
+          <a:bodyPr wrap="none" rtlCol="0">
+            <a:spAutoFit/>
+          </a:bodyPr>
+          <a:lstStyle/>
+          <a:p>
+            <a:r>
+              <a:rPr lang="en-BR" sz="3200" b="1" dirty="0"/>
+              <a:t>AREA G – EMBALAGEM  MIMI</a:t>
+            </a:r>
+          </a:p>
+        </p:txBody>
+      </p:sp>
+      <p:pic>
+        <p:nvPicPr>
+          <p:cNvPr id="3" name="Picture 2">
+            <a:extLst>
+              <a:ext uri="{FF2B5EF4-FFF2-40B4-BE49-F238E27FC236}">
+                <a16:creationId xmlns:a16="http://schemas.microsoft.com/office/drawing/2014/main" id="{D875028F-597C-434D-B524-71CCC9451BE0}"/>
+              </a:ext>
+            </a:extLst>
+          </p:cNvPr>
+          <p:cNvPicPr>
+            <a:picLocks noChangeAspect="1"/>
+          </p:cNvPicPr>
+          <p:nvPr/>
+        </p:nvPicPr>
+        <p:blipFill>
+          <a:blip r:embed="rId2"/>
+          <a:stretch>
+            <a:fillRect/>
+          </a:stretch>
+        </p:blipFill>
+        <p:spPr>
+          <a:xfrm>
+            <a:off x="6096000" y="836672"/>
+            <a:ext cx="4343400" cy="1155700"/>
+          </a:xfrm>
+          <a:prstGeom prst="rect">
+            <a:avLst/>
+          </a:prstGeom>
+        </p:spPr>
+      </p:pic>
+      <p:pic>
+        <p:nvPicPr>
+          <p:cNvPr id="4" name="Picture 3">
+            <a:extLst>
+              <a:ext uri="{FF2B5EF4-FFF2-40B4-BE49-F238E27FC236}">
+                <a16:creationId xmlns:a16="http://schemas.microsoft.com/office/drawing/2014/main" id="{6F1FC3F2-1264-EC4B-90D1-227E0BD35C5D}"/>
+              </a:ext>
+            </a:extLst>
+          </p:cNvPr>
+          <p:cNvPicPr>
+            <a:picLocks noChangeAspect="1"/>
+          </p:cNvPicPr>
+          <p:nvPr/>
+        </p:nvPicPr>
+        <p:blipFill>
+          <a:blip r:embed="rId3"/>
+          <a:stretch>
+            <a:fillRect/>
+          </a:stretch>
+        </p:blipFill>
+        <p:spPr>
+          <a:xfrm>
+            <a:off x="2522220" y="2523582"/>
+            <a:ext cx="5090160" cy="3497746"/>
+          </a:xfrm>
+          <a:prstGeom prst="rect">
+            <a:avLst/>
+          </a:prstGeom>
+        </p:spPr>
+      </p:pic>
+    </p:spTree>
+    <p:extLst>
+      <p:ext uri="{BB962C8B-B14F-4D97-AF65-F5344CB8AC3E}">
+        <p14:creationId xmlns:p14="http://schemas.microsoft.com/office/powerpoint/2010/main" val="1315674850"/>
+      </p:ext>
+    </p:extLst>
+  </p:cSld>
+  <p:clrMapOvr>
+    <a:masterClrMapping/>
+  </p:clrMapOvr>
+</p:sld>
+</file>
+
+<file path=ppt/slides/slide14.xml><?xml version="1.0" encoding="utf-8"?>
+<p:sld xmlns:a="http://schemas.openxmlformats.org/drawingml/2006/main" xmlns:r="http://schemas.openxmlformats.org/officeDocument/2006/relationships" xmlns:p="http://schemas.openxmlformats.org/presentationml/2006/main">
+  <p:cSld>
+    <p:spTree>
+      <p:nvGrpSpPr>
+        <p:cNvPr id="1" name=""/>
+        <p:cNvGrpSpPr/>
+        <p:nvPr/>
+      </p:nvGrpSpPr>
+      <p:grpSpPr>
+        <a:xfrm>
+          <a:off x="0" y="0"/>
+          <a:ext cx="0" cy="0"/>
+          <a:chOff x="0" y="0"/>
+          <a:chExt cx="0" cy="0"/>
+        </a:xfrm>
+      </p:grpSpPr>
+    </p:spTree>
+    <p:extLst>
+      <p:ext uri="{BB962C8B-B14F-4D97-AF65-F5344CB8AC3E}">
+        <p14:creationId xmlns:p14="http://schemas.microsoft.com/office/powerpoint/2010/main" val="4186508567"/>
+      </p:ext>
+    </p:extLst>
+  </p:cSld>
+  <p:clrMapOvr>
+    <a:masterClrMapping/>
+  </p:clrMapOvr>
+</p:sld>
+</file>
+
+<file path=ppt/slides/slide15.xml><?xml version="1.0" encoding="utf-8"?>
+<p:sld xmlns:a="http://schemas.openxmlformats.org/drawingml/2006/main" xmlns:r="http://schemas.openxmlformats.org/officeDocument/2006/relationships" xmlns:p="http://schemas.openxmlformats.org/presentationml/2006/main">
+  <p:cSld>
+    <p:spTree>
+      <p:nvGrpSpPr>
+        <p:cNvPr id="1" name=""/>
+        <p:cNvGrpSpPr/>
+        <p:nvPr/>
+      </p:nvGrpSpPr>
+      <p:grpSpPr>
+        <a:xfrm>
+          <a:off x="0" y="0"/>
+          <a:ext cx="0" cy="0"/>
+          <a:chOff x="0" y="0"/>
+          <a:chExt cx="0" cy="0"/>
+        </a:xfrm>
+      </p:grpSpPr>
+      <p:sp>
+        <p:nvSpPr>
+          <p:cNvPr id="2" name="TextBox 1">
+            <a:extLst>
+              <a:ext uri="{FF2B5EF4-FFF2-40B4-BE49-F238E27FC236}">
+                <a16:creationId xmlns:a16="http://schemas.microsoft.com/office/drawing/2014/main" id="{17BD675A-201F-F546-9F3B-1683770873E1}"/>
+              </a:ext>
+            </a:extLst>
+          </p:cNvPr>
+          <p:cNvSpPr txBox="1"/>
+          <p:nvPr/>
+        </p:nvSpPr>
+        <p:spPr>
+          <a:xfrm>
+            <a:off x="595086" y="544285"/>
+            <a:ext cx="4101187" cy="584775"/>
+          </a:xfrm>
+          <a:prstGeom prst="rect">
+            <a:avLst/>
+          </a:prstGeom>
+          <a:noFill/>
+        </p:spPr>
+        <p:txBody>
+          <a:bodyPr wrap="none" rtlCol="0">
+            <a:spAutoFit/>
+          </a:bodyPr>
+          <a:lstStyle/>
+          <a:p>
+            <a:r>
+              <a:rPr lang="en-BR" sz="3200" b="1" dirty="0"/>
+              <a:t>AREA K  - EMBALAGEM</a:t>
+            </a:r>
+          </a:p>
+        </p:txBody>
+      </p:sp>
+      <p:pic>
+        <p:nvPicPr>
+          <p:cNvPr id="3" name="Picture 2">
+            <a:extLst>
+              <a:ext uri="{FF2B5EF4-FFF2-40B4-BE49-F238E27FC236}">
+                <a16:creationId xmlns:a16="http://schemas.microsoft.com/office/drawing/2014/main" id="{939C22A3-BB9B-F04D-927D-586D2FDAA699}"/>
+              </a:ext>
+            </a:extLst>
+          </p:cNvPr>
+          <p:cNvPicPr>
+            <a:picLocks noChangeAspect="1"/>
+          </p:cNvPicPr>
+          <p:nvPr/>
+        </p:nvPicPr>
+        <p:blipFill>
+          <a:blip r:embed="rId2"/>
+          <a:stretch>
+            <a:fillRect/>
+          </a:stretch>
+        </p:blipFill>
+        <p:spPr>
+          <a:xfrm>
+            <a:off x="5183059" y="985262"/>
+            <a:ext cx="2438400" cy="1143000"/>
+          </a:xfrm>
+          <a:prstGeom prst="rect">
+            <a:avLst/>
+          </a:prstGeom>
+        </p:spPr>
+      </p:pic>
+      <p:pic>
+        <p:nvPicPr>
+          <p:cNvPr id="4" name="Picture 3">
+            <a:extLst>
+              <a:ext uri="{FF2B5EF4-FFF2-40B4-BE49-F238E27FC236}">
+                <a16:creationId xmlns:a16="http://schemas.microsoft.com/office/drawing/2014/main" id="{691C04C8-E0DE-2F42-8DB8-C3DB20D9BC67}"/>
+              </a:ext>
+            </a:extLst>
+          </p:cNvPr>
+          <p:cNvPicPr>
+            <a:picLocks noChangeAspect="1"/>
+          </p:cNvPicPr>
+          <p:nvPr/>
+        </p:nvPicPr>
+        <p:blipFill>
+          <a:blip r:embed="rId3"/>
+          <a:stretch>
+            <a:fillRect/>
+          </a:stretch>
+        </p:blipFill>
+        <p:spPr>
+          <a:xfrm>
+            <a:off x="2522220" y="2523582"/>
+            <a:ext cx="5090160" cy="3497746"/>
+          </a:xfrm>
+          <a:prstGeom prst="rect">
+            <a:avLst/>
+          </a:prstGeom>
+        </p:spPr>
+      </p:pic>
+    </p:spTree>
+    <p:extLst>
+      <p:ext uri="{BB962C8B-B14F-4D97-AF65-F5344CB8AC3E}">
+        <p14:creationId xmlns:p14="http://schemas.microsoft.com/office/powerpoint/2010/main" val="2310638332"/>
+      </p:ext>
+    </p:extLst>
+  </p:cSld>
+  <p:clrMapOvr>
+    <a:masterClrMapping/>
+  </p:clrMapOvr>
+</p:sld>
+</file>
+
+<file path=ppt/slides/slide16.xml><?xml version="1.0" encoding="utf-8"?>
+<p:sld xmlns:a="http://schemas.openxmlformats.org/drawingml/2006/main" xmlns:r="http://schemas.openxmlformats.org/officeDocument/2006/relationships" xmlns:p="http://schemas.openxmlformats.org/presentationml/2006/main">
+  <p:cSld>
+    <p:spTree>
+      <p:nvGrpSpPr>
+        <p:cNvPr id="1" name=""/>
+        <p:cNvGrpSpPr/>
+        <p:nvPr/>
+      </p:nvGrpSpPr>
+      <p:grpSpPr>
+        <a:xfrm>
+          <a:off x="0" y="0"/>
+          <a:ext cx="0" cy="0"/>
+          <a:chOff x="0" y="0"/>
+          <a:chExt cx="0" cy="0"/>
+        </a:xfrm>
+      </p:grpSpPr>
+    </p:spTree>
+    <p:extLst>
+      <p:ext uri="{BB962C8B-B14F-4D97-AF65-F5344CB8AC3E}">
+        <p14:creationId xmlns:p14="http://schemas.microsoft.com/office/powerpoint/2010/main" val="3005748410"/>
+      </p:ext>
+    </p:extLst>
+  </p:cSld>
+  <p:clrMapOvr>
+    <a:masterClrMapping/>
+  </p:clrMapOvr>
+</p:sld>
+</file>
+
+<file path=ppt/slides/slide17.xml><?xml version="1.0" encoding="utf-8"?>
+<p:sld xmlns:a="http://schemas.openxmlformats.org/drawingml/2006/main" xmlns:r="http://schemas.openxmlformats.org/officeDocument/2006/relationships" xmlns:p="http://schemas.openxmlformats.org/presentationml/2006/main">
+  <p:cSld>
+    <p:spTree>
+      <p:nvGrpSpPr>
+        <p:cNvPr id="1" name=""/>
+        <p:cNvGrpSpPr/>
+        <p:nvPr/>
+      </p:nvGrpSpPr>
+      <p:grpSpPr>
+        <a:xfrm>
+          <a:off x="0" y="0"/>
+          <a:ext cx="0" cy="0"/>
+          <a:chOff x="0" y="0"/>
+          <a:chExt cx="0" cy="0"/>
+        </a:xfrm>
+      </p:grpSpPr>
+      <p:sp>
+        <p:nvSpPr>
+          <p:cNvPr id="2" name="TextBox 1">
+            <a:extLst>
+              <a:ext uri="{FF2B5EF4-FFF2-40B4-BE49-F238E27FC236}">
+                <a16:creationId xmlns:a16="http://schemas.microsoft.com/office/drawing/2014/main" id="{17BD675A-201F-F546-9F3B-1683770873E1}"/>
+              </a:ext>
+            </a:extLst>
+          </p:cNvPr>
+          <p:cNvSpPr txBox="1"/>
+          <p:nvPr/>
+        </p:nvSpPr>
+        <p:spPr>
+          <a:xfrm>
+            <a:off x="595086" y="544285"/>
+            <a:ext cx="1373902" cy="584775"/>
+          </a:xfrm>
+          <a:prstGeom prst="rect">
+            <a:avLst/>
+          </a:prstGeom>
+          <a:noFill/>
+        </p:spPr>
+        <p:txBody>
+          <a:bodyPr wrap="none" rtlCol="0">
+            <a:spAutoFit/>
+          </a:bodyPr>
+          <a:lstStyle/>
+          <a:p>
+            <a:r>
+              <a:rPr lang="en-BR" sz="3200" b="1" dirty="0"/>
+              <a:t>AREA L</a:t>
+            </a:r>
+          </a:p>
+        </p:txBody>
+      </p:sp>
+      <p:pic>
+        <p:nvPicPr>
+          <p:cNvPr id="3" name="Picture 2">
+            <a:extLst>
+              <a:ext uri="{FF2B5EF4-FFF2-40B4-BE49-F238E27FC236}">
+                <a16:creationId xmlns:a16="http://schemas.microsoft.com/office/drawing/2014/main" id="{B802BBE6-4381-3142-BAE9-3200A482C823}"/>
+              </a:ext>
+            </a:extLst>
+          </p:cNvPr>
+          <p:cNvPicPr>
+            <a:picLocks noChangeAspect="1"/>
+          </p:cNvPicPr>
+          <p:nvPr/>
+        </p:nvPicPr>
+        <p:blipFill>
+          <a:blip r:embed="rId2"/>
+          <a:stretch>
+            <a:fillRect/>
+          </a:stretch>
+        </p:blipFill>
+        <p:spPr>
+          <a:xfrm>
+            <a:off x="4504690" y="303560"/>
+            <a:ext cx="2336800" cy="1651000"/>
+          </a:xfrm>
+          <a:prstGeom prst="rect">
+            <a:avLst/>
+          </a:prstGeom>
+        </p:spPr>
+      </p:pic>
+      <p:pic>
+        <p:nvPicPr>
+          <p:cNvPr id="4" name="Picture 3">
+            <a:extLst>
+              <a:ext uri="{FF2B5EF4-FFF2-40B4-BE49-F238E27FC236}">
+                <a16:creationId xmlns:a16="http://schemas.microsoft.com/office/drawing/2014/main" id="{2E40B3DF-E6F6-F440-9815-92ACA3FFC7B5}"/>
+              </a:ext>
+            </a:extLst>
+          </p:cNvPr>
+          <p:cNvPicPr>
+            <a:picLocks noChangeAspect="1"/>
+          </p:cNvPicPr>
+          <p:nvPr/>
+        </p:nvPicPr>
+        <p:blipFill>
+          <a:blip r:embed="rId3"/>
+          <a:stretch>
+            <a:fillRect/>
+          </a:stretch>
+        </p:blipFill>
+        <p:spPr>
+          <a:xfrm>
+            <a:off x="2522220" y="2523582"/>
+            <a:ext cx="5090160" cy="3497746"/>
+          </a:xfrm>
+          <a:prstGeom prst="rect">
+            <a:avLst/>
+          </a:prstGeom>
+        </p:spPr>
+      </p:pic>
+    </p:spTree>
+    <p:extLst>
+      <p:ext uri="{BB962C8B-B14F-4D97-AF65-F5344CB8AC3E}">
+        <p14:creationId xmlns:p14="http://schemas.microsoft.com/office/powerpoint/2010/main" val="150267436"/>
+      </p:ext>
+    </p:extLst>
+  </p:cSld>
+  <p:clrMapOvr>
+    <a:masterClrMapping/>
+  </p:clrMapOvr>
+</p:sld>
+</file>
+
+<file path=ppt/slides/slide18.xml><?xml version="1.0" encoding="utf-8"?>
+<p:sld xmlns:a="http://schemas.openxmlformats.org/drawingml/2006/main" xmlns:r="http://schemas.openxmlformats.org/officeDocument/2006/relationships" xmlns:p="http://schemas.openxmlformats.org/presentationml/2006/main">
+  <p:cSld>
+    <p:spTree>
+      <p:nvGrpSpPr>
+        <p:cNvPr id="1" name=""/>
+        <p:cNvGrpSpPr/>
+        <p:nvPr/>
+      </p:nvGrpSpPr>
+      <p:grpSpPr>
+        <a:xfrm>
+          <a:off x="0" y="0"/>
+          <a:ext cx="0" cy="0"/>
+          <a:chOff x="0" y="0"/>
+          <a:chExt cx="0" cy="0"/>
+        </a:xfrm>
+      </p:grpSpPr>
+    </p:spTree>
+    <p:extLst>
+      <p:ext uri="{BB962C8B-B14F-4D97-AF65-F5344CB8AC3E}">
+        <p14:creationId xmlns:p14="http://schemas.microsoft.com/office/powerpoint/2010/main" val="2007412578"/>
+      </p:ext>
+    </p:extLst>
+  </p:cSld>
+  <p:clrMapOvr>
+    <a:masterClrMapping/>
+  </p:clrMapOvr>
+</p:sld>
+</file>
+
+<file path=ppt/slides/slide19.xml><?xml version="1.0" encoding="utf-8"?>
+<p:sld xmlns:a="http://schemas.openxmlformats.org/drawingml/2006/main" xmlns:r="http://schemas.openxmlformats.org/officeDocument/2006/relationships" xmlns:p="http://schemas.openxmlformats.org/presentationml/2006/main">
+  <p:cSld>
+    <p:spTree>
+      <p:nvGrpSpPr>
+        <p:cNvPr id="1" name=""/>
+        <p:cNvGrpSpPr/>
+        <p:nvPr/>
+      </p:nvGrpSpPr>
+      <p:grpSpPr>
+        <a:xfrm>
+          <a:off x="0" y="0"/>
+          <a:ext cx="0" cy="0"/>
+          <a:chOff x="0" y="0"/>
+          <a:chExt cx="0" cy="0"/>
+        </a:xfrm>
+      </p:grpSpPr>
+      <p:sp>
+        <p:nvSpPr>
+          <p:cNvPr id="2" name="TextBox 1">
+            <a:extLst>
+              <a:ext uri="{FF2B5EF4-FFF2-40B4-BE49-F238E27FC236}">
+                <a16:creationId xmlns:a16="http://schemas.microsoft.com/office/drawing/2014/main" id="{17BD675A-201F-F546-9F3B-1683770873E1}"/>
+              </a:ext>
+            </a:extLst>
+          </p:cNvPr>
+          <p:cNvSpPr txBox="1"/>
+          <p:nvPr/>
+        </p:nvSpPr>
+        <p:spPr>
+          <a:xfrm>
+            <a:off x="595086" y="544285"/>
+            <a:ext cx="3721468" cy="584775"/>
+          </a:xfrm>
+          <a:prstGeom prst="rect">
+            <a:avLst/>
+          </a:prstGeom>
+          <a:noFill/>
+        </p:spPr>
+        <p:txBody>
+          <a:bodyPr wrap="none" rtlCol="0">
+            <a:spAutoFit/>
+          </a:bodyPr>
+          <a:lstStyle/>
+          <a:p>
+            <a:r>
+              <a:rPr lang="en-BR" sz="3200" b="1" dirty="0"/>
+              <a:t>AREA H - EXPEDICAO</a:t>
+            </a:r>
+          </a:p>
+        </p:txBody>
+      </p:sp>
+      <p:pic>
+        <p:nvPicPr>
+          <p:cNvPr id="3" name="Picture 2">
+            <a:extLst>
+              <a:ext uri="{FF2B5EF4-FFF2-40B4-BE49-F238E27FC236}">
+                <a16:creationId xmlns:a16="http://schemas.microsoft.com/office/drawing/2014/main" id="{613B1F5F-91AC-EC48-BF67-97FDB801B7EC}"/>
+              </a:ext>
+            </a:extLst>
+          </p:cNvPr>
+          <p:cNvPicPr>
+            <a:picLocks noChangeAspect="1"/>
+          </p:cNvPicPr>
+          <p:nvPr/>
+        </p:nvPicPr>
+        <p:blipFill>
+          <a:blip r:embed="rId2"/>
+          <a:stretch>
+            <a:fillRect/>
+          </a:stretch>
+        </p:blipFill>
+        <p:spPr>
+          <a:xfrm>
+            <a:off x="4413250" y="1318260"/>
+            <a:ext cx="6680200" cy="1638300"/>
+          </a:xfrm>
+          <a:prstGeom prst="rect">
+            <a:avLst/>
+          </a:prstGeom>
+        </p:spPr>
+      </p:pic>
+      <p:pic>
+        <p:nvPicPr>
+          <p:cNvPr id="4" name="Picture 3">
+            <a:extLst>
+              <a:ext uri="{FF2B5EF4-FFF2-40B4-BE49-F238E27FC236}">
+                <a16:creationId xmlns:a16="http://schemas.microsoft.com/office/drawing/2014/main" id="{65E0D97F-5C8C-534A-807E-DC9F473C3886}"/>
+              </a:ext>
+            </a:extLst>
+          </p:cNvPr>
+          <p:cNvPicPr>
+            <a:picLocks noChangeAspect="1"/>
+          </p:cNvPicPr>
+          <p:nvPr/>
+        </p:nvPicPr>
+        <p:blipFill>
+          <a:blip r:embed="rId3"/>
+          <a:stretch>
+            <a:fillRect/>
+          </a:stretch>
+        </p:blipFill>
+        <p:spPr>
+          <a:xfrm>
+            <a:off x="475445" y="3429000"/>
+            <a:ext cx="11241110" cy="2815590"/>
+          </a:xfrm>
+          <a:prstGeom prst="rect">
+            <a:avLst/>
+          </a:prstGeom>
+        </p:spPr>
+      </p:pic>
+    </p:spTree>
+    <p:extLst>
+      <p:ext uri="{BB962C8B-B14F-4D97-AF65-F5344CB8AC3E}">
+        <p14:creationId xmlns:p14="http://schemas.microsoft.com/office/powerpoint/2010/main" val="717147581"/>
+      </p:ext>
+    </p:extLst>
+  </p:cSld>
+  <p:clrMapOvr>
+    <a:masterClrMapping/>
+  </p:clrMapOvr>
+</p:sld>
+</file>
+
 <file path=ppt/slides/slide2.xml><?xml version="1.0" encoding="utf-8"?>
 <p:sld xmlns:a="http://schemas.openxmlformats.org/drawingml/2006/main" xmlns:r="http://schemas.openxmlformats.org/officeDocument/2006/relationships" xmlns:p="http://schemas.openxmlformats.org/presentationml/2006/main">
   <p:cSld>
@@ -4162,6 +5823,36 @@
     <p:extLst>
       <p:ext uri="{BB962C8B-B14F-4D97-AF65-F5344CB8AC3E}">
         <p14:creationId xmlns:p14="http://schemas.microsoft.com/office/powerpoint/2010/main" val="1085313560"/>
+      </p:ext>
+    </p:extLst>
+  </p:cSld>
+  <p:clrMapOvr>
+    <a:masterClrMapping/>
+  </p:clrMapOvr>
+</p:sld>
+</file>
+
+<file path=ppt/slides/slide20.xml><?xml version="1.0" encoding="utf-8"?>
+<p:sld xmlns:a="http://schemas.openxmlformats.org/drawingml/2006/main" xmlns:r="http://schemas.openxmlformats.org/officeDocument/2006/relationships" xmlns:p="http://schemas.openxmlformats.org/presentationml/2006/main">
+  <p:cSld>
+    <p:spTree>
+      <p:nvGrpSpPr>
+        <p:cNvPr id="1" name=""/>
+        <p:cNvGrpSpPr/>
+        <p:nvPr/>
+      </p:nvGrpSpPr>
+      <p:grpSpPr>
+        <a:xfrm>
+          <a:off x="0" y="0"/>
+          <a:ext cx="0" cy="0"/>
+          <a:chOff x="0" y="0"/>
+          <a:chExt cx="0" cy="0"/>
+        </a:xfrm>
+      </p:grpSpPr>
+    </p:spTree>
+    <p:extLst>
+      <p:ext uri="{BB962C8B-B14F-4D97-AF65-F5344CB8AC3E}">
+        <p14:creationId xmlns:p14="http://schemas.microsoft.com/office/powerpoint/2010/main" val="3007382218"/>
       </p:ext>
     </p:extLst>
   </p:cSld>
@@ -5444,10 +7135,1107 @@
           <a:chExt cx="0" cy="0"/>
         </a:xfrm>
       </p:grpSpPr>
+      <p:sp>
+        <p:nvSpPr>
+          <p:cNvPr id="2" name="TextBox 1">
+            <a:extLst>
+              <a:ext uri="{FF2B5EF4-FFF2-40B4-BE49-F238E27FC236}">
+                <a16:creationId xmlns:a16="http://schemas.microsoft.com/office/drawing/2014/main" id="{A3472355-9901-AF4B-8744-CC51F1ACA6A8}"/>
+              </a:ext>
+            </a:extLst>
+          </p:cNvPr>
+          <p:cNvSpPr txBox="1"/>
+          <p:nvPr/>
+        </p:nvSpPr>
+        <p:spPr>
+          <a:xfrm>
+            <a:off x="595086" y="544285"/>
+            <a:ext cx="4324197" cy="584775"/>
+          </a:xfrm>
+          <a:prstGeom prst="rect">
+            <a:avLst/>
+          </a:prstGeom>
+          <a:noFill/>
+        </p:spPr>
+        <p:txBody>
+          <a:bodyPr wrap="none" rtlCol="0">
+            <a:spAutoFit/>
+          </a:bodyPr>
+          <a:lstStyle/>
+          <a:p>
+            <a:r>
+              <a:rPr lang="en-BR" sz="3200" b="1" dirty="0"/>
+              <a:t>AREA C - REENROLADOR</a:t>
+            </a:r>
+          </a:p>
+        </p:txBody>
+      </p:sp>
+      <p:pic>
+        <p:nvPicPr>
+          <p:cNvPr id="3" name="Imagem 4" descr="Diagrama&#10;&#10;Descrição gerada automaticamente">
+            <a:extLst>
+              <a:ext uri="{FF2B5EF4-FFF2-40B4-BE49-F238E27FC236}">
+                <a16:creationId xmlns:a16="http://schemas.microsoft.com/office/drawing/2014/main" id="{1346828A-9F6D-BA4F-9746-D9460E434FCA}"/>
+              </a:ext>
+            </a:extLst>
+          </p:cNvPr>
+          <p:cNvPicPr/>
+          <p:nvPr/>
+        </p:nvPicPr>
+        <p:blipFill rotWithShape="1">
+          <a:blip r:embed="rId2">
+            <a:extLst>
+              <a:ext uri="{28A0092B-C50C-407E-A947-70E740481C1C}">
+                <a14:useLocalDpi xmlns:a14="http://schemas.microsoft.com/office/drawing/2010/main" val="0"/>
+              </a:ext>
+            </a:extLst>
+          </a:blip>
+          <a:srcRect l="-44679" t="-1567" r="44679" b="1567"/>
+          <a:stretch/>
+        </p:blipFill>
+        <p:spPr bwMode="auto">
+          <a:xfrm>
+            <a:off x="4219136" y="2158585"/>
+            <a:ext cx="5273040" cy="3261360"/>
+          </a:xfrm>
+          <a:prstGeom prst="rect">
+            <a:avLst/>
+          </a:prstGeom>
+          <a:noFill/>
+          <a:ln>
+            <a:noFill/>
+          </a:ln>
+        </p:spPr>
+      </p:pic>
+      <p:sp>
+        <p:nvSpPr>
+          <p:cNvPr id="4" name="Rectangle 3">
+            <a:extLst>
+              <a:ext uri="{FF2B5EF4-FFF2-40B4-BE49-F238E27FC236}">
+                <a16:creationId xmlns:a16="http://schemas.microsoft.com/office/drawing/2014/main" id="{85D4F4CE-36DB-DD48-B7CA-4C30935CCD14}"/>
+              </a:ext>
+            </a:extLst>
+          </p:cNvPr>
+          <p:cNvSpPr/>
+          <p:nvPr/>
+        </p:nvSpPr>
+        <p:spPr>
+          <a:xfrm>
+            <a:off x="569985" y="1968820"/>
+            <a:ext cx="3345799" cy="1477328"/>
+          </a:xfrm>
+          <a:prstGeom prst="rect">
+            <a:avLst/>
+          </a:prstGeom>
+        </p:spPr>
+        <p:txBody>
+          <a:bodyPr wrap="square">
+            <a:spAutoFit/>
+          </a:bodyPr>
+          <a:lstStyle/>
+          <a:p>
+            <a:r>
+              <a:rPr lang="pt-BR" dirty="0"/>
+              <a:t>São 2 maquinas a entrada de material é manual por empilhadeira. Apenas Sai produtos enrolados em </a:t>
+            </a:r>
+            <a:r>
+              <a:rPr lang="pt-BR" dirty="0" err="1"/>
+              <a:t>palletes</a:t>
+            </a:r>
+            <a:r>
+              <a:rPr lang="pt-BR" dirty="0"/>
+              <a:t> (Completos ou Incompletos)</a:t>
+            </a:r>
+            <a:endParaRPr lang="en-BR" dirty="0"/>
+          </a:p>
+        </p:txBody>
+      </p:sp>
+      <p:sp>
+        <p:nvSpPr>
+          <p:cNvPr id="6" name="Rectangle 5">
+            <a:extLst>
+              <a:ext uri="{FF2B5EF4-FFF2-40B4-BE49-F238E27FC236}">
+                <a16:creationId xmlns:a16="http://schemas.microsoft.com/office/drawing/2014/main" id="{9F7B0F2D-87DE-7245-AC10-7FC70F458192}"/>
+              </a:ext>
+            </a:extLst>
+          </p:cNvPr>
+          <p:cNvSpPr/>
+          <p:nvPr/>
+        </p:nvSpPr>
+        <p:spPr>
+          <a:xfrm>
+            <a:off x="569984" y="3789265"/>
+            <a:ext cx="3345799" cy="1200329"/>
+          </a:xfrm>
+          <a:prstGeom prst="rect">
+            <a:avLst/>
+          </a:prstGeom>
+        </p:spPr>
+        <p:txBody>
+          <a:bodyPr wrap="square">
+            <a:spAutoFit/>
+          </a:bodyPr>
+          <a:lstStyle/>
+          <a:p>
+            <a:r>
+              <a:rPr lang="pt-BR" dirty="0"/>
+              <a:t>Ambas posições entram/saem </a:t>
+            </a:r>
+            <a:r>
+              <a:rPr lang="pt-BR" dirty="0" err="1"/>
+              <a:t>pallete</a:t>
+            </a:r>
+            <a:r>
+              <a:rPr lang="pt-BR" dirty="0"/>
+              <a:t>. Sendo </a:t>
+            </a:r>
+            <a:r>
+              <a:rPr lang="pt-BR" dirty="0" err="1"/>
+              <a:t>Saida</a:t>
+            </a:r>
+            <a:r>
+              <a:rPr lang="pt-BR" dirty="0"/>
+              <a:t> de Completo/ Incompleto. E apenas entrada de Incompleto. </a:t>
+            </a:r>
+            <a:endParaRPr lang="en-BR" dirty="0">
+              <a:highlight>
+                <a:srgbClr val="FFFF00"/>
+              </a:highlight>
+            </a:endParaRPr>
+          </a:p>
+        </p:txBody>
+      </p:sp>
+      <p:pic>
+        <p:nvPicPr>
+          <p:cNvPr id="5" name="Picture 4">
+            <a:extLst>
+              <a:ext uri="{FF2B5EF4-FFF2-40B4-BE49-F238E27FC236}">
+                <a16:creationId xmlns:a16="http://schemas.microsoft.com/office/drawing/2014/main" id="{3C92582F-7EC1-944E-A03A-C86896F4B36D}"/>
+              </a:ext>
+            </a:extLst>
+          </p:cNvPr>
+          <p:cNvPicPr>
+            <a:picLocks noChangeAspect="1"/>
+          </p:cNvPicPr>
+          <p:nvPr/>
+        </p:nvPicPr>
+        <p:blipFill>
+          <a:blip r:embed="rId3"/>
+          <a:stretch>
+            <a:fillRect/>
+          </a:stretch>
+        </p:blipFill>
+        <p:spPr>
+          <a:xfrm>
+            <a:off x="6573893" y="368620"/>
+            <a:ext cx="2120900" cy="1600200"/>
+          </a:xfrm>
+          <a:prstGeom prst="rect">
+            <a:avLst/>
+          </a:prstGeom>
+        </p:spPr>
+      </p:pic>
     </p:spTree>
     <p:extLst>
       <p:ext uri="{BB962C8B-B14F-4D97-AF65-F5344CB8AC3E}">
         <p14:creationId xmlns:p14="http://schemas.microsoft.com/office/powerpoint/2010/main" val="688451864"/>
+      </p:ext>
+    </p:extLst>
+  </p:cSld>
+  <p:clrMapOvr>
+    <a:masterClrMapping/>
+  </p:clrMapOvr>
+</p:sld>
+</file>
+
+<file path=ppt/slides/slide6.xml><?xml version="1.0" encoding="utf-8"?>
+<p:sld xmlns:a="http://schemas.openxmlformats.org/drawingml/2006/main" xmlns:r="http://schemas.openxmlformats.org/officeDocument/2006/relationships" xmlns:p="http://schemas.openxmlformats.org/presentationml/2006/main">
+  <p:cSld>
+    <p:spTree>
+      <p:nvGrpSpPr>
+        <p:cNvPr id="1" name=""/>
+        <p:cNvGrpSpPr/>
+        <p:nvPr/>
+      </p:nvGrpSpPr>
+      <p:grpSpPr>
+        <a:xfrm>
+          <a:off x="0" y="0"/>
+          <a:ext cx="0" cy="0"/>
+          <a:chOff x="0" y="0"/>
+          <a:chExt cx="0" cy="0"/>
+        </a:xfrm>
+      </p:grpSpPr>
+      <p:sp>
+        <p:nvSpPr>
+          <p:cNvPr id="2" name="TextBox 1">
+            <a:extLst>
+              <a:ext uri="{FF2B5EF4-FFF2-40B4-BE49-F238E27FC236}">
+                <a16:creationId xmlns:a16="http://schemas.microsoft.com/office/drawing/2014/main" id="{A7B274A8-210A-684D-8DC3-3F1AFEC7FCAB}"/>
+              </a:ext>
+            </a:extLst>
+          </p:cNvPr>
+          <p:cNvSpPr txBox="1"/>
+          <p:nvPr/>
+        </p:nvSpPr>
+        <p:spPr>
+          <a:xfrm>
+            <a:off x="402770" y="703858"/>
+            <a:ext cx="4223657" cy="954107"/>
+          </a:xfrm>
+          <a:prstGeom prst="rect">
+            <a:avLst/>
+          </a:prstGeom>
+          <a:noFill/>
+        </p:spPr>
+        <p:txBody>
+          <a:bodyPr wrap="square" rtlCol="0">
+            <a:spAutoFit/>
+          </a:bodyPr>
+          <a:lstStyle/>
+          <a:p>
+            <a:r>
+              <a:rPr lang="en-BR" sz="1400" b="1" dirty="0"/>
+              <a:t>CALL 1 – RETIRA PALLET CHEIO</a:t>
+            </a:r>
+          </a:p>
+          <a:p>
+            <a:endParaRPr lang="en-BR" sz="1400" b="1" dirty="0"/>
+          </a:p>
+          <a:p>
+            <a:r>
+              <a:rPr lang="en-BR" sz="1400" b="1" dirty="0"/>
+              <a:t>1 – CARREGA palete cheio.</a:t>
+            </a:r>
+          </a:p>
+          <a:p>
+            <a:r>
+              <a:rPr lang="en-BR" sz="1400" b="1" dirty="0"/>
+              <a:t>2 – DESCARREGA palete cheio no BUFFER CHEIOS</a:t>
+            </a:r>
+          </a:p>
+        </p:txBody>
+      </p:sp>
+      <p:sp>
+        <p:nvSpPr>
+          <p:cNvPr id="3" name="TextBox 2">
+            <a:extLst>
+              <a:ext uri="{FF2B5EF4-FFF2-40B4-BE49-F238E27FC236}">
+                <a16:creationId xmlns:a16="http://schemas.microsoft.com/office/drawing/2014/main" id="{5CF699A3-7A04-FA40-9A7F-839471DF239C}"/>
+              </a:ext>
+            </a:extLst>
+          </p:cNvPr>
+          <p:cNvSpPr txBox="1"/>
+          <p:nvPr/>
+        </p:nvSpPr>
+        <p:spPr>
+          <a:xfrm>
+            <a:off x="402770" y="3230126"/>
+            <a:ext cx="4223657" cy="738664"/>
+          </a:xfrm>
+          <a:prstGeom prst="rect">
+            <a:avLst/>
+          </a:prstGeom>
+          <a:noFill/>
+        </p:spPr>
+        <p:txBody>
+          <a:bodyPr wrap="square" rtlCol="0">
+            <a:spAutoFit/>
+          </a:bodyPr>
+          <a:lstStyle/>
+          <a:p>
+            <a:r>
+              <a:rPr lang="en-BR" sz="1400" b="1" dirty="0"/>
+              <a:t>CALL 3 – RETIRA PALLET INCOMPLETO</a:t>
+            </a:r>
+          </a:p>
+          <a:p>
+            <a:endParaRPr lang="en-BR" sz="1400" b="1" dirty="0"/>
+          </a:p>
+          <a:p>
+            <a:r>
+              <a:rPr lang="en-BR" sz="1400" b="1" dirty="0"/>
+              <a:t>XXX </a:t>
+            </a:r>
+          </a:p>
+        </p:txBody>
+      </p:sp>
+      <p:sp>
+        <p:nvSpPr>
+          <p:cNvPr id="4" name="TextBox 3">
+            <a:extLst>
+              <a:ext uri="{FF2B5EF4-FFF2-40B4-BE49-F238E27FC236}">
+                <a16:creationId xmlns:a16="http://schemas.microsoft.com/office/drawing/2014/main" id="{BC959D6E-5F38-DA40-A0E8-AE776729CE52}"/>
+              </a:ext>
+            </a:extLst>
+          </p:cNvPr>
+          <p:cNvSpPr txBox="1"/>
+          <p:nvPr/>
+        </p:nvSpPr>
+        <p:spPr>
+          <a:xfrm>
+            <a:off x="5321480" y="703858"/>
+            <a:ext cx="4931230" cy="1169551"/>
+          </a:xfrm>
+          <a:prstGeom prst="rect">
+            <a:avLst/>
+          </a:prstGeom>
+          <a:noFill/>
+        </p:spPr>
+        <p:txBody>
+          <a:bodyPr wrap="square" rtlCol="0">
+            <a:spAutoFit/>
+          </a:bodyPr>
+          <a:lstStyle/>
+          <a:p>
+            <a:r>
+              <a:rPr lang="en-BR" sz="1400" b="1" dirty="0"/>
+              <a:t>CALL 2 – RETIRA PALLET INCOMPLETO</a:t>
+            </a:r>
+          </a:p>
+          <a:p>
+            <a:endParaRPr lang="en-BR" sz="1400" b="1" dirty="0"/>
+          </a:p>
+          <a:p>
+            <a:r>
+              <a:rPr lang="en-BR" sz="1400" b="1" dirty="0"/>
+              <a:t>1 – CARREGA palete INcompleto.</a:t>
+            </a:r>
+          </a:p>
+          <a:p>
+            <a:r>
+              <a:rPr lang="en-BR" sz="1400" b="1" dirty="0"/>
+              <a:t>2 – DESCARREGA palete cheio no BUFFER INCOMPLETOS (fila unica, desconsidera sku)</a:t>
+            </a:r>
+          </a:p>
+        </p:txBody>
+      </p:sp>
+      <p:sp>
+        <p:nvSpPr>
+          <p:cNvPr id="6" name="Rectangle 5">
+            <a:extLst>
+              <a:ext uri="{FF2B5EF4-FFF2-40B4-BE49-F238E27FC236}">
+                <a16:creationId xmlns:a16="http://schemas.microsoft.com/office/drawing/2014/main" id="{9EF526F7-6B28-354A-B8C8-3DE175E08A36}"/>
+              </a:ext>
+            </a:extLst>
+          </p:cNvPr>
+          <p:cNvSpPr/>
+          <p:nvPr/>
+        </p:nvSpPr>
+        <p:spPr>
+          <a:xfrm>
+            <a:off x="437716" y="4115205"/>
+            <a:ext cx="4402487" cy="646331"/>
+          </a:xfrm>
+          <a:prstGeom prst="rect">
+            <a:avLst/>
+          </a:prstGeom>
+        </p:spPr>
+        <p:txBody>
+          <a:bodyPr wrap="none">
+            <a:spAutoFit/>
+          </a:bodyPr>
+          <a:lstStyle/>
+          <a:p>
+            <a:r>
+              <a:rPr lang="pt-BR" dirty="0">
+                <a:highlight>
+                  <a:srgbClr val="FFFF00"/>
+                </a:highlight>
+              </a:rPr>
+              <a:t>Incompletos: pode colocar </a:t>
+            </a:r>
+            <a:r>
+              <a:rPr lang="pt-BR" dirty="0" err="1">
+                <a:highlight>
+                  <a:srgbClr val="FFFF00"/>
+                </a:highlight>
+              </a:rPr>
+              <a:t>skus</a:t>
+            </a:r>
+            <a:r>
+              <a:rPr lang="pt-BR" dirty="0">
+                <a:highlight>
+                  <a:srgbClr val="FFFF00"/>
+                </a:highlight>
+              </a:rPr>
+              <a:t> misturado, </a:t>
+            </a:r>
+          </a:p>
+          <a:p>
+            <a:r>
+              <a:rPr lang="pt-BR" dirty="0">
+                <a:highlight>
+                  <a:srgbClr val="FFFF00"/>
+                </a:highlight>
+              </a:rPr>
+              <a:t>deste modo, impossível esta implementação.</a:t>
+            </a:r>
+            <a:endParaRPr lang="en-BR" dirty="0"/>
+          </a:p>
+        </p:txBody>
+      </p:sp>
+    </p:spTree>
+    <p:extLst>
+      <p:ext uri="{BB962C8B-B14F-4D97-AF65-F5344CB8AC3E}">
+        <p14:creationId xmlns:p14="http://schemas.microsoft.com/office/powerpoint/2010/main" val="863466622"/>
+      </p:ext>
+    </p:extLst>
+  </p:cSld>
+  <p:clrMapOvr>
+    <a:masterClrMapping/>
+  </p:clrMapOvr>
+</p:sld>
+</file>
+
+<file path=ppt/slides/slide7.xml><?xml version="1.0" encoding="utf-8"?>
+<p:sld xmlns:a="http://schemas.openxmlformats.org/drawingml/2006/main" xmlns:r="http://schemas.openxmlformats.org/officeDocument/2006/relationships" xmlns:p="http://schemas.openxmlformats.org/presentationml/2006/main">
+  <p:cSld>
+    <p:spTree>
+      <p:nvGrpSpPr>
+        <p:cNvPr id="1" name=""/>
+        <p:cNvGrpSpPr/>
+        <p:nvPr/>
+      </p:nvGrpSpPr>
+      <p:grpSpPr>
+        <a:xfrm>
+          <a:off x="0" y="0"/>
+          <a:ext cx="0" cy="0"/>
+          <a:chOff x="0" y="0"/>
+          <a:chExt cx="0" cy="0"/>
+        </a:xfrm>
+      </p:grpSpPr>
+      <p:sp>
+        <p:nvSpPr>
+          <p:cNvPr id="2" name="TextBox 1">
+            <a:extLst>
+              <a:ext uri="{FF2B5EF4-FFF2-40B4-BE49-F238E27FC236}">
+                <a16:creationId xmlns:a16="http://schemas.microsoft.com/office/drawing/2014/main" id="{A3472355-9901-AF4B-8744-CC51F1ACA6A8}"/>
+              </a:ext>
+            </a:extLst>
+          </p:cNvPr>
+          <p:cNvSpPr txBox="1"/>
+          <p:nvPr/>
+        </p:nvSpPr>
+        <p:spPr>
+          <a:xfrm>
+            <a:off x="595086" y="544285"/>
+            <a:ext cx="2980111" cy="584775"/>
+          </a:xfrm>
+          <a:prstGeom prst="rect">
+            <a:avLst/>
+          </a:prstGeom>
+          <a:noFill/>
+        </p:spPr>
+        <p:txBody>
+          <a:bodyPr wrap="none" rtlCol="0">
+            <a:spAutoFit/>
+          </a:bodyPr>
+          <a:lstStyle/>
+          <a:p>
+            <a:r>
+              <a:rPr lang="en-BR" sz="3200" b="1" dirty="0"/>
+              <a:t>AREA D - SPIDER</a:t>
+            </a:r>
+          </a:p>
+        </p:txBody>
+      </p:sp>
+      <p:pic>
+        <p:nvPicPr>
+          <p:cNvPr id="3" name="Imagem 4" descr="Diagrama&#10;&#10;Descrição gerada automaticamente">
+            <a:extLst>
+              <a:ext uri="{FF2B5EF4-FFF2-40B4-BE49-F238E27FC236}">
+                <a16:creationId xmlns:a16="http://schemas.microsoft.com/office/drawing/2014/main" id="{1346828A-9F6D-BA4F-9746-D9460E434FCA}"/>
+              </a:ext>
+            </a:extLst>
+          </p:cNvPr>
+          <p:cNvPicPr/>
+          <p:nvPr/>
+        </p:nvPicPr>
+        <p:blipFill rotWithShape="1">
+          <a:blip r:embed="rId2">
+            <a:extLst>
+              <a:ext uri="{28A0092B-C50C-407E-A947-70E740481C1C}">
+                <a14:useLocalDpi xmlns:a14="http://schemas.microsoft.com/office/drawing/2010/main" val="0"/>
+              </a:ext>
+            </a:extLst>
+          </a:blip>
+          <a:srcRect l="47326"/>
+          <a:stretch/>
+        </p:blipFill>
+        <p:spPr bwMode="auto">
+          <a:xfrm>
+            <a:off x="7304442" y="1902916"/>
+            <a:ext cx="2825675" cy="3261360"/>
+          </a:xfrm>
+          <a:prstGeom prst="rect">
+            <a:avLst/>
+          </a:prstGeom>
+          <a:noFill/>
+          <a:ln>
+            <a:noFill/>
+          </a:ln>
+        </p:spPr>
+      </p:pic>
+      <p:sp>
+        <p:nvSpPr>
+          <p:cNvPr id="4" name="Rectangle 3">
+            <a:extLst>
+              <a:ext uri="{FF2B5EF4-FFF2-40B4-BE49-F238E27FC236}">
+                <a16:creationId xmlns:a16="http://schemas.microsoft.com/office/drawing/2014/main" id="{147033F2-F93A-8C4E-BBFC-398C9D60D07F}"/>
+              </a:ext>
+            </a:extLst>
+          </p:cNvPr>
+          <p:cNvSpPr/>
+          <p:nvPr/>
+        </p:nvSpPr>
+        <p:spPr>
+          <a:xfrm>
+            <a:off x="1902297" y="2794932"/>
+            <a:ext cx="3345799" cy="1477328"/>
+          </a:xfrm>
+          <a:prstGeom prst="rect">
+            <a:avLst/>
+          </a:prstGeom>
+        </p:spPr>
+        <p:txBody>
+          <a:bodyPr wrap="square">
+            <a:spAutoFit/>
+          </a:bodyPr>
+          <a:lstStyle/>
+          <a:p>
+            <a:r>
+              <a:rPr lang="pt-BR" dirty="0"/>
+              <a:t>Nessa maquina a entrada de material é manual por empilhadeira. Apenas Sai produtos enrolados em </a:t>
+            </a:r>
+            <a:r>
+              <a:rPr lang="pt-BR" dirty="0" err="1"/>
+              <a:t>palletes</a:t>
+            </a:r>
+            <a:r>
+              <a:rPr lang="pt-BR" dirty="0"/>
+              <a:t>  em SPIDER.</a:t>
+            </a:r>
+            <a:endParaRPr lang="en-BR" dirty="0"/>
+          </a:p>
+        </p:txBody>
+      </p:sp>
+      <p:pic>
+        <p:nvPicPr>
+          <p:cNvPr id="5" name="Picture 4">
+            <a:extLst>
+              <a:ext uri="{FF2B5EF4-FFF2-40B4-BE49-F238E27FC236}">
+                <a16:creationId xmlns:a16="http://schemas.microsoft.com/office/drawing/2014/main" id="{01B878B7-4BC0-0141-AD8E-B8481FB6C78B}"/>
+              </a:ext>
+            </a:extLst>
+          </p:cNvPr>
+          <p:cNvPicPr>
+            <a:picLocks noChangeAspect="1"/>
+          </p:cNvPicPr>
+          <p:nvPr/>
+        </p:nvPicPr>
+        <p:blipFill>
+          <a:blip r:embed="rId3"/>
+          <a:stretch>
+            <a:fillRect/>
+          </a:stretch>
+        </p:blipFill>
+        <p:spPr>
+          <a:xfrm>
+            <a:off x="5501042" y="328960"/>
+            <a:ext cx="1803400" cy="1600200"/>
+          </a:xfrm>
+          <a:prstGeom prst="rect">
+            <a:avLst/>
+          </a:prstGeom>
+        </p:spPr>
+      </p:pic>
+    </p:spTree>
+    <p:extLst>
+      <p:ext uri="{BB962C8B-B14F-4D97-AF65-F5344CB8AC3E}">
+        <p14:creationId xmlns:p14="http://schemas.microsoft.com/office/powerpoint/2010/main" val="2166582890"/>
+      </p:ext>
+    </p:extLst>
+  </p:cSld>
+  <p:clrMapOvr>
+    <a:masterClrMapping/>
+  </p:clrMapOvr>
+</p:sld>
+</file>
+
+<file path=ppt/slides/slide8.xml><?xml version="1.0" encoding="utf-8"?>
+<p:sld xmlns:a="http://schemas.openxmlformats.org/drawingml/2006/main" xmlns:r="http://schemas.openxmlformats.org/officeDocument/2006/relationships" xmlns:p="http://schemas.openxmlformats.org/presentationml/2006/main">
+  <p:cSld>
+    <p:spTree>
+      <p:nvGrpSpPr>
+        <p:cNvPr id="1" name=""/>
+        <p:cNvGrpSpPr/>
+        <p:nvPr/>
+      </p:nvGrpSpPr>
+      <p:grpSpPr>
+        <a:xfrm>
+          <a:off x="0" y="0"/>
+          <a:ext cx="0" cy="0"/>
+          <a:chOff x="0" y="0"/>
+          <a:chExt cx="0" cy="0"/>
+        </a:xfrm>
+      </p:grpSpPr>
+      <p:sp>
+        <p:nvSpPr>
+          <p:cNvPr id="2" name="TextBox 1">
+            <a:extLst>
+              <a:ext uri="{FF2B5EF4-FFF2-40B4-BE49-F238E27FC236}">
+                <a16:creationId xmlns:a16="http://schemas.microsoft.com/office/drawing/2014/main" id="{269A2356-F197-3240-903F-C582753EBC25}"/>
+              </a:ext>
+            </a:extLst>
+          </p:cNvPr>
+          <p:cNvSpPr txBox="1"/>
+          <p:nvPr/>
+        </p:nvSpPr>
+        <p:spPr>
+          <a:xfrm>
+            <a:off x="402770" y="703858"/>
+            <a:ext cx="4223657" cy="954107"/>
+          </a:xfrm>
+          <a:prstGeom prst="rect">
+            <a:avLst/>
+          </a:prstGeom>
+          <a:noFill/>
+        </p:spPr>
+        <p:txBody>
+          <a:bodyPr wrap="square" rtlCol="0">
+            <a:spAutoFit/>
+          </a:bodyPr>
+          <a:lstStyle/>
+          <a:p>
+            <a:r>
+              <a:rPr lang="en-BR" sz="1400" b="1" dirty="0"/>
+              <a:t>CALL 1 – RETIRA PALLET CHEIO</a:t>
+            </a:r>
+          </a:p>
+          <a:p>
+            <a:endParaRPr lang="en-BR" sz="1400" b="1" dirty="0"/>
+          </a:p>
+          <a:p>
+            <a:r>
+              <a:rPr lang="en-BR" sz="1400" b="1" dirty="0"/>
+              <a:t>1 – CARREGA palete cheio.</a:t>
+            </a:r>
+          </a:p>
+          <a:p>
+            <a:r>
+              <a:rPr lang="en-BR" sz="1400" b="1" dirty="0"/>
+              <a:t>2 – DESCARREGA palete cheio no BUFFER CHEIOS</a:t>
+            </a:r>
+          </a:p>
+        </p:txBody>
+      </p:sp>
+      <p:sp>
+        <p:nvSpPr>
+          <p:cNvPr id="3" name="TextBox 2">
+            <a:extLst>
+              <a:ext uri="{FF2B5EF4-FFF2-40B4-BE49-F238E27FC236}">
+                <a16:creationId xmlns:a16="http://schemas.microsoft.com/office/drawing/2014/main" id="{288F55AC-C5F8-9347-A272-1FDF814644AA}"/>
+              </a:ext>
+            </a:extLst>
+          </p:cNvPr>
+          <p:cNvSpPr txBox="1"/>
+          <p:nvPr/>
+        </p:nvSpPr>
+        <p:spPr>
+          <a:xfrm>
+            <a:off x="402770" y="3230126"/>
+            <a:ext cx="4223657" cy="738664"/>
+          </a:xfrm>
+          <a:prstGeom prst="rect">
+            <a:avLst/>
+          </a:prstGeom>
+          <a:noFill/>
+        </p:spPr>
+        <p:txBody>
+          <a:bodyPr wrap="square" rtlCol="0">
+            <a:spAutoFit/>
+          </a:bodyPr>
+          <a:lstStyle/>
+          <a:p>
+            <a:r>
+              <a:rPr lang="en-BR" sz="1400" b="1" dirty="0"/>
+              <a:t>CALL 3 – RETIRA PALLET INCOMPLETO</a:t>
+            </a:r>
+          </a:p>
+          <a:p>
+            <a:endParaRPr lang="en-BR" sz="1400" b="1" dirty="0"/>
+          </a:p>
+          <a:p>
+            <a:r>
+              <a:rPr lang="en-BR" sz="1400" b="1" dirty="0"/>
+              <a:t>1 – xxx </a:t>
+            </a:r>
+          </a:p>
+        </p:txBody>
+      </p:sp>
+      <p:sp>
+        <p:nvSpPr>
+          <p:cNvPr id="4" name="TextBox 3">
+            <a:extLst>
+              <a:ext uri="{FF2B5EF4-FFF2-40B4-BE49-F238E27FC236}">
+                <a16:creationId xmlns:a16="http://schemas.microsoft.com/office/drawing/2014/main" id="{8B25F24F-2EDD-A841-B082-C4BB725C1316}"/>
+              </a:ext>
+            </a:extLst>
+          </p:cNvPr>
+          <p:cNvSpPr txBox="1"/>
+          <p:nvPr/>
+        </p:nvSpPr>
+        <p:spPr>
+          <a:xfrm>
+            <a:off x="5321480" y="703858"/>
+            <a:ext cx="4931230" cy="1169551"/>
+          </a:xfrm>
+          <a:prstGeom prst="rect">
+            <a:avLst/>
+          </a:prstGeom>
+          <a:noFill/>
+        </p:spPr>
+        <p:txBody>
+          <a:bodyPr wrap="square" rtlCol="0">
+            <a:spAutoFit/>
+          </a:bodyPr>
+          <a:lstStyle/>
+          <a:p>
+            <a:r>
+              <a:rPr lang="en-BR" sz="1400" b="1" dirty="0"/>
+              <a:t>CALL 2 – RETIRA PALLET COMPLETO</a:t>
+            </a:r>
+          </a:p>
+          <a:p>
+            <a:endParaRPr lang="en-BR" sz="1400" b="1" dirty="0"/>
+          </a:p>
+          <a:p>
+            <a:r>
+              <a:rPr lang="en-BR" sz="1400" b="1" dirty="0"/>
+              <a:t>1 – CARREGA palete INcompleto.</a:t>
+            </a:r>
+          </a:p>
+          <a:p>
+            <a:r>
+              <a:rPr lang="en-BR" sz="1400" b="1" dirty="0"/>
+              <a:t>2 – DESCARREGA palete cheio no BUFFER INCOMPLETOS (fila unica, desconsidera sku)</a:t>
+            </a:r>
+          </a:p>
+        </p:txBody>
+      </p:sp>
+      <p:sp>
+        <p:nvSpPr>
+          <p:cNvPr id="5" name="Rectangle 4">
+            <a:extLst>
+              <a:ext uri="{FF2B5EF4-FFF2-40B4-BE49-F238E27FC236}">
+                <a16:creationId xmlns:a16="http://schemas.microsoft.com/office/drawing/2014/main" id="{EE465442-4FCE-C54A-8AF9-372F2FC29677}"/>
+              </a:ext>
+            </a:extLst>
+          </p:cNvPr>
+          <p:cNvSpPr/>
+          <p:nvPr/>
+        </p:nvSpPr>
+        <p:spPr>
+          <a:xfrm>
+            <a:off x="437716" y="4115205"/>
+            <a:ext cx="4402487" cy="646331"/>
+          </a:xfrm>
+          <a:prstGeom prst="rect">
+            <a:avLst/>
+          </a:prstGeom>
+        </p:spPr>
+        <p:txBody>
+          <a:bodyPr wrap="none">
+            <a:spAutoFit/>
+          </a:bodyPr>
+          <a:lstStyle/>
+          <a:p>
+            <a:r>
+              <a:rPr lang="pt-BR" dirty="0">
+                <a:highlight>
+                  <a:srgbClr val="FFFF00"/>
+                </a:highlight>
+              </a:rPr>
+              <a:t>Incompletos: pode colocar </a:t>
+            </a:r>
+            <a:r>
+              <a:rPr lang="pt-BR" dirty="0" err="1">
+                <a:highlight>
+                  <a:srgbClr val="FFFF00"/>
+                </a:highlight>
+              </a:rPr>
+              <a:t>skus</a:t>
+            </a:r>
+            <a:r>
+              <a:rPr lang="pt-BR" dirty="0">
+                <a:highlight>
+                  <a:srgbClr val="FFFF00"/>
+                </a:highlight>
+              </a:rPr>
+              <a:t> misturado, </a:t>
+            </a:r>
+          </a:p>
+          <a:p>
+            <a:r>
+              <a:rPr lang="pt-BR" dirty="0">
+                <a:highlight>
+                  <a:srgbClr val="FFFF00"/>
+                </a:highlight>
+              </a:rPr>
+              <a:t>deste modo, impossível esta implementação.</a:t>
+            </a:r>
+            <a:endParaRPr lang="en-BR" dirty="0"/>
+          </a:p>
+        </p:txBody>
+      </p:sp>
+    </p:spTree>
+    <p:extLst>
+      <p:ext uri="{BB962C8B-B14F-4D97-AF65-F5344CB8AC3E}">
+        <p14:creationId xmlns:p14="http://schemas.microsoft.com/office/powerpoint/2010/main" val="2674198438"/>
+      </p:ext>
+    </p:extLst>
+  </p:cSld>
+  <p:clrMapOvr>
+    <a:masterClrMapping/>
+  </p:clrMapOvr>
+</p:sld>
+</file>
+
+<file path=ppt/slides/slide9.xml><?xml version="1.0" encoding="utf-8"?>
+<p:sld xmlns:a="http://schemas.openxmlformats.org/drawingml/2006/main" xmlns:r="http://schemas.openxmlformats.org/officeDocument/2006/relationships" xmlns:p="http://schemas.openxmlformats.org/presentationml/2006/main">
+  <p:cSld>
+    <p:spTree>
+      <p:nvGrpSpPr>
+        <p:cNvPr id="1" name=""/>
+        <p:cNvGrpSpPr/>
+        <p:nvPr/>
+      </p:nvGrpSpPr>
+      <p:grpSpPr>
+        <a:xfrm>
+          <a:off x="0" y="0"/>
+          <a:ext cx="0" cy="0"/>
+          <a:chOff x="0" y="0"/>
+          <a:chExt cx="0" cy="0"/>
+        </a:xfrm>
+      </p:grpSpPr>
+      <p:sp>
+        <p:nvSpPr>
+          <p:cNvPr id="2" name="TextBox 1">
+            <a:extLst>
+              <a:ext uri="{FF2B5EF4-FFF2-40B4-BE49-F238E27FC236}">
+                <a16:creationId xmlns:a16="http://schemas.microsoft.com/office/drawing/2014/main" id="{A3472355-9901-AF4B-8744-CC51F1ACA6A8}"/>
+              </a:ext>
+            </a:extLst>
+          </p:cNvPr>
+          <p:cNvSpPr txBox="1"/>
+          <p:nvPr/>
+        </p:nvSpPr>
+        <p:spPr>
+          <a:xfrm>
+            <a:off x="595086" y="544285"/>
+            <a:ext cx="3304687" cy="584775"/>
+          </a:xfrm>
+          <a:prstGeom prst="rect">
+            <a:avLst/>
+          </a:prstGeom>
+          <a:noFill/>
+        </p:spPr>
+        <p:txBody>
+          <a:bodyPr wrap="none" rtlCol="0">
+            <a:spAutoFit/>
+          </a:bodyPr>
+          <a:lstStyle/>
+          <a:p>
+            <a:r>
+              <a:rPr lang="en-BR" sz="3200" b="1" dirty="0"/>
+              <a:t>AREA E – BARRICA</a:t>
+            </a:r>
+          </a:p>
+        </p:txBody>
+      </p:sp>
+      <p:pic>
+        <p:nvPicPr>
+          <p:cNvPr id="4" name="Picture 3">
+            <a:extLst>
+              <a:ext uri="{FF2B5EF4-FFF2-40B4-BE49-F238E27FC236}">
+                <a16:creationId xmlns:a16="http://schemas.microsoft.com/office/drawing/2014/main" id="{9811E48C-204B-4C4E-BC3E-C1AA2CAA80D1}"/>
+              </a:ext>
+            </a:extLst>
+          </p:cNvPr>
+          <p:cNvPicPr>
+            <a:picLocks noChangeAspect="1"/>
+          </p:cNvPicPr>
+          <p:nvPr/>
+        </p:nvPicPr>
+        <p:blipFill>
+          <a:blip r:embed="rId2"/>
+          <a:stretch>
+            <a:fillRect/>
+          </a:stretch>
+        </p:blipFill>
+        <p:spPr>
+          <a:xfrm>
+            <a:off x="4373160" y="1383458"/>
+            <a:ext cx="4635500" cy="5016500"/>
+          </a:xfrm>
+          <a:prstGeom prst="rect">
+            <a:avLst/>
+          </a:prstGeom>
+        </p:spPr>
+      </p:pic>
+      <p:sp>
+        <p:nvSpPr>
+          <p:cNvPr id="3" name="TextBox 2">
+            <a:extLst>
+              <a:ext uri="{FF2B5EF4-FFF2-40B4-BE49-F238E27FC236}">
+                <a16:creationId xmlns:a16="http://schemas.microsoft.com/office/drawing/2014/main" id="{991AC24C-653D-5E45-8BEE-7EA643F8C79D}"/>
+              </a:ext>
+            </a:extLst>
+          </p:cNvPr>
+          <p:cNvSpPr txBox="1"/>
+          <p:nvPr/>
+        </p:nvSpPr>
+        <p:spPr>
+          <a:xfrm>
+            <a:off x="5896123" y="1490620"/>
+            <a:ext cx="2427781" cy="369332"/>
+          </a:xfrm>
+          <a:prstGeom prst="rect">
+            <a:avLst/>
+          </a:prstGeom>
+          <a:noFill/>
+        </p:spPr>
+        <p:txBody>
+          <a:bodyPr wrap="none" rtlCol="0">
+            <a:spAutoFit/>
+          </a:bodyPr>
+          <a:lstStyle/>
+          <a:p>
+            <a:r>
+              <a:rPr lang="en-US" dirty="0"/>
+              <a:t>E</a:t>
+            </a:r>
+            <a:r>
+              <a:rPr lang="en-BR" dirty="0"/>
+              <a:t>ntrada carreteis cheios</a:t>
+            </a:r>
+          </a:p>
+        </p:txBody>
+      </p:sp>
+      <p:sp>
+        <p:nvSpPr>
+          <p:cNvPr id="5" name="TextBox 4">
+            <a:extLst>
+              <a:ext uri="{FF2B5EF4-FFF2-40B4-BE49-F238E27FC236}">
+                <a16:creationId xmlns:a16="http://schemas.microsoft.com/office/drawing/2014/main" id="{AE62DE9A-7462-B846-8403-C100E7731E67}"/>
+              </a:ext>
+            </a:extLst>
+          </p:cNvPr>
+          <p:cNvSpPr txBox="1"/>
+          <p:nvPr/>
+        </p:nvSpPr>
+        <p:spPr>
+          <a:xfrm>
+            <a:off x="5973933" y="3152001"/>
+            <a:ext cx="2272160" cy="369332"/>
+          </a:xfrm>
+          <a:prstGeom prst="rect">
+            <a:avLst/>
+          </a:prstGeom>
+          <a:noFill/>
+        </p:spPr>
+        <p:txBody>
+          <a:bodyPr wrap="none" rtlCol="0">
+            <a:spAutoFit/>
+          </a:bodyPr>
+          <a:lstStyle/>
+          <a:p>
+            <a:r>
+              <a:rPr lang="pt-BR" dirty="0"/>
+              <a:t>Retirada carretel vazio</a:t>
+            </a:r>
+            <a:endParaRPr lang="en-BR" dirty="0"/>
+          </a:p>
+        </p:txBody>
+      </p:sp>
+      <p:sp>
+        <p:nvSpPr>
+          <p:cNvPr id="6" name="TextBox 5">
+            <a:extLst>
+              <a:ext uri="{FF2B5EF4-FFF2-40B4-BE49-F238E27FC236}">
+                <a16:creationId xmlns:a16="http://schemas.microsoft.com/office/drawing/2014/main" id="{80A7945C-2ABF-384C-9FB9-CDBE46D449DC}"/>
+              </a:ext>
+            </a:extLst>
+          </p:cNvPr>
+          <p:cNvSpPr txBox="1"/>
+          <p:nvPr/>
+        </p:nvSpPr>
+        <p:spPr>
+          <a:xfrm>
+            <a:off x="5666548" y="4813382"/>
+            <a:ext cx="2173095" cy="369332"/>
+          </a:xfrm>
+          <a:prstGeom prst="rect">
+            <a:avLst/>
+          </a:prstGeom>
+          <a:noFill/>
+        </p:spPr>
+        <p:txBody>
+          <a:bodyPr wrap="none" rtlCol="0">
+            <a:spAutoFit/>
+          </a:bodyPr>
+          <a:lstStyle/>
+          <a:p>
+            <a:r>
+              <a:rPr lang="pt-BR" dirty="0"/>
+              <a:t>Retirada </a:t>
+            </a:r>
+            <a:r>
+              <a:rPr lang="pt-BR" dirty="0" err="1"/>
+              <a:t>palete</a:t>
+            </a:r>
+            <a:r>
+              <a:rPr lang="pt-BR" dirty="0"/>
+              <a:t> cheio</a:t>
+            </a:r>
+            <a:endParaRPr lang="en-BR" dirty="0"/>
+          </a:p>
+        </p:txBody>
+      </p:sp>
+      <p:pic>
+        <p:nvPicPr>
+          <p:cNvPr id="7" name="Picture 6">
+            <a:extLst>
+              <a:ext uri="{FF2B5EF4-FFF2-40B4-BE49-F238E27FC236}">
+                <a16:creationId xmlns:a16="http://schemas.microsoft.com/office/drawing/2014/main" id="{147A1232-91E7-5749-8624-370DE52C147F}"/>
+              </a:ext>
+            </a:extLst>
+          </p:cNvPr>
+          <p:cNvPicPr>
+            <a:picLocks noChangeAspect="1"/>
+          </p:cNvPicPr>
+          <p:nvPr/>
+        </p:nvPicPr>
+        <p:blipFill>
+          <a:blip r:embed="rId3"/>
+          <a:stretch>
+            <a:fillRect/>
+          </a:stretch>
+        </p:blipFill>
+        <p:spPr>
+          <a:xfrm>
+            <a:off x="1883960" y="1516808"/>
+            <a:ext cx="2489200" cy="2374900"/>
+          </a:xfrm>
+          <a:prstGeom prst="rect">
+            <a:avLst/>
+          </a:prstGeom>
+        </p:spPr>
+      </p:pic>
+    </p:spTree>
+    <p:extLst>
+      <p:ext uri="{BB962C8B-B14F-4D97-AF65-F5344CB8AC3E}">
+        <p14:creationId xmlns:p14="http://schemas.microsoft.com/office/powerpoint/2010/main" val="508712725"/>
       </p:ext>
     </p:extLst>
   </p:cSld>

</xml_diff>

<commit_message>
processos embalagem e expedição finalizados. Precisa testar.
</commit_message>
<xml_diff>
--- a/docs/PROCESSO DETALHADO FABIO.pptx
+++ b/docs/PROCESSO DETALHADO FABIO.pptx
@@ -153,7 +153,7 @@
           <p:cNvPr id="2" name="Title 1">
             <a:extLst>
               <a:ext uri="{FF2B5EF4-FFF2-40B4-BE49-F238E27FC236}">
-                <a16:creationId xmlns:a16="http://schemas.microsoft.com/office/drawing/2014/main" xmlns="" id="{194361C4-2E92-7246-A6C9-2C8439EB8377}"/>
+                <a16:creationId xmlns:a16="http://schemas.microsoft.com/office/drawing/2014/main" id="{194361C4-2E92-7246-A6C9-2C8439EB8377}"/>
               </a:ext>
             </a:extLst>
           </p:cNvPr>
@@ -191,7 +191,7 @@
           <p:cNvPr id="3" name="Subtitle 2">
             <a:extLst>
               <a:ext uri="{FF2B5EF4-FFF2-40B4-BE49-F238E27FC236}">
-                <a16:creationId xmlns:a16="http://schemas.microsoft.com/office/drawing/2014/main" xmlns="" id="{E6F07600-F5C6-1F4C-BA91-1A49A1C67B39}"/>
+                <a16:creationId xmlns:a16="http://schemas.microsoft.com/office/drawing/2014/main" id="{E6F07600-F5C6-1F4C-BA91-1A49A1C67B39}"/>
               </a:ext>
             </a:extLst>
           </p:cNvPr>
@@ -262,7 +262,7 @@
           <p:cNvPr id="4" name="Date Placeholder 3">
             <a:extLst>
               <a:ext uri="{FF2B5EF4-FFF2-40B4-BE49-F238E27FC236}">
-                <a16:creationId xmlns:a16="http://schemas.microsoft.com/office/drawing/2014/main" xmlns="" id="{5897B228-38EA-7C40-84E9-3DBF8A069A77}"/>
+                <a16:creationId xmlns:a16="http://schemas.microsoft.com/office/drawing/2014/main" id="{5897B228-38EA-7C40-84E9-3DBF8A069A77}"/>
               </a:ext>
             </a:extLst>
           </p:cNvPr>
@@ -280,7 +280,7 @@
           <a:p>
             <a:fld id="{31610600-DFD7-DD4B-8A38-5782773CE7CB}" type="datetimeFigureOut">
               <a:rPr lang="x-none" smtClean="0"/>
-              <a:t>02/10/2024</a:t>
+              <a:t>03/10/24</a:t>
             </a:fld>
             <a:endParaRPr lang="x-none"/>
           </a:p>
@@ -291,7 +291,7 @@
           <p:cNvPr id="5" name="Footer Placeholder 4">
             <a:extLst>
               <a:ext uri="{FF2B5EF4-FFF2-40B4-BE49-F238E27FC236}">
-                <a16:creationId xmlns:a16="http://schemas.microsoft.com/office/drawing/2014/main" xmlns="" id="{2607749B-1CD3-9846-B778-27C2466C9CEC}"/>
+                <a16:creationId xmlns:a16="http://schemas.microsoft.com/office/drawing/2014/main" id="{2607749B-1CD3-9846-B778-27C2466C9CEC}"/>
               </a:ext>
             </a:extLst>
           </p:cNvPr>
@@ -316,7 +316,7 @@
           <p:cNvPr id="6" name="Slide Number Placeholder 5">
             <a:extLst>
               <a:ext uri="{FF2B5EF4-FFF2-40B4-BE49-F238E27FC236}">
-                <a16:creationId xmlns:a16="http://schemas.microsoft.com/office/drawing/2014/main" xmlns="" id="{E9E60C2C-96BC-A74A-B29D-B61270E873BB}"/>
+                <a16:creationId xmlns:a16="http://schemas.microsoft.com/office/drawing/2014/main" id="{E9E60C2C-96BC-A74A-B29D-B61270E873BB}"/>
               </a:ext>
             </a:extLst>
           </p:cNvPr>
@@ -375,7 +375,7 @@
           <p:cNvPr id="2" name="Title 1">
             <a:extLst>
               <a:ext uri="{FF2B5EF4-FFF2-40B4-BE49-F238E27FC236}">
-                <a16:creationId xmlns:a16="http://schemas.microsoft.com/office/drawing/2014/main" xmlns="" id="{CEF28543-F67B-894C-BAEE-0B1D32CAA209}"/>
+                <a16:creationId xmlns:a16="http://schemas.microsoft.com/office/drawing/2014/main" id="{CEF28543-F67B-894C-BAEE-0B1D32CAA209}"/>
               </a:ext>
             </a:extLst>
           </p:cNvPr>
@@ -404,7 +404,7 @@
           <p:cNvPr id="3" name="Vertical Text Placeholder 2">
             <a:extLst>
               <a:ext uri="{FF2B5EF4-FFF2-40B4-BE49-F238E27FC236}">
-                <a16:creationId xmlns:a16="http://schemas.microsoft.com/office/drawing/2014/main" xmlns="" id="{EDBD71BB-906A-704A-8418-93A018B519AC}"/>
+                <a16:creationId xmlns:a16="http://schemas.microsoft.com/office/drawing/2014/main" id="{EDBD71BB-906A-704A-8418-93A018B519AC}"/>
               </a:ext>
             </a:extLst>
           </p:cNvPr>
@@ -462,7 +462,7 @@
           <p:cNvPr id="4" name="Date Placeholder 3">
             <a:extLst>
               <a:ext uri="{FF2B5EF4-FFF2-40B4-BE49-F238E27FC236}">
-                <a16:creationId xmlns:a16="http://schemas.microsoft.com/office/drawing/2014/main" xmlns="" id="{1498F9E9-9389-4E47-A83E-5F9B2708E6ED}"/>
+                <a16:creationId xmlns:a16="http://schemas.microsoft.com/office/drawing/2014/main" id="{1498F9E9-9389-4E47-A83E-5F9B2708E6ED}"/>
               </a:ext>
             </a:extLst>
           </p:cNvPr>
@@ -480,7 +480,7 @@
           <a:p>
             <a:fld id="{31610600-DFD7-DD4B-8A38-5782773CE7CB}" type="datetimeFigureOut">
               <a:rPr lang="x-none" smtClean="0"/>
-              <a:t>02/10/2024</a:t>
+              <a:t>03/10/24</a:t>
             </a:fld>
             <a:endParaRPr lang="x-none"/>
           </a:p>
@@ -491,7 +491,7 @@
           <p:cNvPr id="5" name="Footer Placeholder 4">
             <a:extLst>
               <a:ext uri="{FF2B5EF4-FFF2-40B4-BE49-F238E27FC236}">
-                <a16:creationId xmlns:a16="http://schemas.microsoft.com/office/drawing/2014/main" xmlns="" id="{0B3F9FEC-3437-D44A-A7BC-742CEF5A0E67}"/>
+                <a16:creationId xmlns:a16="http://schemas.microsoft.com/office/drawing/2014/main" id="{0B3F9FEC-3437-D44A-A7BC-742CEF5A0E67}"/>
               </a:ext>
             </a:extLst>
           </p:cNvPr>
@@ -516,7 +516,7 @@
           <p:cNvPr id="6" name="Slide Number Placeholder 5">
             <a:extLst>
               <a:ext uri="{FF2B5EF4-FFF2-40B4-BE49-F238E27FC236}">
-                <a16:creationId xmlns:a16="http://schemas.microsoft.com/office/drawing/2014/main" xmlns="" id="{1556175B-C187-9C45-95B1-1E69D6EF9F94}"/>
+                <a16:creationId xmlns:a16="http://schemas.microsoft.com/office/drawing/2014/main" id="{1556175B-C187-9C45-95B1-1E69D6EF9F94}"/>
               </a:ext>
             </a:extLst>
           </p:cNvPr>
@@ -575,7 +575,7 @@
           <p:cNvPr id="2" name="Vertical Title 1">
             <a:extLst>
               <a:ext uri="{FF2B5EF4-FFF2-40B4-BE49-F238E27FC236}">
-                <a16:creationId xmlns:a16="http://schemas.microsoft.com/office/drawing/2014/main" xmlns="" id="{1B378983-7355-354F-B289-F8FECDC11D5F}"/>
+                <a16:creationId xmlns:a16="http://schemas.microsoft.com/office/drawing/2014/main" id="{1B378983-7355-354F-B289-F8FECDC11D5F}"/>
               </a:ext>
             </a:extLst>
           </p:cNvPr>
@@ -609,7 +609,7 @@
           <p:cNvPr id="3" name="Vertical Text Placeholder 2">
             <a:extLst>
               <a:ext uri="{FF2B5EF4-FFF2-40B4-BE49-F238E27FC236}">
-                <a16:creationId xmlns:a16="http://schemas.microsoft.com/office/drawing/2014/main" xmlns="" id="{1D169F57-8765-754D-8DC9-4E044D50EC14}"/>
+                <a16:creationId xmlns:a16="http://schemas.microsoft.com/office/drawing/2014/main" id="{1D169F57-8765-754D-8DC9-4E044D50EC14}"/>
               </a:ext>
             </a:extLst>
           </p:cNvPr>
@@ -672,7 +672,7 @@
           <p:cNvPr id="4" name="Date Placeholder 3">
             <a:extLst>
               <a:ext uri="{FF2B5EF4-FFF2-40B4-BE49-F238E27FC236}">
-                <a16:creationId xmlns:a16="http://schemas.microsoft.com/office/drawing/2014/main" xmlns="" id="{3BC522F1-CACD-C84A-AFE1-9C6BB86970BE}"/>
+                <a16:creationId xmlns:a16="http://schemas.microsoft.com/office/drawing/2014/main" id="{3BC522F1-CACD-C84A-AFE1-9C6BB86970BE}"/>
               </a:ext>
             </a:extLst>
           </p:cNvPr>
@@ -690,7 +690,7 @@
           <a:p>
             <a:fld id="{31610600-DFD7-DD4B-8A38-5782773CE7CB}" type="datetimeFigureOut">
               <a:rPr lang="x-none" smtClean="0"/>
-              <a:t>02/10/2024</a:t>
+              <a:t>03/10/24</a:t>
             </a:fld>
             <a:endParaRPr lang="x-none"/>
           </a:p>
@@ -701,7 +701,7 @@
           <p:cNvPr id="5" name="Footer Placeholder 4">
             <a:extLst>
               <a:ext uri="{FF2B5EF4-FFF2-40B4-BE49-F238E27FC236}">
-                <a16:creationId xmlns:a16="http://schemas.microsoft.com/office/drawing/2014/main" xmlns="" id="{A06F5024-9CC6-444E-BD21-DF7E3E942E94}"/>
+                <a16:creationId xmlns:a16="http://schemas.microsoft.com/office/drawing/2014/main" id="{A06F5024-9CC6-444E-BD21-DF7E3E942E94}"/>
               </a:ext>
             </a:extLst>
           </p:cNvPr>
@@ -726,7 +726,7 @@
           <p:cNvPr id="6" name="Slide Number Placeholder 5">
             <a:extLst>
               <a:ext uri="{FF2B5EF4-FFF2-40B4-BE49-F238E27FC236}">
-                <a16:creationId xmlns:a16="http://schemas.microsoft.com/office/drawing/2014/main" xmlns="" id="{9D67432C-97D0-B34E-AA14-3D6419231A77}"/>
+                <a16:creationId xmlns:a16="http://schemas.microsoft.com/office/drawing/2014/main" id="{9D67432C-97D0-B34E-AA14-3D6419231A77}"/>
               </a:ext>
             </a:extLst>
           </p:cNvPr>
@@ -785,7 +785,7 @@
           <p:cNvPr id="2" name="Title 1">
             <a:extLst>
               <a:ext uri="{FF2B5EF4-FFF2-40B4-BE49-F238E27FC236}">
-                <a16:creationId xmlns:a16="http://schemas.microsoft.com/office/drawing/2014/main" xmlns="" id="{5F324485-D122-BB44-9B81-028F19031E26}"/>
+                <a16:creationId xmlns:a16="http://schemas.microsoft.com/office/drawing/2014/main" id="{5F324485-D122-BB44-9B81-028F19031E26}"/>
               </a:ext>
             </a:extLst>
           </p:cNvPr>
@@ -814,7 +814,7 @@
           <p:cNvPr id="3" name="Content Placeholder 2">
             <a:extLst>
               <a:ext uri="{FF2B5EF4-FFF2-40B4-BE49-F238E27FC236}">
-                <a16:creationId xmlns:a16="http://schemas.microsoft.com/office/drawing/2014/main" xmlns="" id="{1C364958-904A-2A48-8270-359EEC20673A}"/>
+                <a16:creationId xmlns:a16="http://schemas.microsoft.com/office/drawing/2014/main" id="{1C364958-904A-2A48-8270-359EEC20673A}"/>
               </a:ext>
             </a:extLst>
           </p:cNvPr>
@@ -872,7 +872,7 @@
           <p:cNvPr id="4" name="Date Placeholder 3">
             <a:extLst>
               <a:ext uri="{FF2B5EF4-FFF2-40B4-BE49-F238E27FC236}">
-                <a16:creationId xmlns:a16="http://schemas.microsoft.com/office/drawing/2014/main" xmlns="" id="{EAC52F93-4B39-764C-A124-6A3D90C8B81D}"/>
+                <a16:creationId xmlns:a16="http://schemas.microsoft.com/office/drawing/2014/main" id="{EAC52F93-4B39-764C-A124-6A3D90C8B81D}"/>
               </a:ext>
             </a:extLst>
           </p:cNvPr>
@@ -890,7 +890,7 @@
           <a:p>
             <a:fld id="{31610600-DFD7-DD4B-8A38-5782773CE7CB}" type="datetimeFigureOut">
               <a:rPr lang="x-none" smtClean="0"/>
-              <a:t>02/10/2024</a:t>
+              <a:t>03/10/24</a:t>
             </a:fld>
             <a:endParaRPr lang="x-none"/>
           </a:p>
@@ -901,7 +901,7 @@
           <p:cNvPr id="5" name="Footer Placeholder 4">
             <a:extLst>
               <a:ext uri="{FF2B5EF4-FFF2-40B4-BE49-F238E27FC236}">
-                <a16:creationId xmlns:a16="http://schemas.microsoft.com/office/drawing/2014/main" xmlns="" id="{9F3B02C0-8328-B246-849A-6BD7F0539E4D}"/>
+                <a16:creationId xmlns:a16="http://schemas.microsoft.com/office/drawing/2014/main" id="{9F3B02C0-8328-B246-849A-6BD7F0539E4D}"/>
               </a:ext>
             </a:extLst>
           </p:cNvPr>
@@ -926,7 +926,7 @@
           <p:cNvPr id="6" name="Slide Number Placeholder 5">
             <a:extLst>
               <a:ext uri="{FF2B5EF4-FFF2-40B4-BE49-F238E27FC236}">
-                <a16:creationId xmlns:a16="http://schemas.microsoft.com/office/drawing/2014/main" xmlns="" id="{2358CBAE-717A-2B42-AAC0-0C1E12F68401}"/>
+                <a16:creationId xmlns:a16="http://schemas.microsoft.com/office/drawing/2014/main" id="{2358CBAE-717A-2B42-AAC0-0C1E12F68401}"/>
               </a:ext>
             </a:extLst>
           </p:cNvPr>
@@ -985,7 +985,7 @@
           <p:cNvPr id="2" name="Title 1">
             <a:extLst>
               <a:ext uri="{FF2B5EF4-FFF2-40B4-BE49-F238E27FC236}">
-                <a16:creationId xmlns:a16="http://schemas.microsoft.com/office/drawing/2014/main" xmlns="" id="{9C54D763-18CA-2845-9534-C1B4D04686CA}"/>
+                <a16:creationId xmlns:a16="http://schemas.microsoft.com/office/drawing/2014/main" id="{9C54D763-18CA-2845-9534-C1B4D04686CA}"/>
               </a:ext>
             </a:extLst>
           </p:cNvPr>
@@ -1023,7 +1023,7 @@
           <p:cNvPr id="3" name="Text Placeholder 2">
             <a:extLst>
               <a:ext uri="{FF2B5EF4-FFF2-40B4-BE49-F238E27FC236}">
-                <a16:creationId xmlns:a16="http://schemas.microsoft.com/office/drawing/2014/main" xmlns="" id="{0A3A25D1-E73B-B445-91F2-A729864751B1}"/>
+                <a16:creationId xmlns:a16="http://schemas.microsoft.com/office/drawing/2014/main" id="{0A3A25D1-E73B-B445-91F2-A729864751B1}"/>
               </a:ext>
             </a:extLst>
           </p:cNvPr>
@@ -1148,7 +1148,7 @@
           <p:cNvPr id="4" name="Date Placeholder 3">
             <a:extLst>
               <a:ext uri="{FF2B5EF4-FFF2-40B4-BE49-F238E27FC236}">
-                <a16:creationId xmlns:a16="http://schemas.microsoft.com/office/drawing/2014/main" xmlns="" id="{774A64C9-AD10-E946-B1A8-36038DB819C6}"/>
+                <a16:creationId xmlns:a16="http://schemas.microsoft.com/office/drawing/2014/main" id="{774A64C9-AD10-E946-B1A8-36038DB819C6}"/>
               </a:ext>
             </a:extLst>
           </p:cNvPr>
@@ -1166,7 +1166,7 @@
           <a:p>
             <a:fld id="{31610600-DFD7-DD4B-8A38-5782773CE7CB}" type="datetimeFigureOut">
               <a:rPr lang="x-none" smtClean="0"/>
-              <a:t>02/10/2024</a:t>
+              <a:t>03/10/24</a:t>
             </a:fld>
             <a:endParaRPr lang="x-none"/>
           </a:p>
@@ -1177,7 +1177,7 @@
           <p:cNvPr id="5" name="Footer Placeholder 4">
             <a:extLst>
               <a:ext uri="{FF2B5EF4-FFF2-40B4-BE49-F238E27FC236}">
-                <a16:creationId xmlns:a16="http://schemas.microsoft.com/office/drawing/2014/main" xmlns="" id="{0C2AD2D2-92A2-0941-A6D3-9D4AC73BA29C}"/>
+                <a16:creationId xmlns:a16="http://schemas.microsoft.com/office/drawing/2014/main" id="{0C2AD2D2-92A2-0941-A6D3-9D4AC73BA29C}"/>
               </a:ext>
             </a:extLst>
           </p:cNvPr>
@@ -1202,7 +1202,7 @@
           <p:cNvPr id="6" name="Slide Number Placeholder 5">
             <a:extLst>
               <a:ext uri="{FF2B5EF4-FFF2-40B4-BE49-F238E27FC236}">
-                <a16:creationId xmlns:a16="http://schemas.microsoft.com/office/drawing/2014/main" xmlns="" id="{A3D84CAF-BF66-B343-AF08-DB8404E614B2}"/>
+                <a16:creationId xmlns:a16="http://schemas.microsoft.com/office/drawing/2014/main" id="{A3D84CAF-BF66-B343-AF08-DB8404E614B2}"/>
               </a:ext>
             </a:extLst>
           </p:cNvPr>
@@ -1261,7 +1261,7 @@
           <p:cNvPr id="2" name="Title 1">
             <a:extLst>
               <a:ext uri="{FF2B5EF4-FFF2-40B4-BE49-F238E27FC236}">
-                <a16:creationId xmlns:a16="http://schemas.microsoft.com/office/drawing/2014/main" xmlns="" id="{7A298FB1-59C3-D943-9AD7-2D242514B7FD}"/>
+                <a16:creationId xmlns:a16="http://schemas.microsoft.com/office/drawing/2014/main" id="{7A298FB1-59C3-D943-9AD7-2D242514B7FD}"/>
               </a:ext>
             </a:extLst>
           </p:cNvPr>
@@ -1290,7 +1290,7 @@
           <p:cNvPr id="3" name="Content Placeholder 2">
             <a:extLst>
               <a:ext uri="{FF2B5EF4-FFF2-40B4-BE49-F238E27FC236}">
-                <a16:creationId xmlns:a16="http://schemas.microsoft.com/office/drawing/2014/main" xmlns="" id="{B796B8CD-2288-1F47-AE3A-18989FA24465}"/>
+                <a16:creationId xmlns:a16="http://schemas.microsoft.com/office/drawing/2014/main" id="{B796B8CD-2288-1F47-AE3A-18989FA24465}"/>
               </a:ext>
             </a:extLst>
           </p:cNvPr>
@@ -1353,7 +1353,7 @@
           <p:cNvPr id="4" name="Content Placeholder 3">
             <a:extLst>
               <a:ext uri="{FF2B5EF4-FFF2-40B4-BE49-F238E27FC236}">
-                <a16:creationId xmlns:a16="http://schemas.microsoft.com/office/drawing/2014/main" xmlns="" id="{8C0EB2E2-DC2C-784D-B431-AF3DEDE2329E}"/>
+                <a16:creationId xmlns:a16="http://schemas.microsoft.com/office/drawing/2014/main" id="{8C0EB2E2-DC2C-784D-B431-AF3DEDE2329E}"/>
               </a:ext>
             </a:extLst>
           </p:cNvPr>
@@ -1416,7 +1416,7 @@
           <p:cNvPr id="5" name="Date Placeholder 4">
             <a:extLst>
               <a:ext uri="{FF2B5EF4-FFF2-40B4-BE49-F238E27FC236}">
-                <a16:creationId xmlns:a16="http://schemas.microsoft.com/office/drawing/2014/main" xmlns="" id="{C6910C0E-55F7-FF40-B546-5DB33C92C909}"/>
+                <a16:creationId xmlns:a16="http://schemas.microsoft.com/office/drawing/2014/main" id="{C6910C0E-55F7-FF40-B546-5DB33C92C909}"/>
               </a:ext>
             </a:extLst>
           </p:cNvPr>
@@ -1434,7 +1434,7 @@
           <a:p>
             <a:fld id="{31610600-DFD7-DD4B-8A38-5782773CE7CB}" type="datetimeFigureOut">
               <a:rPr lang="x-none" smtClean="0"/>
-              <a:t>02/10/2024</a:t>
+              <a:t>03/10/24</a:t>
             </a:fld>
             <a:endParaRPr lang="x-none"/>
           </a:p>
@@ -1445,7 +1445,7 @@
           <p:cNvPr id="6" name="Footer Placeholder 5">
             <a:extLst>
               <a:ext uri="{FF2B5EF4-FFF2-40B4-BE49-F238E27FC236}">
-                <a16:creationId xmlns:a16="http://schemas.microsoft.com/office/drawing/2014/main" xmlns="" id="{391E4112-8BCA-454C-924E-6B52A4A94663}"/>
+                <a16:creationId xmlns:a16="http://schemas.microsoft.com/office/drawing/2014/main" id="{391E4112-8BCA-454C-924E-6B52A4A94663}"/>
               </a:ext>
             </a:extLst>
           </p:cNvPr>
@@ -1470,7 +1470,7 @@
           <p:cNvPr id="7" name="Slide Number Placeholder 6">
             <a:extLst>
               <a:ext uri="{FF2B5EF4-FFF2-40B4-BE49-F238E27FC236}">
-                <a16:creationId xmlns:a16="http://schemas.microsoft.com/office/drawing/2014/main" xmlns="" id="{35AB1C98-2A63-614B-B7F1-4E92E3CA8FD3}"/>
+                <a16:creationId xmlns:a16="http://schemas.microsoft.com/office/drawing/2014/main" id="{35AB1C98-2A63-614B-B7F1-4E92E3CA8FD3}"/>
               </a:ext>
             </a:extLst>
           </p:cNvPr>
@@ -1529,7 +1529,7 @@
           <p:cNvPr id="2" name="Title 1">
             <a:extLst>
               <a:ext uri="{FF2B5EF4-FFF2-40B4-BE49-F238E27FC236}">
-                <a16:creationId xmlns:a16="http://schemas.microsoft.com/office/drawing/2014/main" xmlns="" id="{06F1EC53-54F5-A049-944F-2FE4D2E17B15}"/>
+                <a16:creationId xmlns:a16="http://schemas.microsoft.com/office/drawing/2014/main" id="{06F1EC53-54F5-A049-944F-2FE4D2E17B15}"/>
               </a:ext>
             </a:extLst>
           </p:cNvPr>
@@ -1563,7 +1563,7 @@
           <p:cNvPr id="3" name="Text Placeholder 2">
             <a:extLst>
               <a:ext uri="{FF2B5EF4-FFF2-40B4-BE49-F238E27FC236}">
-                <a16:creationId xmlns:a16="http://schemas.microsoft.com/office/drawing/2014/main" xmlns="" id="{85E073C5-6AD4-D64F-B051-071CA0525E82}"/>
+                <a16:creationId xmlns:a16="http://schemas.microsoft.com/office/drawing/2014/main" id="{85E073C5-6AD4-D64F-B051-071CA0525E82}"/>
               </a:ext>
             </a:extLst>
           </p:cNvPr>
@@ -1634,7 +1634,7 @@
           <p:cNvPr id="4" name="Content Placeholder 3">
             <a:extLst>
               <a:ext uri="{FF2B5EF4-FFF2-40B4-BE49-F238E27FC236}">
-                <a16:creationId xmlns:a16="http://schemas.microsoft.com/office/drawing/2014/main" xmlns="" id="{35EFCD4C-482F-114B-932F-A69A49558998}"/>
+                <a16:creationId xmlns:a16="http://schemas.microsoft.com/office/drawing/2014/main" id="{35EFCD4C-482F-114B-932F-A69A49558998}"/>
               </a:ext>
             </a:extLst>
           </p:cNvPr>
@@ -1697,7 +1697,7 @@
           <p:cNvPr id="5" name="Text Placeholder 4">
             <a:extLst>
               <a:ext uri="{FF2B5EF4-FFF2-40B4-BE49-F238E27FC236}">
-                <a16:creationId xmlns:a16="http://schemas.microsoft.com/office/drawing/2014/main" xmlns="" id="{D99D2AFD-C180-AA4A-8506-B21B21FF1137}"/>
+                <a16:creationId xmlns:a16="http://schemas.microsoft.com/office/drawing/2014/main" id="{D99D2AFD-C180-AA4A-8506-B21B21FF1137}"/>
               </a:ext>
             </a:extLst>
           </p:cNvPr>
@@ -1768,7 +1768,7 @@
           <p:cNvPr id="6" name="Content Placeholder 5">
             <a:extLst>
               <a:ext uri="{FF2B5EF4-FFF2-40B4-BE49-F238E27FC236}">
-                <a16:creationId xmlns:a16="http://schemas.microsoft.com/office/drawing/2014/main" xmlns="" id="{588D7C61-7787-544A-9694-60FFEF53741A}"/>
+                <a16:creationId xmlns:a16="http://schemas.microsoft.com/office/drawing/2014/main" id="{588D7C61-7787-544A-9694-60FFEF53741A}"/>
               </a:ext>
             </a:extLst>
           </p:cNvPr>
@@ -1831,7 +1831,7 @@
           <p:cNvPr id="7" name="Date Placeholder 6">
             <a:extLst>
               <a:ext uri="{FF2B5EF4-FFF2-40B4-BE49-F238E27FC236}">
-                <a16:creationId xmlns:a16="http://schemas.microsoft.com/office/drawing/2014/main" xmlns="" id="{6D78498E-EB22-2D41-8385-9DC76DA7E55D}"/>
+                <a16:creationId xmlns:a16="http://schemas.microsoft.com/office/drawing/2014/main" id="{6D78498E-EB22-2D41-8385-9DC76DA7E55D}"/>
               </a:ext>
             </a:extLst>
           </p:cNvPr>
@@ -1849,7 +1849,7 @@
           <a:p>
             <a:fld id="{31610600-DFD7-DD4B-8A38-5782773CE7CB}" type="datetimeFigureOut">
               <a:rPr lang="x-none" smtClean="0"/>
-              <a:t>02/10/2024</a:t>
+              <a:t>03/10/24</a:t>
             </a:fld>
             <a:endParaRPr lang="x-none"/>
           </a:p>
@@ -1860,7 +1860,7 @@
           <p:cNvPr id="8" name="Footer Placeholder 7">
             <a:extLst>
               <a:ext uri="{FF2B5EF4-FFF2-40B4-BE49-F238E27FC236}">
-                <a16:creationId xmlns:a16="http://schemas.microsoft.com/office/drawing/2014/main" xmlns="" id="{1DE22881-B71C-4D47-919C-5E6BC9140371}"/>
+                <a16:creationId xmlns:a16="http://schemas.microsoft.com/office/drawing/2014/main" id="{1DE22881-B71C-4D47-919C-5E6BC9140371}"/>
               </a:ext>
             </a:extLst>
           </p:cNvPr>
@@ -1885,7 +1885,7 @@
           <p:cNvPr id="9" name="Slide Number Placeholder 8">
             <a:extLst>
               <a:ext uri="{FF2B5EF4-FFF2-40B4-BE49-F238E27FC236}">
-                <a16:creationId xmlns:a16="http://schemas.microsoft.com/office/drawing/2014/main" xmlns="" id="{94E43CDC-1C42-9E4E-9A2D-0464FE6E1AD8}"/>
+                <a16:creationId xmlns:a16="http://schemas.microsoft.com/office/drawing/2014/main" id="{94E43CDC-1C42-9E4E-9A2D-0464FE6E1AD8}"/>
               </a:ext>
             </a:extLst>
           </p:cNvPr>
@@ -1944,7 +1944,7 @@
           <p:cNvPr id="2" name="Title 1">
             <a:extLst>
               <a:ext uri="{FF2B5EF4-FFF2-40B4-BE49-F238E27FC236}">
-                <a16:creationId xmlns:a16="http://schemas.microsoft.com/office/drawing/2014/main" xmlns="" id="{8F3D3DBF-E3C5-214F-B54F-BD0E080AF488}"/>
+                <a16:creationId xmlns:a16="http://schemas.microsoft.com/office/drawing/2014/main" id="{8F3D3DBF-E3C5-214F-B54F-BD0E080AF488}"/>
               </a:ext>
             </a:extLst>
           </p:cNvPr>
@@ -1973,7 +1973,7 @@
           <p:cNvPr id="3" name="Date Placeholder 2">
             <a:extLst>
               <a:ext uri="{FF2B5EF4-FFF2-40B4-BE49-F238E27FC236}">
-                <a16:creationId xmlns:a16="http://schemas.microsoft.com/office/drawing/2014/main" xmlns="" id="{ACF617BA-CD2D-844E-BB3A-77C32A938EF0}"/>
+                <a16:creationId xmlns:a16="http://schemas.microsoft.com/office/drawing/2014/main" id="{ACF617BA-CD2D-844E-BB3A-77C32A938EF0}"/>
               </a:ext>
             </a:extLst>
           </p:cNvPr>
@@ -1991,7 +1991,7 @@
           <a:p>
             <a:fld id="{31610600-DFD7-DD4B-8A38-5782773CE7CB}" type="datetimeFigureOut">
               <a:rPr lang="x-none" smtClean="0"/>
-              <a:t>02/10/2024</a:t>
+              <a:t>03/10/24</a:t>
             </a:fld>
             <a:endParaRPr lang="x-none"/>
           </a:p>
@@ -2002,7 +2002,7 @@
           <p:cNvPr id="4" name="Footer Placeholder 3">
             <a:extLst>
               <a:ext uri="{FF2B5EF4-FFF2-40B4-BE49-F238E27FC236}">
-                <a16:creationId xmlns:a16="http://schemas.microsoft.com/office/drawing/2014/main" xmlns="" id="{BC9D6EED-26FB-0A45-BDD7-D868417EA163}"/>
+                <a16:creationId xmlns:a16="http://schemas.microsoft.com/office/drawing/2014/main" id="{BC9D6EED-26FB-0A45-BDD7-D868417EA163}"/>
               </a:ext>
             </a:extLst>
           </p:cNvPr>
@@ -2027,7 +2027,7 @@
           <p:cNvPr id="5" name="Slide Number Placeholder 4">
             <a:extLst>
               <a:ext uri="{FF2B5EF4-FFF2-40B4-BE49-F238E27FC236}">
-                <a16:creationId xmlns:a16="http://schemas.microsoft.com/office/drawing/2014/main" xmlns="" id="{83605550-B156-7E4A-915C-AC7D38802CA0}"/>
+                <a16:creationId xmlns:a16="http://schemas.microsoft.com/office/drawing/2014/main" id="{83605550-B156-7E4A-915C-AC7D38802CA0}"/>
               </a:ext>
             </a:extLst>
           </p:cNvPr>
@@ -2086,7 +2086,7 @@
           <p:cNvPr id="2" name="Date Placeholder 1">
             <a:extLst>
               <a:ext uri="{FF2B5EF4-FFF2-40B4-BE49-F238E27FC236}">
-                <a16:creationId xmlns:a16="http://schemas.microsoft.com/office/drawing/2014/main" xmlns="" id="{48E86B06-C1AE-AB46-A1B6-8D7EBDFD00C9}"/>
+                <a16:creationId xmlns:a16="http://schemas.microsoft.com/office/drawing/2014/main" id="{48E86B06-C1AE-AB46-A1B6-8D7EBDFD00C9}"/>
               </a:ext>
             </a:extLst>
           </p:cNvPr>
@@ -2104,7 +2104,7 @@
           <a:p>
             <a:fld id="{31610600-DFD7-DD4B-8A38-5782773CE7CB}" type="datetimeFigureOut">
               <a:rPr lang="x-none" smtClean="0"/>
-              <a:t>02/10/2024</a:t>
+              <a:t>03/10/24</a:t>
             </a:fld>
             <a:endParaRPr lang="x-none"/>
           </a:p>
@@ -2115,7 +2115,7 @@
           <p:cNvPr id="3" name="Footer Placeholder 2">
             <a:extLst>
               <a:ext uri="{FF2B5EF4-FFF2-40B4-BE49-F238E27FC236}">
-                <a16:creationId xmlns:a16="http://schemas.microsoft.com/office/drawing/2014/main" xmlns="" id="{3107600F-D052-AA49-A9DC-09C64CB046FB}"/>
+                <a16:creationId xmlns:a16="http://schemas.microsoft.com/office/drawing/2014/main" id="{3107600F-D052-AA49-A9DC-09C64CB046FB}"/>
               </a:ext>
             </a:extLst>
           </p:cNvPr>
@@ -2140,7 +2140,7 @@
           <p:cNvPr id="4" name="Slide Number Placeholder 3">
             <a:extLst>
               <a:ext uri="{FF2B5EF4-FFF2-40B4-BE49-F238E27FC236}">
-                <a16:creationId xmlns:a16="http://schemas.microsoft.com/office/drawing/2014/main" xmlns="" id="{CF4E22B5-3CBB-9A4A-A00A-2A4CA43B56A0}"/>
+                <a16:creationId xmlns:a16="http://schemas.microsoft.com/office/drawing/2014/main" id="{CF4E22B5-3CBB-9A4A-A00A-2A4CA43B56A0}"/>
               </a:ext>
             </a:extLst>
           </p:cNvPr>
@@ -2199,7 +2199,7 @@
           <p:cNvPr id="2" name="Title 1">
             <a:extLst>
               <a:ext uri="{FF2B5EF4-FFF2-40B4-BE49-F238E27FC236}">
-                <a16:creationId xmlns:a16="http://schemas.microsoft.com/office/drawing/2014/main" xmlns="" id="{9BA4E689-D9F7-A143-8B19-8C202DD39015}"/>
+                <a16:creationId xmlns:a16="http://schemas.microsoft.com/office/drawing/2014/main" id="{9BA4E689-D9F7-A143-8B19-8C202DD39015}"/>
               </a:ext>
             </a:extLst>
           </p:cNvPr>
@@ -2237,7 +2237,7 @@
           <p:cNvPr id="3" name="Content Placeholder 2">
             <a:extLst>
               <a:ext uri="{FF2B5EF4-FFF2-40B4-BE49-F238E27FC236}">
-                <a16:creationId xmlns:a16="http://schemas.microsoft.com/office/drawing/2014/main" xmlns="" id="{17FBFAB8-14E3-004D-BB4E-C4873189E124}"/>
+                <a16:creationId xmlns:a16="http://schemas.microsoft.com/office/drawing/2014/main" id="{17FBFAB8-14E3-004D-BB4E-C4873189E124}"/>
               </a:ext>
             </a:extLst>
           </p:cNvPr>
@@ -2328,7 +2328,7 @@
           <p:cNvPr id="4" name="Text Placeholder 3">
             <a:extLst>
               <a:ext uri="{FF2B5EF4-FFF2-40B4-BE49-F238E27FC236}">
-                <a16:creationId xmlns:a16="http://schemas.microsoft.com/office/drawing/2014/main" xmlns="" id="{2BF7B4BD-63BB-1946-AA62-992527625685}"/>
+                <a16:creationId xmlns:a16="http://schemas.microsoft.com/office/drawing/2014/main" id="{2BF7B4BD-63BB-1946-AA62-992527625685}"/>
               </a:ext>
             </a:extLst>
           </p:cNvPr>
@@ -2399,7 +2399,7 @@
           <p:cNvPr id="5" name="Date Placeholder 4">
             <a:extLst>
               <a:ext uri="{FF2B5EF4-FFF2-40B4-BE49-F238E27FC236}">
-                <a16:creationId xmlns:a16="http://schemas.microsoft.com/office/drawing/2014/main" xmlns="" id="{4DAA888D-BC87-CA4C-B833-A366D4602EF1}"/>
+                <a16:creationId xmlns:a16="http://schemas.microsoft.com/office/drawing/2014/main" id="{4DAA888D-BC87-CA4C-B833-A366D4602EF1}"/>
               </a:ext>
             </a:extLst>
           </p:cNvPr>
@@ -2417,7 +2417,7 @@
           <a:p>
             <a:fld id="{31610600-DFD7-DD4B-8A38-5782773CE7CB}" type="datetimeFigureOut">
               <a:rPr lang="x-none" smtClean="0"/>
-              <a:t>02/10/2024</a:t>
+              <a:t>03/10/24</a:t>
             </a:fld>
             <a:endParaRPr lang="x-none"/>
           </a:p>
@@ -2428,7 +2428,7 @@
           <p:cNvPr id="6" name="Footer Placeholder 5">
             <a:extLst>
               <a:ext uri="{FF2B5EF4-FFF2-40B4-BE49-F238E27FC236}">
-                <a16:creationId xmlns:a16="http://schemas.microsoft.com/office/drawing/2014/main" xmlns="" id="{44B60B43-8963-5F43-B879-AB1D1CB54258}"/>
+                <a16:creationId xmlns:a16="http://schemas.microsoft.com/office/drawing/2014/main" id="{44B60B43-8963-5F43-B879-AB1D1CB54258}"/>
               </a:ext>
             </a:extLst>
           </p:cNvPr>
@@ -2453,7 +2453,7 @@
           <p:cNvPr id="7" name="Slide Number Placeholder 6">
             <a:extLst>
               <a:ext uri="{FF2B5EF4-FFF2-40B4-BE49-F238E27FC236}">
-                <a16:creationId xmlns:a16="http://schemas.microsoft.com/office/drawing/2014/main" xmlns="" id="{5EF8F356-569B-2B4B-9F96-A0291C35BF9B}"/>
+                <a16:creationId xmlns:a16="http://schemas.microsoft.com/office/drawing/2014/main" id="{5EF8F356-569B-2B4B-9F96-A0291C35BF9B}"/>
               </a:ext>
             </a:extLst>
           </p:cNvPr>
@@ -2512,7 +2512,7 @@
           <p:cNvPr id="2" name="Title 1">
             <a:extLst>
               <a:ext uri="{FF2B5EF4-FFF2-40B4-BE49-F238E27FC236}">
-                <a16:creationId xmlns:a16="http://schemas.microsoft.com/office/drawing/2014/main" xmlns="" id="{BEDC9DDC-B141-6D4C-895B-D27A31837624}"/>
+                <a16:creationId xmlns:a16="http://schemas.microsoft.com/office/drawing/2014/main" id="{BEDC9DDC-B141-6D4C-895B-D27A31837624}"/>
               </a:ext>
             </a:extLst>
           </p:cNvPr>
@@ -2550,7 +2550,7 @@
           <p:cNvPr id="3" name="Picture Placeholder 2">
             <a:extLst>
               <a:ext uri="{FF2B5EF4-FFF2-40B4-BE49-F238E27FC236}">
-                <a16:creationId xmlns:a16="http://schemas.microsoft.com/office/drawing/2014/main" xmlns="" id="{18943D23-66FE-8E49-8407-385B5EDD0187}"/>
+                <a16:creationId xmlns:a16="http://schemas.microsoft.com/office/drawing/2014/main" id="{18943D23-66FE-8E49-8407-385B5EDD0187}"/>
               </a:ext>
             </a:extLst>
           </p:cNvPr>
@@ -2617,7 +2617,7 @@
           <p:cNvPr id="4" name="Text Placeholder 3">
             <a:extLst>
               <a:ext uri="{FF2B5EF4-FFF2-40B4-BE49-F238E27FC236}">
-                <a16:creationId xmlns:a16="http://schemas.microsoft.com/office/drawing/2014/main" xmlns="" id="{CEA457DF-462E-874E-B3C1-D44992CFB01D}"/>
+                <a16:creationId xmlns:a16="http://schemas.microsoft.com/office/drawing/2014/main" id="{CEA457DF-462E-874E-B3C1-D44992CFB01D}"/>
               </a:ext>
             </a:extLst>
           </p:cNvPr>
@@ -2688,7 +2688,7 @@
           <p:cNvPr id="5" name="Date Placeholder 4">
             <a:extLst>
               <a:ext uri="{FF2B5EF4-FFF2-40B4-BE49-F238E27FC236}">
-                <a16:creationId xmlns:a16="http://schemas.microsoft.com/office/drawing/2014/main" xmlns="" id="{AD8C0F80-256D-8D47-83D3-5EE8228006A1}"/>
+                <a16:creationId xmlns:a16="http://schemas.microsoft.com/office/drawing/2014/main" id="{AD8C0F80-256D-8D47-83D3-5EE8228006A1}"/>
               </a:ext>
             </a:extLst>
           </p:cNvPr>
@@ -2706,7 +2706,7 @@
           <a:p>
             <a:fld id="{31610600-DFD7-DD4B-8A38-5782773CE7CB}" type="datetimeFigureOut">
               <a:rPr lang="x-none" smtClean="0"/>
-              <a:t>02/10/2024</a:t>
+              <a:t>03/10/24</a:t>
             </a:fld>
             <a:endParaRPr lang="x-none"/>
           </a:p>
@@ -2717,7 +2717,7 @@
           <p:cNvPr id="6" name="Footer Placeholder 5">
             <a:extLst>
               <a:ext uri="{FF2B5EF4-FFF2-40B4-BE49-F238E27FC236}">
-                <a16:creationId xmlns:a16="http://schemas.microsoft.com/office/drawing/2014/main" xmlns="" id="{F32F915D-C676-E947-B693-035B67B36CF1}"/>
+                <a16:creationId xmlns:a16="http://schemas.microsoft.com/office/drawing/2014/main" id="{F32F915D-C676-E947-B693-035B67B36CF1}"/>
               </a:ext>
             </a:extLst>
           </p:cNvPr>
@@ -2742,7 +2742,7 @@
           <p:cNvPr id="7" name="Slide Number Placeholder 6">
             <a:extLst>
               <a:ext uri="{FF2B5EF4-FFF2-40B4-BE49-F238E27FC236}">
-                <a16:creationId xmlns:a16="http://schemas.microsoft.com/office/drawing/2014/main" xmlns="" id="{44810766-7F91-2341-A7E0-0A4C8F78D301}"/>
+                <a16:creationId xmlns:a16="http://schemas.microsoft.com/office/drawing/2014/main" id="{44810766-7F91-2341-A7E0-0A4C8F78D301}"/>
               </a:ext>
             </a:extLst>
           </p:cNvPr>
@@ -2806,7 +2806,7 @@
           <p:cNvPr id="2" name="Title Placeholder 1">
             <a:extLst>
               <a:ext uri="{FF2B5EF4-FFF2-40B4-BE49-F238E27FC236}">
-                <a16:creationId xmlns:a16="http://schemas.microsoft.com/office/drawing/2014/main" xmlns="" id="{6EBF659A-75B5-C640-A85F-78237E7E5F55}"/>
+                <a16:creationId xmlns:a16="http://schemas.microsoft.com/office/drawing/2014/main" id="{6EBF659A-75B5-C640-A85F-78237E7E5F55}"/>
               </a:ext>
             </a:extLst>
           </p:cNvPr>
@@ -2845,7 +2845,7 @@
           <p:cNvPr id="3" name="Text Placeholder 2">
             <a:extLst>
               <a:ext uri="{FF2B5EF4-FFF2-40B4-BE49-F238E27FC236}">
-                <a16:creationId xmlns:a16="http://schemas.microsoft.com/office/drawing/2014/main" xmlns="" id="{E19678C5-D520-FE41-AB6A-B6811F679975}"/>
+                <a16:creationId xmlns:a16="http://schemas.microsoft.com/office/drawing/2014/main" id="{E19678C5-D520-FE41-AB6A-B6811F679975}"/>
               </a:ext>
             </a:extLst>
           </p:cNvPr>
@@ -2913,7 +2913,7 @@
           <p:cNvPr id="4" name="Date Placeholder 3">
             <a:extLst>
               <a:ext uri="{FF2B5EF4-FFF2-40B4-BE49-F238E27FC236}">
-                <a16:creationId xmlns:a16="http://schemas.microsoft.com/office/drawing/2014/main" xmlns="" id="{82E1C91B-D637-6643-AF2C-6C63DFE6F09D}"/>
+                <a16:creationId xmlns:a16="http://schemas.microsoft.com/office/drawing/2014/main" id="{82E1C91B-D637-6643-AF2C-6C63DFE6F09D}"/>
               </a:ext>
             </a:extLst>
           </p:cNvPr>
@@ -2949,7 +2949,7 @@
           <a:p>
             <a:fld id="{31610600-DFD7-DD4B-8A38-5782773CE7CB}" type="datetimeFigureOut">
               <a:rPr lang="x-none" smtClean="0"/>
-              <a:t>02/10/2024</a:t>
+              <a:t>03/10/24</a:t>
             </a:fld>
             <a:endParaRPr lang="x-none"/>
           </a:p>
@@ -2960,7 +2960,7 @@
           <p:cNvPr id="5" name="Footer Placeholder 4">
             <a:extLst>
               <a:ext uri="{FF2B5EF4-FFF2-40B4-BE49-F238E27FC236}">
-                <a16:creationId xmlns:a16="http://schemas.microsoft.com/office/drawing/2014/main" xmlns="" id="{330AE663-0CB3-8A46-AB43-B2E988C90B55}"/>
+                <a16:creationId xmlns:a16="http://schemas.microsoft.com/office/drawing/2014/main" id="{330AE663-0CB3-8A46-AB43-B2E988C90B55}"/>
               </a:ext>
             </a:extLst>
           </p:cNvPr>
@@ -3003,7 +3003,7 @@
           <p:cNvPr id="6" name="Slide Number Placeholder 5">
             <a:extLst>
               <a:ext uri="{FF2B5EF4-FFF2-40B4-BE49-F238E27FC236}">
-                <a16:creationId xmlns:a16="http://schemas.microsoft.com/office/drawing/2014/main" xmlns="" id="{A5BBC166-E4D7-1B46-A0CE-7B7A94ADD9B6}"/>
+                <a16:creationId xmlns:a16="http://schemas.microsoft.com/office/drawing/2014/main" id="{A5BBC166-E4D7-1B46-A0CE-7B7A94ADD9B6}"/>
               </a:ext>
             </a:extLst>
           </p:cNvPr>
@@ -3371,7 +3371,7 @@
           <p:cNvPr id="2" name="Picture 1">
             <a:extLst>
               <a:ext uri="{FF2B5EF4-FFF2-40B4-BE49-F238E27FC236}">
-                <a16:creationId xmlns:a16="http://schemas.microsoft.com/office/drawing/2014/main" xmlns="" id="{F7629417-C13C-4C4A-9550-013038C2FCA4}"/>
+                <a16:creationId xmlns:a16="http://schemas.microsoft.com/office/drawing/2014/main" id="{F7629417-C13C-4C4A-9550-013038C2FCA4}"/>
               </a:ext>
             </a:extLst>
           </p:cNvPr>
@@ -3401,7 +3401,7 @@
           <p:cNvPr id="3" name="TextBox 2">
             <a:extLst>
               <a:ext uri="{FF2B5EF4-FFF2-40B4-BE49-F238E27FC236}">
-                <a16:creationId xmlns:a16="http://schemas.microsoft.com/office/drawing/2014/main" xmlns="" id="{1CB1C4D4-C576-6A4D-8EC1-EEF0A2C88E08}"/>
+                <a16:creationId xmlns:a16="http://schemas.microsoft.com/office/drawing/2014/main" id="{1CB1C4D4-C576-6A4D-8EC1-EEF0A2C88E08}"/>
               </a:ext>
             </a:extLst>
           </p:cNvPr>
@@ -3436,7 +3436,7 @@
           <p:cNvPr id="4" name="TextBox 3">
             <a:extLst>
               <a:ext uri="{FF2B5EF4-FFF2-40B4-BE49-F238E27FC236}">
-                <a16:creationId xmlns:a16="http://schemas.microsoft.com/office/drawing/2014/main" xmlns="" id="{643F1902-F45F-0749-B46F-1528FA1DC0F5}"/>
+                <a16:creationId xmlns:a16="http://schemas.microsoft.com/office/drawing/2014/main" id="{643F1902-F45F-0749-B46F-1528FA1DC0F5}"/>
               </a:ext>
             </a:extLst>
           </p:cNvPr>
@@ -3478,7 +3478,7 @@
           <p:cNvPr id="6" name="TextBox 5">
             <a:extLst>
               <a:ext uri="{FF2B5EF4-FFF2-40B4-BE49-F238E27FC236}">
-                <a16:creationId xmlns:a16="http://schemas.microsoft.com/office/drawing/2014/main" xmlns="" id="{DE8FA8B4-ABA3-C34B-B2B7-A6087EBCB637}"/>
+                <a16:creationId xmlns:a16="http://schemas.microsoft.com/office/drawing/2014/main" id="{DE8FA8B4-ABA3-C34B-B2B7-A6087EBCB637}"/>
               </a:ext>
             </a:extLst>
           </p:cNvPr>
@@ -3520,7 +3520,7 @@
           <p:cNvPr id="10" name="Right Arrow 9">
             <a:extLst>
               <a:ext uri="{FF2B5EF4-FFF2-40B4-BE49-F238E27FC236}">
-                <a16:creationId xmlns:a16="http://schemas.microsoft.com/office/drawing/2014/main" xmlns="" id="{4F7AF863-7C0A-5B48-BD48-D4B7D311C793}"/>
+                <a16:creationId xmlns:a16="http://schemas.microsoft.com/office/drawing/2014/main" id="{4F7AF863-7C0A-5B48-BD48-D4B7D311C793}"/>
               </a:ext>
             </a:extLst>
           </p:cNvPr>
@@ -3566,7 +3566,7 @@
           <p:cNvPr id="11" name="Right Arrow 10">
             <a:extLst>
               <a:ext uri="{FF2B5EF4-FFF2-40B4-BE49-F238E27FC236}">
-                <a16:creationId xmlns:a16="http://schemas.microsoft.com/office/drawing/2014/main" xmlns="" id="{8B55BC31-68CD-3C45-BC04-F2957B7A3864}"/>
+                <a16:creationId xmlns:a16="http://schemas.microsoft.com/office/drawing/2014/main" id="{8B55BC31-68CD-3C45-BC04-F2957B7A3864}"/>
               </a:ext>
             </a:extLst>
           </p:cNvPr>
@@ -3612,7 +3612,7 @@
           <p:cNvPr id="12" name="Picture 11">
             <a:extLst>
               <a:ext uri="{FF2B5EF4-FFF2-40B4-BE49-F238E27FC236}">
-                <a16:creationId xmlns:a16="http://schemas.microsoft.com/office/drawing/2014/main" xmlns="" id="{C29DDEE0-68AF-D840-AFE7-5151145CE27C}"/>
+                <a16:creationId xmlns:a16="http://schemas.microsoft.com/office/drawing/2014/main" id="{C29DDEE0-68AF-D840-AFE7-5151145CE27C}"/>
               </a:ext>
             </a:extLst>
           </p:cNvPr>
@@ -3642,7 +3642,7 @@
           <p:cNvPr id="13" name="TextBox 12">
             <a:extLst>
               <a:ext uri="{FF2B5EF4-FFF2-40B4-BE49-F238E27FC236}">
-                <a16:creationId xmlns:a16="http://schemas.microsoft.com/office/drawing/2014/main" xmlns="" id="{CD256E0C-0E8A-BB44-AF8C-E5E37C1CC458}"/>
+                <a16:creationId xmlns:a16="http://schemas.microsoft.com/office/drawing/2014/main" id="{CD256E0C-0E8A-BB44-AF8C-E5E37C1CC458}"/>
               </a:ext>
             </a:extLst>
           </p:cNvPr>
@@ -3677,7 +3677,7 @@
           <p:cNvPr id="14" name="Frame 13">
             <a:extLst>
               <a:ext uri="{FF2B5EF4-FFF2-40B4-BE49-F238E27FC236}">
-                <a16:creationId xmlns:a16="http://schemas.microsoft.com/office/drawing/2014/main" xmlns="" id="{29BF6628-E69A-4941-B242-894505060C6A}"/>
+                <a16:creationId xmlns:a16="http://schemas.microsoft.com/office/drawing/2014/main" id="{29BF6628-E69A-4941-B242-894505060C6A}"/>
               </a:ext>
             </a:extLst>
           </p:cNvPr>
@@ -3729,7 +3729,7 @@
           <p:cNvPr id="15" name="Frame 14">
             <a:extLst>
               <a:ext uri="{FF2B5EF4-FFF2-40B4-BE49-F238E27FC236}">
-                <a16:creationId xmlns:a16="http://schemas.microsoft.com/office/drawing/2014/main" xmlns="" id="{D5170988-74B7-8D4B-AA1C-E4141952145D}"/>
+                <a16:creationId xmlns:a16="http://schemas.microsoft.com/office/drawing/2014/main" id="{D5170988-74B7-8D4B-AA1C-E4141952145D}"/>
               </a:ext>
             </a:extLst>
           </p:cNvPr>
@@ -3781,7 +3781,7 @@
           <p:cNvPr id="17" name="TextBox 16">
             <a:extLst>
               <a:ext uri="{FF2B5EF4-FFF2-40B4-BE49-F238E27FC236}">
-                <a16:creationId xmlns:a16="http://schemas.microsoft.com/office/drawing/2014/main" xmlns="" id="{8BD689FE-9FB6-0A44-8BEC-8ED0A14A64CD}"/>
+                <a16:creationId xmlns:a16="http://schemas.microsoft.com/office/drawing/2014/main" id="{8BD689FE-9FB6-0A44-8BEC-8ED0A14A64CD}"/>
               </a:ext>
             </a:extLst>
           </p:cNvPr>
@@ -3816,7 +3816,7 @@
           <p:cNvPr id="19" name="Frame 18">
             <a:extLst>
               <a:ext uri="{FF2B5EF4-FFF2-40B4-BE49-F238E27FC236}">
-                <a16:creationId xmlns:a16="http://schemas.microsoft.com/office/drawing/2014/main" xmlns="" id="{03AFE3FF-5B1F-8743-A9D5-933379120C9C}"/>
+                <a16:creationId xmlns:a16="http://schemas.microsoft.com/office/drawing/2014/main" id="{03AFE3FF-5B1F-8743-A9D5-933379120C9C}"/>
               </a:ext>
             </a:extLst>
           </p:cNvPr>
@@ -3868,7 +3868,7 @@
           <p:cNvPr id="20" name="TextBox 19">
             <a:extLst>
               <a:ext uri="{FF2B5EF4-FFF2-40B4-BE49-F238E27FC236}">
-                <a16:creationId xmlns:a16="http://schemas.microsoft.com/office/drawing/2014/main" xmlns="" id="{B878545F-00F2-734F-8AD6-3CBF68E955F5}"/>
+                <a16:creationId xmlns:a16="http://schemas.microsoft.com/office/drawing/2014/main" id="{B878545F-00F2-734F-8AD6-3CBF68E955F5}"/>
               </a:ext>
             </a:extLst>
           </p:cNvPr>
@@ -3907,7 +3907,7 @@
           <p:cNvPr id="21" name="Rectangle 20">
             <a:extLst>
               <a:ext uri="{FF2B5EF4-FFF2-40B4-BE49-F238E27FC236}">
-                <a16:creationId xmlns:a16="http://schemas.microsoft.com/office/drawing/2014/main" xmlns="" id="{B1C161F8-87DF-D44B-8976-F9711D4CABC8}"/>
+                <a16:creationId xmlns:a16="http://schemas.microsoft.com/office/drawing/2014/main" id="{B1C161F8-87DF-D44B-8976-F9711D4CABC8}"/>
               </a:ext>
             </a:extLst>
           </p:cNvPr>
@@ -3984,7 +3984,7 @@
           <p:cNvPr id="2" name="TextBox 1">
             <a:extLst>
               <a:ext uri="{FF2B5EF4-FFF2-40B4-BE49-F238E27FC236}">
-                <a16:creationId xmlns:a16="http://schemas.microsoft.com/office/drawing/2014/main" xmlns="" id="{02D75FF5-A64B-C54E-A8E3-7832CC325AD2}"/>
+                <a16:creationId xmlns:a16="http://schemas.microsoft.com/office/drawing/2014/main" id="{02D75FF5-A64B-C54E-A8E3-7832CC325AD2}"/>
               </a:ext>
             </a:extLst>
           </p:cNvPr>
@@ -4034,7 +4034,7 @@
           <p:cNvPr id="3" name="TextBox 2">
             <a:extLst>
               <a:ext uri="{FF2B5EF4-FFF2-40B4-BE49-F238E27FC236}">
-                <a16:creationId xmlns:a16="http://schemas.microsoft.com/office/drawing/2014/main" xmlns="" id="{EEBA9034-E063-5345-A24C-0DAF8829E341}"/>
+                <a16:creationId xmlns:a16="http://schemas.microsoft.com/office/drawing/2014/main" id="{EEBA9034-E063-5345-A24C-0DAF8829E341}"/>
               </a:ext>
             </a:extLst>
           </p:cNvPr>
@@ -4084,7 +4084,7 @@
           <p:cNvPr id="4" name="TextBox 3">
             <a:extLst>
               <a:ext uri="{FF2B5EF4-FFF2-40B4-BE49-F238E27FC236}">
-                <a16:creationId xmlns:a16="http://schemas.microsoft.com/office/drawing/2014/main" xmlns="" id="{771D51CC-3EA5-8B40-A473-94795BA7AE12}"/>
+                <a16:creationId xmlns:a16="http://schemas.microsoft.com/office/drawing/2014/main" id="{771D51CC-3EA5-8B40-A473-94795BA7AE12}"/>
               </a:ext>
             </a:extLst>
           </p:cNvPr>
@@ -4136,7 +4136,7 @@
           <p:cNvPr id="5" name="TextBox 4">
             <a:extLst>
               <a:ext uri="{FF2B5EF4-FFF2-40B4-BE49-F238E27FC236}">
-                <a16:creationId xmlns:a16="http://schemas.microsoft.com/office/drawing/2014/main" xmlns="" id="{4BC474DE-E6BB-734F-A5A6-386F4CEBC7B6}"/>
+                <a16:creationId xmlns:a16="http://schemas.microsoft.com/office/drawing/2014/main" id="{4BC474DE-E6BB-734F-A5A6-386F4CEBC7B6}"/>
               </a:ext>
             </a:extLst>
           </p:cNvPr>
@@ -4192,7 +4192,7 @@
           <p:cNvPr id="6" name="TextBox 5">
             <a:extLst>
               <a:ext uri="{FF2B5EF4-FFF2-40B4-BE49-F238E27FC236}">
-                <a16:creationId xmlns:a16="http://schemas.microsoft.com/office/drawing/2014/main" xmlns="" id="{0FC353A9-91B4-AF4A-9890-FD619709F632}"/>
+                <a16:creationId xmlns:a16="http://schemas.microsoft.com/office/drawing/2014/main" id="{0FC353A9-91B4-AF4A-9890-FD619709F632}"/>
               </a:ext>
             </a:extLst>
           </p:cNvPr>
@@ -4242,7 +4242,7 @@
           <p:cNvPr id="7" name="TextBox 6">
             <a:extLst>
               <a:ext uri="{FF2B5EF4-FFF2-40B4-BE49-F238E27FC236}">
-                <a16:creationId xmlns:a16="http://schemas.microsoft.com/office/drawing/2014/main" xmlns="" id="{A2C0F638-92C3-2346-BCD6-7735CF274B86}"/>
+                <a16:creationId xmlns:a16="http://schemas.microsoft.com/office/drawing/2014/main" id="{A2C0F638-92C3-2346-BCD6-7735CF274B86}"/>
               </a:ext>
             </a:extLst>
           </p:cNvPr>
@@ -4304,7 +4304,7 @@
           <p:cNvPr id="9" name="TextBox 8">
             <a:extLst>
               <a:ext uri="{FF2B5EF4-FFF2-40B4-BE49-F238E27FC236}">
-                <a16:creationId xmlns:a16="http://schemas.microsoft.com/office/drawing/2014/main" xmlns="" id="{FADFBECC-186A-AC4E-9B7F-C1DD19579640}"/>
+                <a16:creationId xmlns:a16="http://schemas.microsoft.com/office/drawing/2014/main" id="{FADFBECC-186A-AC4E-9B7F-C1DD19579640}"/>
               </a:ext>
             </a:extLst>
           </p:cNvPr>
@@ -4390,7 +4390,7 @@
           <p:cNvPr id="2" name="TextBox 1">
             <a:extLst>
               <a:ext uri="{FF2B5EF4-FFF2-40B4-BE49-F238E27FC236}">
-                <a16:creationId xmlns:a16="http://schemas.microsoft.com/office/drawing/2014/main" xmlns="" id="{A3472355-9901-AF4B-8744-CC51F1ACA6A8}"/>
+                <a16:creationId xmlns:a16="http://schemas.microsoft.com/office/drawing/2014/main" id="{A3472355-9901-AF4B-8744-CC51F1ACA6A8}"/>
               </a:ext>
             </a:extLst>
           </p:cNvPr>
@@ -4425,7 +4425,7 @@
           <p:cNvPr id="3" name="Picture 2">
             <a:extLst>
               <a:ext uri="{FF2B5EF4-FFF2-40B4-BE49-F238E27FC236}">
-                <a16:creationId xmlns:a16="http://schemas.microsoft.com/office/drawing/2014/main" xmlns="" id="{FCFC09F5-8DB9-1F45-9233-73452C29162B}"/>
+                <a16:creationId xmlns:a16="http://schemas.microsoft.com/office/drawing/2014/main" id="{FCFC09F5-8DB9-1F45-9233-73452C29162B}"/>
               </a:ext>
             </a:extLst>
           </p:cNvPr>
@@ -4455,7 +4455,7 @@
           <p:cNvPr id="5" name="TextBox 4">
             <a:extLst>
               <a:ext uri="{FF2B5EF4-FFF2-40B4-BE49-F238E27FC236}">
-                <a16:creationId xmlns:a16="http://schemas.microsoft.com/office/drawing/2014/main" xmlns="" id="{CA2EE05F-6941-C940-98AE-44A5FB8A8251}"/>
+                <a16:creationId xmlns:a16="http://schemas.microsoft.com/office/drawing/2014/main" id="{CA2EE05F-6941-C940-98AE-44A5FB8A8251}"/>
               </a:ext>
             </a:extLst>
           </p:cNvPr>
@@ -4494,7 +4494,7 @@
           <p:cNvPr id="6" name="TextBox 5">
             <a:extLst>
               <a:ext uri="{FF2B5EF4-FFF2-40B4-BE49-F238E27FC236}">
-                <a16:creationId xmlns:a16="http://schemas.microsoft.com/office/drawing/2014/main" xmlns="" id="{BE2778E9-39EA-0A48-90F8-3637DC33CE96}"/>
+                <a16:creationId xmlns:a16="http://schemas.microsoft.com/office/drawing/2014/main" id="{BE2778E9-39EA-0A48-90F8-3637DC33CE96}"/>
               </a:ext>
             </a:extLst>
           </p:cNvPr>
@@ -4530,7 +4530,7 @@
           <p:cNvPr id="7" name="TextBox 6">
             <a:extLst>
               <a:ext uri="{FF2B5EF4-FFF2-40B4-BE49-F238E27FC236}">
-                <a16:creationId xmlns:a16="http://schemas.microsoft.com/office/drawing/2014/main" xmlns="" id="{75D84354-C343-4048-8811-CF4C2CDACDD0}"/>
+                <a16:creationId xmlns:a16="http://schemas.microsoft.com/office/drawing/2014/main" id="{75D84354-C343-4048-8811-CF4C2CDACDD0}"/>
               </a:ext>
             </a:extLst>
           </p:cNvPr>
@@ -4574,7 +4574,7 @@
           <p:cNvPr id="4" name="Picture 3">
             <a:extLst>
               <a:ext uri="{FF2B5EF4-FFF2-40B4-BE49-F238E27FC236}">
-                <a16:creationId xmlns:a16="http://schemas.microsoft.com/office/drawing/2014/main" xmlns="" id="{B5398BC8-7F8E-6F4C-8E16-03569EE03E20}"/>
+                <a16:creationId xmlns:a16="http://schemas.microsoft.com/office/drawing/2014/main" id="{B5398BC8-7F8E-6F4C-8E16-03569EE03E20}"/>
               </a:ext>
             </a:extLst>
           </p:cNvPr>
@@ -4634,7 +4634,7 @@
           <p:cNvPr id="2" name="TextBox 1">
             <a:extLst>
               <a:ext uri="{FF2B5EF4-FFF2-40B4-BE49-F238E27FC236}">
-                <a16:creationId xmlns:a16="http://schemas.microsoft.com/office/drawing/2014/main" xmlns="" id="{355D4B17-FAA9-2246-880F-B624AC139319}"/>
+                <a16:creationId xmlns:a16="http://schemas.microsoft.com/office/drawing/2014/main" id="{355D4B17-FAA9-2246-880F-B624AC139319}"/>
               </a:ext>
             </a:extLst>
           </p:cNvPr>
@@ -4684,7 +4684,7 @@
           <p:cNvPr id="3" name="TextBox 2">
             <a:extLst>
               <a:ext uri="{FF2B5EF4-FFF2-40B4-BE49-F238E27FC236}">
-                <a16:creationId xmlns:a16="http://schemas.microsoft.com/office/drawing/2014/main" xmlns="" id="{7EE6EAA5-43F3-794C-8A34-21DD38BEBDB1}"/>
+                <a16:creationId xmlns:a16="http://schemas.microsoft.com/office/drawing/2014/main" id="{7EE6EAA5-43F3-794C-8A34-21DD38BEBDB1}"/>
               </a:ext>
             </a:extLst>
           </p:cNvPr>
@@ -4734,7 +4734,7 @@
           <p:cNvPr id="4" name="TextBox 3">
             <a:extLst>
               <a:ext uri="{FF2B5EF4-FFF2-40B4-BE49-F238E27FC236}">
-                <a16:creationId xmlns:a16="http://schemas.microsoft.com/office/drawing/2014/main" xmlns="" id="{29B1FDE7-B120-4C40-BFEB-9087D0459BE0}"/>
+                <a16:creationId xmlns:a16="http://schemas.microsoft.com/office/drawing/2014/main" id="{29B1FDE7-B120-4C40-BFEB-9087D0459BE0}"/>
               </a:ext>
             </a:extLst>
           </p:cNvPr>
@@ -4786,7 +4786,7 @@
           <p:cNvPr id="5" name="TextBox 4">
             <a:extLst>
               <a:ext uri="{FF2B5EF4-FFF2-40B4-BE49-F238E27FC236}">
-                <a16:creationId xmlns:a16="http://schemas.microsoft.com/office/drawing/2014/main" xmlns="" id="{3E4C0948-472F-4844-9919-63399CE33A92}"/>
+                <a16:creationId xmlns:a16="http://schemas.microsoft.com/office/drawing/2014/main" id="{3E4C0948-472F-4844-9919-63399CE33A92}"/>
               </a:ext>
             </a:extLst>
           </p:cNvPr>
@@ -4842,7 +4842,7 @@
           <p:cNvPr id="6" name="TextBox 5">
             <a:extLst>
               <a:ext uri="{FF2B5EF4-FFF2-40B4-BE49-F238E27FC236}">
-                <a16:creationId xmlns:a16="http://schemas.microsoft.com/office/drawing/2014/main" xmlns="" id="{5299F8B4-B096-E74D-A993-ACD695CBD396}"/>
+                <a16:creationId xmlns:a16="http://schemas.microsoft.com/office/drawing/2014/main" id="{5299F8B4-B096-E74D-A993-ACD695CBD396}"/>
               </a:ext>
             </a:extLst>
           </p:cNvPr>
@@ -4892,7 +4892,7 @@
           <p:cNvPr id="7" name="TextBox 6">
             <a:extLst>
               <a:ext uri="{FF2B5EF4-FFF2-40B4-BE49-F238E27FC236}">
-                <a16:creationId xmlns:a16="http://schemas.microsoft.com/office/drawing/2014/main" xmlns="" id="{9D66BD97-CD94-B04F-8714-7957FD62460D}"/>
+                <a16:creationId xmlns:a16="http://schemas.microsoft.com/office/drawing/2014/main" id="{9D66BD97-CD94-B04F-8714-7957FD62460D}"/>
               </a:ext>
             </a:extLst>
           </p:cNvPr>
@@ -4954,7 +4954,7 @@
           <p:cNvPr id="8" name="TextBox 7">
             <a:extLst>
               <a:ext uri="{FF2B5EF4-FFF2-40B4-BE49-F238E27FC236}">
-                <a16:creationId xmlns:a16="http://schemas.microsoft.com/office/drawing/2014/main" xmlns="" id="{1A339EF1-8A6F-7E48-8A88-4BE399239380}"/>
+                <a16:creationId xmlns:a16="http://schemas.microsoft.com/office/drawing/2014/main" id="{1A339EF1-8A6F-7E48-8A88-4BE399239380}"/>
               </a:ext>
             </a:extLst>
           </p:cNvPr>
@@ -5040,7 +5040,7 @@
           <p:cNvPr id="2" name="TextBox 1">
             <a:extLst>
               <a:ext uri="{FF2B5EF4-FFF2-40B4-BE49-F238E27FC236}">
-                <a16:creationId xmlns:a16="http://schemas.microsoft.com/office/drawing/2014/main" xmlns="" id="{17BD675A-201F-F546-9F3B-1683770873E1}"/>
+                <a16:creationId xmlns:a16="http://schemas.microsoft.com/office/drawing/2014/main" id="{17BD675A-201F-F546-9F3B-1683770873E1}"/>
               </a:ext>
             </a:extLst>
           </p:cNvPr>
@@ -5075,7 +5075,7 @@
           <p:cNvPr id="3" name="Picture 2">
             <a:extLst>
               <a:ext uri="{FF2B5EF4-FFF2-40B4-BE49-F238E27FC236}">
-                <a16:creationId xmlns:a16="http://schemas.microsoft.com/office/drawing/2014/main" xmlns="" id="{D875028F-597C-434D-B524-71CCC9451BE0}"/>
+                <a16:creationId xmlns:a16="http://schemas.microsoft.com/office/drawing/2014/main" id="{D875028F-597C-434D-B524-71CCC9451BE0}"/>
               </a:ext>
             </a:extLst>
           </p:cNvPr>
@@ -5105,7 +5105,7 @@
           <p:cNvPr id="4" name="Picture 3">
             <a:extLst>
               <a:ext uri="{FF2B5EF4-FFF2-40B4-BE49-F238E27FC236}">
-                <a16:creationId xmlns:a16="http://schemas.microsoft.com/office/drawing/2014/main" xmlns="" id="{6F1FC3F2-1264-EC4B-90D1-227E0BD35C5D}"/>
+                <a16:creationId xmlns:a16="http://schemas.microsoft.com/office/drawing/2014/main" id="{6F1FC3F2-1264-EC4B-90D1-227E0BD35C5D}"/>
               </a:ext>
             </a:extLst>
           </p:cNvPr>
@@ -5130,6 +5130,168 @@
           </a:prstGeom>
         </p:spPr>
       </p:pic>
+      <p:sp>
+        <p:nvSpPr>
+          <p:cNvPr id="5" name="TextBox 4">
+            <a:extLst>
+              <a:ext uri="{FF2B5EF4-FFF2-40B4-BE49-F238E27FC236}">
+                <a16:creationId xmlns:a16="http://schemas.microsoft.com/office/drawing/2014/main" id="{3B1886A2-93A1-BC4E-9015-13A2B6B73A99}"/>
+              </a:ext>
+            </a:extLst>
+          </p:cNvPr>
+          <p:cNvSpPr txBox="1"/>
+          <p:nvPr/>
+        </p:nvSpPr>
+        <p:spPr>
+          <a:xfrm>
+            <a:off x="6100184" y="2678117"/>
+            <a:ext cx="2167516" cy="369332"/>
+          </a:xfrm>
+          <a:prstGeom prst="rect">
+            <a:avLst/>
+          </a:prstGeom>
+          <a:noFill/>
+        </p:spPr>
+        <p:txBody>
+          <a:bodyPr wrap="none" rtlCol="0">
+            <a:spAutoFit/>
+          </a:bodyPr>
+          <a:lstStyle/>
+          <a:p>
+            <a:r>
+              <a:rPr lang="en-BR" b="1" dirty="0"/>
+              <a:t>Entrada Palete Cheio</a:t>
+            </a:r>
+          </a:p>
+        </p:txBody>
+      </p:sp>
+      <p:sp>
+        <p:nvSpPr>
+          <p:cNvPr id="6" name="TextBox 5">
+            <a:extLst>
+              <a:ext uri="{FF2B5EF4-FFF2-40B4-BE49-F238E27FC236}">
+                <a16:creationId xmlns:a16="http://schemas.microsoft.com/office/drawing/2014/main" id="{1A5CD4A9-A019-DE4B-BB3B-18404DC0C114}"/>
+              </a:ext>
+            </a:extLst>
+          </p:cNvPr>
+          <p:cNvSpPr txBox="1"/>
+          <p:nvPr/>
+        </p:nvSpPr>
+        <p:spPr>
+          <a:xfrm>
+            <a:off x="4096168" y="3937741"/>
+            <a:ext cx="1942263" cy="369332"/>
+          </a:xfrm>
+          <a:prstGeom prst="rect">
+            <a:avLst/>
+          </a:prstGeom>
+          <a:noFill/>
+        </p:spPr>
+        <p:txBody>
+          <a:bodyPr wrap="none" rtlCol="0">
+            <a:spAutoFit/>
+          </a:bodyPr>
+          <a:lstStyle/>
+          <a:p>
+            <a:r>
+              <a:rPr lang="en-BR" b="1" dirty="0"/>
+              <a:t>Saida Palete Cheio</a:t>
+            </a:r>
+          </a:p>
+        </p:txBody>
+      </p:sp>
+      <p:sp>
+        <p:nvSpPr>
+          <p:cNvPr id="7" name="Rectangle 6">
+            <a:extLst>
+              <a:ext uri="{FF2B5EF4-FFF2-40B4-BE49-F238E27FC236}">
+                <a16:creationId xmlns:a16="http://schemas.microsoft.com/office/drawing/2014/main" id="{9CC158DE-A727-E14A-9479-96170D596C2F}"/>
+              </a:ext>
+            </a:extLst>
+          </p:cNvPr>
+          <p:cNvSpPr/>
+          <p:nvPr/>
+        </p:nvSpPr>
+        <p:spPr>
+          <a:xfrm>
+            <a:off x="2708031" y="2133049"/>
+            <a:ext cx="5559669" cy="2314701"/>
+          </a:xfrm>
+          <a:prstGeom prst="rect">
+            <a:avLst/>
+          </a:prstGeom>
+          <a:noFill/>
+          <a:ln w="79375">
+            <a:solidFill>
+              <a:srgbClr val="FF0000"/>
+            </a:solidFill>
+            <a:prstDash val="sysDot"/>
+          </a:ln>
+        </p:spPr>
+        <p:style>
+          <a:lnRef idx="2">
+            <a:schemeClr val="accent1">
+              <a:shade val="50000"/>
+            </a:schemeClr>
+          </a:lnRef>
+          <a:fillRef idx="1">
+            <a:schemeClr val="accent1"/>
+          </a:fillRef>
+          <a:effectRef idx="0">
+            <a:schemeClr val="accent1"/>
+          </a:effectRef>
+          <a:fontRef idx="minor">
+            <a:schemeClr val="lt1"/>
+          </a:fontRef>
+        </p:style>
+        <p:txBody>
+          <a:bodyPr rtlCol="0" anchor="ctr"/>
+          <a:lstStyle/>
+          <a:p>
+            <a:pPr algn="ctr"/>
+            <a:endParaRPr lang="en-BR"/>
+          </a:p>
+        </p:txBody>
+      </p:sp>
+      <p:sp>
+        <p:nvSpPr>
+          <p:cNvPr id="8" name="TextBox 7">
+            <a:extLst>
+              <a:ext uri="{FF2B5EF4-FFF2-40B4-BE49-F238E27FC236}">
+                <a16:creationId xmlns:a16="http://schemas.microsoft.com/office/drawing/2014/main" id="{19465481-882B-0244-A233-201D58739388}"/>
+              </a:ext>
+            </a:extLst>
+          </p:cNvPr>
+          <p:cNvSpPr txBox="1"/>
+          <p:nvPr/>
+        </p:nvSpPr>
+        <p:spPr>
+          <a:xfrm>
+            <a:off x="9155723" y="4138246"/>
+            <a:ext cx="2527551" cy="369332"/>
+          </a:xfrm>
+          <a:prstGeom prst="rect">
+            <a:avLst/>
+          </a:prstGeom>
+          <a:noFill/>
+        </p:spPr>
+        <p:txBody>
+          <a:bodyPr wrap="none" rtlCol="0">
+            <a:spAutoFit/>
+          </a:bodyPr>
+          <a:lstStyle/>
+          <a:p>
+            <a:r>
+              <a:rPr lang="en-US" dirty="0"/>
+              <a:t>D</a:t>
+            </a:r>
+            <a:r>
+              <a:rPr lang="en-BR" dirty="0"/>
+              <a:t>aqui vai para expedicao</a:t>
+            </a:r>
+          </a:p>
+        </p:txBody>
+      </p:sp>
     </p:spTree>
     <p:extLst>
       <p:ext uri="{BB962C8B-B14F-4D97-AF65-F5344CB8AC3E}">
@@ -5160,6 +5322,247 @@
           <a:chExt cx="0" cy="0"/>
         </a:xfrm>
       </p:grpSpPr>
+      <p:sp>
+        <p:nvSpPr>
+          <p:cNvPr id="2" name="TextBox 1">
+            <a:extLst>
+              <a:ext uri="{FF2B5EF4-FFF2-40B4-BE49-F238E27FC236}">
+                <a16:creationId xmlns:a16="http://schemas.microsoft.com/office/drawing/2014/main" id="{09799DF4-3DF7-8F4F-8F64-9CE573C6B6E8}"/>
+              </a:ext>
+            </a:extLst>
+          </p:cNvPr>
+          <p:cNvSpPr txBox="1"/>
+          <p:nvPr/>
+        </p:nvSpPr>
+        <p:spPr>
+          <a:xfrm>
+            <a:off x="539930" y="544076"/>
+            <a:ext cx="4223657" cy="954107"/>
+          </a:xfrm>
+          <a:prstGeom prst="rect">
+            <a:avLst/>
+          </a:prstGeom>
+          <a:noFill/>
+        </p:spPr>
+        <p:txBody>
+          <a:bodyPr wrap="square" rtlCol="0">
+            <a:spAutoFit/>
+          </a:bodyPr>
+          <a:lstStyle/>
+          <a:p>
+            <a:r>
+              <a:rPr lang="x-none" sz="1400" b="1" dirty="0"/>
+              <a:t>CALL 1 </a:t>
+            </a:r>
+            <a:r>
+              <a:rPr lang="x-none" sz="1400" b="1"/>
+              <a:t>– </a:t>
+            </a:r>
+            <a:r>
+              <a:rPr lang="pt-BR" sz="1400" b="1" dirty="0"/>
+              <a:t>ABASTECE COM PALLET CHEIO</a:t>
+            </a:r>
+            <a:endParaRPr lang="x-none" sz="1400" b="1" dirty="0"/>
+          </a:p>
+          <a:p>
+            <a:endParaRPr lang="x-none" sz="1400" b="1" dirty="0"/>
+          </a:p>
+          <a:p>
+            <a:r>
+              <a:rPr lang="x-none" sz="1400" b="1" dirty="0"/>
+              <a:t>1 – CARGA </a:t>
+            </a:r>
+            <a:r>
+              <a:rPr lang="x-none" sz="1400" b="1"/>
+              <a:t>PALLETE </a:t>
+            </a:r>
+            <a:r>
+              <a:rPr lang="pt-BR" sz="1400" b="1" dirty="0"/>
+              <a:t>BUFFER</a:t>
+            </a:r>
+            <a:endParaRPr lang="x-none" sz="1400" b="1" dirty="0"/>
+          </a:p>
+          <a:p>
+            <a:r>
+              <a:rPr lang="x-none" sz="1400" b="1" dirty="0"/>
+              <a:t>2 – DESCARGA </a:t>
+            </a:r>
+            <a:r>
+              <a:rPr lang="x-none" sz="1400" b="1"/>
+              <a:t>PALLETE </a:t>
+            </a:r>
+            <a:r>
+              <a:rPr lang="pt-BR" sz="1400" b="1" dirty="0"/>
+              <a:t>MAQUINA</a:t>
+            </a:r>
+            <a:r>
+              <a:rPr lang="x-none" sz="1400" b="1"/>
+              <a:t> </a:t>
+            </a:r>
+            <a:endParaRPr lang="x-none" sz="1400" b="1" dirty="0"/>
+          </a:p>
+        </p:txBody>
+      </p:sp>
+      <p:sp>
+        <p:nvSpPr>
+          <p:cNvPr id="3" name="TextBox 2">
+            <a:extLst>
+              <a:ext uri="{FF2B5EF4-FFF2-40B4-BE49-F238E27FC236}">
+                <a16:creationId xmlns:a16="http://schemas.microsoft.com/office/drawing/2014/main" id="{191D2A27-804B-524A-BDF4-F01F23E01957}"/>
+              </a:ext>
+            </a:extLst>
+          </p:cNvPr>
+          <p:cNvSpPr txBox="1"/>
+          <p:nvPr/>
+        </p:nvSpPr>
+        <p:spPr>
+          <a:xfrm>
+            <a:off x="6096000" y="544075"/>
+            <a:ext cx="4223657" cy="954107"/>
+          </a:xfrm>
+          <a:prstGeom prst="rect">
+            <a:avLst/>
+          </a:prstGeom>
+          <a:noFill/>
+        </p:spPr>
+        <p:txBody>
+          <a:bodyPr wrap="square" rtlCol="0">
+            <a:spAutoFit/>
+          </a:bodyPr>
+          <a:lstStyle/>
+          <a:p>
+            <a:r>
+              <a:rPr lang="x-none" sz="1400" b="1"/>
+              <a:t>CALL </a:t>
+            </a:r>
+            <a:r>
+              <a:rPr lang="pt-BR" sz="1400" b="1" dirty="0"/>
+              <a:t>2</a:t>
+            </a:r>
+            <a:r>
+              <a:rPr lang="x-none" sz="1400" b="1"/>
+              <a:t> – </a:t>
+            </a:r>
+            <a:r>
+              <a:rPr lang="pt-BR" sz="1400" b="1" dirty="0"/>
+              <a:t>RETIRA PALLET SAIDA MAQUINA</a:t>
+            </a:r>
+          </a:p>
+          <a:p>
+            <a:endParaRPr lang="x-none" sz="1400" b="1" dirty="0"/>
+          </a:p>
+          <a:p>
+            <a:r>
+              <a:rPr lang="x-none" sz="1400" b="1" dirty="0"/>
+              <a:t>1 – </a:t>
+            </a:r>
+            <a:r>
+              <a:rPr lang="x-none" sz="1400" b="1"/>
+              <a:t>CARGA </a:t>
+            </a:r>
+            <a:r>
+              <a:rPr lang="pt-BR" sz="1400" b="1" dirty="0"/>
+              <a:t>PALLET SAIDA MAQUINA</a:t>
+            </a:r>
+            <a:endParaRPr lang="x-none" sz="1400" b="1" dirty="0"/>
+          </a:p>
+          <a:p>
+            <a:r>
+              <a:rPr lang="x-none" sz="1400" b="1" dirty="0"/>
+              <a:t>2 – </a:t>
+            </a:r>
+            <a:r>
+              <a:rPr lang="x-none" sz="1400" b="1"/>
+              <a:t>DESCARGA </a:t>
+            </a:r>
+            <a:r>
+              <a:rPr lang="pt-BR" sz="1400" b="1" dirty="0"/>
+              <a:t>EXPEDICAO</a:t>
+            </a:r>
+            <a:endParaRPr lang="x-none" sz="1400" b="1" dirty="0"/>
+          </a:p>
+        </p:txBody>
+      </p:sp>
+      <p:sp>
+        <p:nvSpPr>
+          <p:cNvPr id="4" name="TextBox 3">
+            <a:extLst>
+              <a:ext uri="{FF2B5EF4-FFF2-40B4-BE49-F238E27FC236}">
+                <a16:creationId xmlns:a16="http://schemas.microsoft.com/office/drawing/2014/main" id="{9A467B06-A9A3-A94A-82D8-46C22FA6696B}"/>
+              </a:ext>
+            </a:extLst>
+          </p:cNvPr>
+          <p:cNvSpPr txBox="1"/>
+          <p:nvPr/>
+        </p:nvSpPr>
+        <p:spPr>
+          <a:xfrm>
+            <a:off x="539930" y="2761758"/>
+            <a:ext cx="4223657" cy="954107"/>
+          </a:xfrm>
+          <a:prstGeom prst="rect">
+            <a:avLst/>
+          </a:prstGeom>
+          <a:noFill/>
+        </p:spPr>
+        <p:txBody>
+          <a:bodyPr wrap="square" rtlCol="0">
+            <a:spAutoFit/>
+          </a:bodyPr>
+          <a:lstStyle/>
+          <a:p>
+            <a:r>
+              <a:rPr lang="x-none" sz="1400" b="1"/>
+              <a:t>CALL </a:t>
+            </a:r>
+            <a:r>
+              <a:rPr lang="pt-BR" sz="1400" b="1" dirty="0"/>
+              <a:t>3</a:t>
+            </a:r>
+            <a:r>
+              <a:rPr lang="x-none" sz="1400" b="1"/>
+              <a:t> – </a:t>
+            </a:r>
+            <a:r>
+              <a:rPr lang="pt-BR" sz="1400" b="1" dirty="0"/>
+              <a:t>RETIRA PALLET ERRADO ENTRADA MAQUINA</a:t>
+            </a:r>
+          </a:p>
+          <a:p>
+            <a:endParaRPr lang="x-none" sz="1400" b="1" dirty="0"/>
+          </a:p>
+          <a:p>
+            <a:r>
+              <a:rPr lang="x-none" sz="1400" b="1" dirty="0"/>
+              <a:t>1 – </a:t>
+            </a:r>
+            <a:r>
+              <a:rPr lang="x-none" sz="1400" b="1"/>
+              <a:t>CARGA </a:t>
+            </a:r>
+            <a:r>
+              <a:rPr lang="pt-BR" sz="1400" b="1" dirty="0"/>
+              <a:t>PALLET ENTRADA MAQUINA</a:t>
+            </a:r>
+            <a:endParaRPr lang="x-none" sz="1400" b="1" dirty="0"/>
+          </a:p>
+          <a:p>
+            <a:r>
+              <a:rPr lang="x-none" sz="1400" b="1" dirty="0"/>
+              <a:t>2 – </a:t>
+            </a:r>
+            <a:r>
+              <a:rPr lang="x-none" sz="1400" b="1"/>
+              <a:t>DESCARGA </a:t>
+            </a:r>
+            <a:r>
+              <a:rPr lang="pt-BR" sz="1400" b="1" dirty="0"/>
+              <a:t>NO BUFFER</a:t>
+            </a:r>
+            <a:endParaRPr lang="x-none" sz="1400" b="1" dirty="0"/>
+          </a:p>
+        </p:txBody>
+      </p:sp>
     </p:spTree>
     <p:extLst>
       <p:ext uri="{BB962C8B-B14F-4D97-AF65-F5344CB8AC3E}">
@@ -5195,7 +5598,7 @@
           <p:cNvPr id="2" name="TextBox 1">
             <a:extLst>
               <a:ext uri="{FF2B5EF4-FFF2-40B4-BE49-F238E27FC236}">
-                <a16:creationId xmlns:a16="http://schemas.microsoft.com/office/drawing/2014/main" xmlns="" id="{17BD675A-201F-F546-9F3B-1683770873E1}"/>
+                <a16:creationId xmlns:a16="http://schemas.microsoft.com/office/drawing/2014/main" id="{17BD675A-201F-F546-9F3B-1683770873E1}"/>
               </a:ext>
             </a:extLst>
           </p:cNvPr>
@@ -5205,7 +5608,7 @@
         <p:spPr>
           <a:xfrm>
             <a:off x="595086" y="544285"/>
-            <a:ext cx="4101187" cy="584775"/>
+            <a:ext cx="5407129" cy="584775"/>
           </a:xfrm>
           <a:prstGeom prst="rect">
             <a:avLst/>
@@ -5213,7 +5616,7 @@
           <a:noFill/>
         </p:spPr>
         <p:txBody>
-          <a:bodyPr wrap="none" rtlCol="0">
+          <a:bodyPr wrap="square" rtlCol="0">
             <a:spAutoFit/>
           </a:bodyPr>
           <a:lstStyle/>
@@ -5230,7 +5633,7 @@
           <p:cNvPr id="3" name="Picture 2">
             <a:extLst>
               <a:ext uri="{FF2B5EF4-FFF2-40B4-BE49-F238E27FC236}">
-                <a16:creationId xmlns:a16="http://schemas.microsoft.com/office/drawing/2014/main" xmlns="" id="{939C22A3-BB9B-F04D-927D-586D2FDAA699}"/>
+                <a16:creationId xmlns:a16="http://schemas.microsoft.com/office/drawing/2014/main" id="{939C22A3-BB9B-F04D-927D-586D2FDAA699}"/>
               </a:ext>
             </a:extLst>
           </p:cNvPr>
@@ -5260,7 +5663,7 @@
           <p:cNvPr id="4" name="Picture 3">
             <a:extLst>
               <a:ext uri="{FF2B5EF4-FFF2-40B4-BE49-F238E27FC236}">
-                <a16:creationId xmlns:a16="http://schemas.microsoft.com/office/drawing/2014/main" xmlns="" id="{691C04C8-E0DE-2F42-8DB8-C3DB20D9BC67}"/>
+                <a16:creationId xmlns:a16="http://schemas.microsoft.com/office/drawing/2014/main" id="{691C04C8-E0DE-2F42-8DB8-C3DB20D9BC67}"/>
               </a:ext>
             </a:extLst>
           </p:cNvPr>
@@ -5285,6 +5688,133 @@
           </a:prstGeom>
         </p:spPr>
       </p:pic>
+      <p:sp>
+        <p:nvSpPr>
+          <p:cNvPr id="5" name="TextBox 4">
+            <a:extLst>
+              <a:ext uri="{FF2B5EF4-FFF2-40B4-BE49-F238E27FC236}">
+                <a16:creationId xmlns:a16="http://schemas.microsoft.com/office/drawing/2014/main" id="{5464EE77-5C4A-B049-9D01-54994681642E}"/>
+              </a:ext>
+            </a:extLst>
+          </p:cNvPr>
+          <p:cNvSpPr txBox="1"/>
+          <p:nvPr/>
+        </p:nvSpPr>
+        <p:spPr>
+          <a:xfrm>
+            <a:off x="1588906" y="5444763"/>
+            <a:ext cx="2853410" cy="369332"/>
+          </a:xfrm>
+          <a:prstGeom prst="rect">
+            <a:avLst/>
+          </a:prstGeom>
+          <a:noFill/>
+        </p:spPr>
+        <p:txBody>
+          <a:bodyPr wrap="none" rtlCol="0">
+            <a:spAutoFit/>
+          </a:bodyPr>
+          <a:lstStyle/>
+          <a:p>
+            <a:r>
+              <a:rPr lang="en-BR" b="1" dirty="0"/>
+              <a:t>Entrada/SAIDA Palete Cheio</a:t>
+            </a:r>
+          </a:p>
+        </p:txBody>
+      </p:sp>
+      <p:sp>
+        <p:nvSpPr>
+          <p:cNvPr id="8" name="TextBox 7">
+            <a:extLst>
+              <a:ext uri="{FF2B5EF4-FFF2-40B4-BE49-F238E27FC236}">
+                <a16:creationId xmlns:a16="http://schemas.microsoft.com/office/drawing/2014/main" id="{919F8586-C3E1-B347-AA35-3E7403393EFD}"/>
+              </a:ext>
+            </a:extLst>
+          </p:cNvPr>
+          <p:cNvSpPr txBox="1"/>
+          <p:nvPr/>
+        </p:nvSpPr>
+        <p:spPr>
+          <a:xfrm>
+            <a:off x="9155723" y="4138246"/>
+            <a:ext cx="2527551" cy="369332"/>
+          </a:xfrm>
+          <a:prstGeom prst="rect">
+            <a:avLst/>
+          </a:prstGeom>
+          <a:noFill/>
+        </p:spPr>
+        <p:txBody>
+          <a:bodyPr wrap="none" rtlCol="0">
+            <a:spAutoFit/>
+          </a:bodyPr>
+          <a:lstStyle/>
+          <a:p>
+            <a:r>
+              <a:rPr lang="en-US" dirty="0"/>
+              <a:t>D</a:t>
+            </a:r>
+            <a:r>
+              <a:rPr lang="en-BR" dirty="0"/>
+              <a:t>aqui vai para expedicao</a:t>
+            </a:r>
+          </a:p>
+        </p:txBody>
+      </p:sp>
+      <p:sp>
+        <p:nvSpPr>
+          <p:cNvPr id="9" name="Rectangle 8">
+            <a:extLst>
+              <a:ext uri="{FF2B5EF4-FFF2-40B4-BE49-F238E27FC236}">
+                <a16:creationId xmlns:a16="http://schemas.microsoft.com/office/drawing/2014/main" id="{981C84AF-49D0-4048-B504-A08820F2DD01}"/>
+              </a:ext>
+            </a:extLst>
+          </p:cNvPr>
+          <p:cNvSpPr/>
+          <p:nvPr/>
+        </p:nvSpPr>
+        <p:spPr>
+          <a:xfrm>
+            <a:off x="1241839" y="4168417"/>
+            <a:ext cx="3314396" cy="2314701"/>
+          </a:xfrm>
+          <a:prstGeom prst="rect">
+            <a:avLst/>
+          </a:prstGeom>
+          <a:noFill/>
+          <a:ln w="79375">
+            <a:solidFill>
+              <a:srgbClr val="FF0000"/>
+            </a:solidFill>
+            <a:prstDash val="sysDot"/>
+          </a:ln>
+        </p:spPr>
+        <p:style>
+          <a:lnRef idx="2">
+            <a:schemeClr val="accent1">
+              <a:shade val="50000"/>
+            </a:schemeClr>
+          </a:lnRef>
+          <a:fillRef idx="1">
+            <a:schemeClr val="accent1"/>
+          </a:fillRef>
+          <a:effectRef idx="0">
+            <a:schemeClr val="accent1"/>
+          </a:effectRef>
+          <a:fontRef idx="minor">
+            <a:schemeClr val="lt1"/>
+          </a:fontRef>
+        </p:style>
+        <p:txBody>
+          <a:bodyPr rtlCol="0" anchor="ctr"/>
+          <a:lstStyle/>
+          <a:p>
+            <a:pPr algn="ctr"/>
+            <a:endParaRPr lang="en-BR"/>
+          </a:p>
+        </p:txBody>
+      </p:sp>
     </p:spTree>
     <p:extLst>
       <p:ext uri="{BB962C8B-B14F-4D97-AF65-F5344CB8AC3E}">
@@ -5315,6 +5845,167 @@
           <a:chExt cx="0" cy="0"/>
         </a:xfrm>
       </p:grpSpPr>
+      <p:sp>
+        <p:nvSpPr>
+          <p:cNvPr id="2" name="TextBox 1">
+            <a:extLst>
+              <a:ext uri="{FF2B5EF4-FFF2-40B4-BE49-F238E27FC236}">
+                <a16:creationId xmlns:a16="http://schemas.microsoft.com/office/drawing/2014/main" id="{3407E5F0-FB88-8E4A-A1EA-72460ECF95C4}"/>
+              </a:ext>
+            </a:extLst>
+          </p:cNvPr>
+          <p:cNvSpPr txBox="1"/>
+          <p:nvPr/>
+        </p:nvSpPr>
+        <p:spPr>
+          <a:xfrm>
+            <a:off x="539930" y="544076"/>
+            <a:ext cx="4223657" cy="954107"/>
+          </a:xfrm>
+          <a:prstGeom prst="rect">
+            <a:avLst/>
+          </a:prstGeom>
+          <a:noFill/>
+        </p:spPr>
+        <p:txBody>
+          <a:bodyPr wrap="square" rtlCol="0">
+            <a:spAutoFit/>
+          </a:bodyPr>
+          <a:lstStyle/>
+          <a:p>
+            <a:r>
+              <a:rPr lang="x-none" sz="1400" b="1" dirty="0"/>
+              <a:t>CALL 1 </a:t>
+            </a:r>
+            <a:r>
+              <a:rPr lang="x-none" sz="1400" b="1"/>
+              <a:t>– </a:t>
+            </a:r>
+            <a:r>
+              <a:rPr lang="pt-BR" sz="1400" b="1" dirty="0"/>
+              <a:t>ABASTECE COM PALLET</a:t>
+            </a:r>
+            <a:endParaRPr lang="x-none" sz="1400" b="1" dirty="0"/>
+          </a:p>
+          <a:p>
+            <a:endParaRPr lang="x-none" sz="1400" b="1" dirty="0"/>
+          </a:p>
+          <a:p>
+            <a:r>
+              <a:rPr lang="x-none" sz="1400" b="1" dirty="0"/>
+              <a:t>1 – CARGA </a:t>
+            </a:r>
+            <a:r>
+              <a:rPr lang="x-none" sz="1400" b="1"/>
+              <a:t>PALLETE </a:t>
+            </a:r>
+            <a:r>
+              <a:rPr lang="pt-BR" sz="1400" b="1" dirty="0"/>
+              <a:t>BUFFER</a:t>
+            </a:r>
+            <a:endParaRPr lang="x-none" sz="1400" b="1" dirty="0"/>
+          </a:p>
+          <a:p>
+            <a:r>
+              <a:rPr lang="x-none" sz="1400" b="1" dirty="0"/>
+              <a:t>2 – DESCARGA </a:t>
+            </a:r>
+            <a:r>
+              <a:rPr lang="x-none" sz="1400" b="1"/>
+              <a:t>PALLETE </a:t>
+            </a:r>
+            <a:r>
+              <a:rPr lang="pt-BR" sz="1400" b="1" dirty="0"/>
+              <a:t>MAQUINA</a:t>
+            </a:r>
+            <a:r>
+              <a:rPr lang="x-none" sz="1400" b="1"/>
+              <a:t> </a:t>
+            </a:r>
+            <a:endParaRPr lang="x-none" sz="1400" b="1" dirty="0"/>
+          </a:p>
+        </p:txBody>
+      </p:sp>
+      <p:sp>
+        <p:nvSpPr>
+          <p:cNvPr id="3" name="TextBox 2">
+            <a:extLst>
+              <a:ext uri="{FF2B5EF4-FFF2-40B4-BE49-F238E27FC236}">
+                <a16:creationId xmlns:a16="http://schemas.microsoft.com/office/drawing/2014/main" id="{2E6E0244-690C-CF48-B7A8-59600BD7EAD9}"/>
+              </a:ext>
+            </a:extLst>
+          </p:cNvPr>
+          <p:cNvSpPr txBox="1"/>
+          <p:nvPr/>
+        </p:nvSpPr>
+        <p:spPr>
+          <a:xfrm>
+            <a:off x="6096000" y="544075"/>
+            <a:ext cx="4223657" cy="954107"/>
+          </a:xfrm>
+          <a:prstGeom prst="rect">
+            <a:avLst/>
+          </a:prstGeom>
+          <a:noFill/>
+        </p:spPr>
+        <p:txBody>
+          <a:bodyPr wrap="square" rtlCol="0">
+            <a:spAutoFit/>
+          </a:bodyPr>
+          <a:lstStyle/>
+          <a:p>
+            <a:r>
+              <a:rPr lang="x-none" sz="1400" b="1"/>
+              <a:t>CALL </a:t>
+            </a:r>
+            <a:r>
+              <a:rPr lang="pt-BR" sz="1400" b="1" dirty="0"/>
+              <a:t>2</a:t>
+            </a:r>
+            <a:r>
+              <a:rPr lang="x-none" sz="1400" b="1"/>
+              <a:t> – </a:t>
+            </a:r>
+            <a:r>
+              <a:rPr lang="pt-BR" sz="1400" b="1" dirty="0"/>
+              <a:t>RETIRA PALLET</a:t>
+            </a:r>
+          </a:p>
+          <a:p>
+            <a:endParaRPr lang="x-none" sz="1400" b="1" dirty="0"/>
+          </a:p>
+          <a:p>
+            <a:r>
+              <a:rPr lang="x-none" sz="1400" b="1" dirty="0"/>
+              <a:t>1 – </a:t>
+            </a:r>
+            <a:r>
+              <a:rPr lang="x-none" sz="1400" b="1"/>
+              <a:t>CARGA </a:t>
+            </a:r>
+            <a:r>
+              <a:rPr lang="pt-BR" sz="1400" b="1" dirty="0"/>
+              <a:t>PALLET SAIDA MAQUINA</a:t>
+            </a:r>
+            <a:endParaRPr lang="x-none" sz="1400" b="1" dirty="0"/>
+          </a:p>
+          <a:p>
+            <a:r>
+              <a:rPr lang="x-none" sz="1400" b="1" dirty="0"/>
+              <a:t>2 – </a:t>
+            </a:r>
+            <a:r>
+              <a:rPr lang="x-none" sz="1400" b="1"/>
+              <a:t>DESCARGA </a:t>
+            </a:r>
+            <a:r>
+              <a:rPr lang="pt-BR" sz="1400" b="1" dirty="0"/>
+              <a:t>EXPEDICAO</a:t>
+            </a:r>
+            <a:endParaRPr lang="x-none" sz="1400" b="1" dirty="0"/>
+          </a:p>
+        </p:txBody>
+      </p:sp>
     </p:spTree>
     <p:extLst>
       <p:ext uri="{BB962C8B-B14F-4D97-AF65-F5344CB8AC3E}">
@@ -5350,7 +6041,7 @@
           <p:cNvPr id="2" name="TextBox 1">
             <a:extLst>
               <a:ext uri="{FF2B5EF4-FFF2-40B4-BE49-F238E27FC236}">
-                <a16:creationId xmlns:a16="http://schemas.microsoft.com/office/drawing/2014/main" xmlns="" id="{17BD675A-201F-F546-9F3B-1683770873E1}"/>
+                <a16:creationId xmlns:a16="http://schemas.microsoft.com/office/drawing/2014/main" id="{17BD675A-201F-F546-9F3B-1683770873E1}"/>
               </a:ext>
             </a:extLst>
           </p:cNvPr>
@@ -5359,8 +6050,8 @@
         </p:nvSpPr>
         <p:spPr>
           <a:xfrm>
-            <a:off x="595086" y="544285"/>
-            <a:ext cx="1373902" cy="584775"/>
+            <a:off x="595085" y="544285"/>
+            <a:ext cx="3461099" cy="584775"/>
           </a:xfrm>
           <a:prstGeom prst="rect">
             <a:avLst/>
@@ -5368,15 +6059,20 @@
           <a:noFill/>
         </p:spPr>
         <p:txBody>
-          <a:bodyPr wrap="none" rtlCol="0">
+          <a:bodyPr wrap="square" rtlCol="0">
             <a:spAutoFit/>
           </a:bodyPr>
           <a:lstStyle/>
           <a:p>
             <a:r>
-              <a:rPr lang="x-none" sz="3200" b="1" dirty="0"/>
+              <a:rPr lang="x-none" sz="3200" b="1"/>
               <a:t>AREA L</a:t>
             </a:r>
+            <a:r>
+              <a:rPr lang="pt-BR" sz="3200" b="1" dirty="0"/>
+              <a:t>  </a:t>
+            </a:r>
+            <a:endParaRPr lang="x-none" sz="3200" b="1" dirty="0"/>
           </a:p>
         </p:txBody>
       </p:sp>
@@ -5385,7 +6081,7 @@
           <p:cNvPr id="3" name="Picture 2">
             <a:extLst>
               <a:ext uri="{FF2B5EF4-FFF2-40B4-BE49-F238E27FC236}">
-                <a16:creationId xmlns:a16="http://schemas.microsoft.com/office/drawing/2014/main" xmlns="" id="{B802BBE6-4381-3142-BAE9-3200A482C823}"/>
+                <a16:creationId xmlns:a16="http://schemas.microsoft.com/office/drawing/2014/main" id="{B802BBE6-4381-3142-BAE9-3200A482C823}"/>
               </a:ext>
             </a:extLst>
           </p:cNvPr>
@@ -5415,7 +6111,7 @@
           <p:cNvPr id="4" name="Picture 3">
             <a:extLst>
               <a:ext uri="{FF2B5EF4-FFF2-40B4-BE49-F238E27FC236}">
-                <a16:creationId xmlns:a16="http://schemas.microsoft.com/office/drawing/2014/main" xmlns="" id="{2E40B3DF-E6F6-F440-9815-92ACA3FFC7B5}"/>
+                <a16:creationId xmlns:a16="http://schemas.microsoft.com/office/drawing/2014/main" id="{2E40B3DF-E6F6-F440-9815-92ACA3FFC7B5}"/>
               </a:ext>
             </a:extLst>
           </p:cNvPr>
@@ -5432,7 +6128,7 @@
         </p:blipFill>
         <p:spPr>
           <a:xfrm>
-            <a:off x="2522220" y="2523582"/>
+            <a:off x="2332695" y="2486904"/>
             <a:ext cx="5090160" cy="3497746"/>
           </a:xfrm>
           <a:prstGeom prst="rect">
@@ -5440,6 +6136,261 @@
           </a:prstGeom>
         </p:spPr>
       </p:pic>
+      <p:sp>
+        <p:nvSpPr>
+          <p:cNvPr id="5" name="TextBox 4">
+            <a:extLst>
+              <a:ext uri="{FF2B5EF4-FFF2-40B4-BE49-F238E27FC236}">
+                <a16:creationId xmlns:a16="http://schemas.microsoft.com/office/drawing/2014/main" id="{86079F6C-B17B-574F-B572-B843D70CDA92}"/>
+              </a:ext>
+            </a:extLst>
+          </p:cNvPr>
+          <p:cNvSpPr txBox="1"/>
+          <p:nvPr/>
+        </p:nvSpPr>
+        <p:spPr>
+          <a:xfrm>
+            <a:off x="1248937" y="1623040"/>
+            <a:ext cx="2167516" cy="369332"/>
+          </a:xfrm>
+          <a:prstGeom prst="rect">
+            <a:avLst/>
+          </a:prstGeom>
+          <a:noFill/>
+        </p:spPr>
+        <p:txBody>
+          <a:bodyPr wrap="none" rtlCol="0">
+            <a:spAutoFit/>
+          </a:bodyPr>
+          <a:lstStyle/>
+          <a:p>
+            <a:r>
+              <a:rPr lang="en-BR" b="1" dirty="0"/>
+              <a:t>Entrada Palete Cheio</a:t>
+            </a:r>
+          </a:p>
+        </p:txBody>
+      </p:sp>
+      <p:sp>
+        <p:nvSpPr>
+          <p:cNvPr id="7" name="TextBox 6">
+            <a:extLst>
+              <a:ext uri="{FF2B5EF4-FFF2-40B4-BE49-F238E27FC236}">
+                <a16:creationId xmlns:a16="http://schemas.microsoft.com/office/drawing/2014/main" id="{C4535E2C-19A7-2547-8C36-7C5350CBE186}"/>
+              </a:ext>
+            </a:extLst>
+          </p:cNvPr>
+          <p:cNvSpPr txBox="1"/>
+          <p:nvPr/>
+        </p:nvSpPr>
+        <p:spPr>
+          <a:xfrm>
+            <a:off x="4491236" y="5921429"/>
+            <a:ext cx="2220416" cy="369332"/>
+          </a:xfrm>
+          <a:prstGeom prst="rect">
+            <a:avLst/>
+          </a:prstGeom>
+          <a:noFill/>
+        </p:spPr>
+        <p:txBody>
+          <a:bodyPr wrap="none" rtlCol="0">
+            <a:spAutoFit/>
+          </a:bodyPr>
+          <a:lstStyle/>
+          <a:p>
+            <a:r>
+              <a:rPr lang="en-BR" b="1" dirty="0"/>
+              <a:t>Entrada Palete Cheio</a:t>
+            </a:r>
+          </a:p>
+        </p:txBody>
+      </p:sp>
+      <p:sp>
+        <p:nvSpPr>
+          <p:cNvPr id="9" name="Rectangle 8">
+            <a:extLst>
+              <a:ext uri="{FF2B5EF4-FFF2-40B4-BE49-F238E27FC236}">
+                <a16:creationId xmlns:a16="http://schemas.microsoft.com/office/drawing/2014/main" id="{2C708398-C9A1-AD43-8C1A-4DD85DE21615}"/>
+              </a:ext>
+            </a:extLst>
+          </p:cNvPr>
+          <p:cNvSpPr/>
+          <p:nvPr/>
+        </p:nvSpPr>
+        <p:spPr>
+          <a:xfrm>
+            <a:off x="4492744" y="4773336"/>
+            <a:ext cx="1289539" cy="1060958"/>
+          </a:xfrm>
+          <a:prstGeom prst="rect">
+            <a:avLst/>
+          </a:prstGeom>
+        </p:spPr>
+        <p:style>
+          <a:lnRef idx="2">
+            <a:schemeClr val="accent1">
+              <a:shade val="50000"/>
+            </a:schemeClr>
+          </a:lnRef>
+          <a:fillRef idx="1">
+            <a:schemeClr val="accent1"/>
+          </a:fillRef>
+          <a:effectRef idx="0">
+            <a:schemeClr val="accent1"/>
+          </a:effectRef>
+          <a:fontRef idx="minor">
+            <a:schemeClr val="lt1"/>
+          </a:fontRef>
+        </p:style>
+        <p:txBody>
+          <a:bodyPr rtlCol="0" anchor="ctr"/>
+          <a:lstStyle/>
+          <a:p>
+            <a:pPr algn="ctr"/>
+            <a:r>
+              <a:rPr lang="en-BR" dirty="0"/>
+              <a:t>BUFFER L</a:t>
+            </a:r>
+          </a:p>
+        </p:txBody>
+      </p:sp>
+      <p:sp>
+        <p:nvSpPr>
+          <p:cNvPr id="10" name="TextBox 9">
+            <a:extLst>
+              <a:ext uri="{FF2B5EF4-FFF2-40B4-BE49-F238E27FC236}">
+                <a16:creationId xmlns:a16="http://schemas.microsoft.com/office/drawing/2014/main" id="{6103DDA4-687E-B54C-A65F-7CF912F917FA}"/>
+              </a:ext>
+            </a:extLst>
+          </p:cNvPr>
+          <p:cNvSpPr txBox="1"/>
+          <p:nvPr/>
+        </p:nvSpPr>
+        <p:spPr>
+          <a:xfrm>
+            <a:off x="7903578" y="4934483"/>
+            <a:ext cx="3504293" cy="923330"/>
+          </a:xfrm>
+          <a:prstGeom prst="rect">
+            <a:avLst/>
+          </a:prstGeom>
+          <a:noFill/>
+        </p:spPr>
+        <p:txBody>
+          <a:bodyPr wrap="none" rtlCol="0">
+            <a:spAutoFit/>
+          </a:bodyPr>
+          <a:lstStyle/>
+          <a:p>
+            <a:r>
+              <a:rPr lang="en-US" dirty="0" err="1"/>
+              <a:t>Produtos</a:t>
+            </a:r>
+            <a:r>
+              <a:rPr lang="en-US" dirty="0"/>
+              <a:t> </a:t>
+            </a:r>
+            <a:r>
+              <a:rPr lang="en-US" dirty="0" err="1"/>
+              <a:t>enviados</a:t>
+            </a:r>
+            <a:r>
+              <a:rPr lang="en-US" dirty="0"/>
+              <a:t> para </a:t>
+            </a:r>
+            <a:r>
+              <a:rPr lang="en-US" dirty="0" err="1"/>
+              <a:t>este</a:t>
+            </a:r>
+            <a:r>
+              <a:rPr lang="en-US" dirty="0"/>
+              <a:t> buffer,</a:t>
+            </a:r>
+          </a:p>
+          <a:p>
+            <a:r>
+              <a:rPr lang="en-US" dirty="0" err="1"/>
+              <a:t>Terminam</a:t>
+            </a:r>
+            <a:r>
+              <a:rPr lang="en-US" dirty="0"/>
+              <a:t> </a:t>
+            </a:r>
+            <a:r>
+              <a:rPr lang="en-US" dirty="0" err="1"/>
+              <a:t>aqui</a:t>
+            </a:r>
+            <a:r>
+              <a:rPr lang="en-US" dirty="0"/>
+              <a:t>.</a:t>
+            </a:r>
+            <a:r>
+              <a:rPr lang="en-BR" dirty="0"/>
+              <a:t> </a:t>
+            </a:r>
+          </a:p>
+          <a:p>
+            <a:r>
+              <a:rPr lang="en-BR" dirty="0"/>
+              <a:t>Apenas coloca produtos no buffer L</a:t>
+            </a:r>
+          </a:p>
+        </p:txBody>
+      </p:sp>
+      <p:sp>
+        <p:nvSpPr>
+          <p:cNvPr id="11" name="Rectangle 10">
+            <a:extLst>
+              <a:ext uri="{FF2B5EF4-FFF2-40B4-BE49-F238E27FC236}">
+                <a16:creationId xmlns:a16="http://schemas.microsoft.com/office/drawing/2014/main" id="{0B60D478-6795-864A-929D-54DFE60E5F11}"/>
+              </a:ext>
+            </a:extLst>
+          </p:cNvPr>
+          <p:cNvSpPr/>
+          <p:nvPr/>
+        </p:nvSpPr>
+        <p:spPr>
+          <a:xfrm>
+            <a:off x="4015892" y="4326355"/>
+            <a:ext cx="3314396" cy="2314701"/>
+          </a:xfrm>
+          <a:prstGeom prst="rect">
+            <a:avLst/>
+          </a:prstGeom>
+          <a:noFill/>
+          <a:ln w="79375">
+            <a:solidFill>
+              <a:srgbClr val="FF0000"/>
+            </a:solidFill>
+            <a:prstDash val="sysDot"/>
+          </a:ln>
+        </p:spPr>
+        <p:style>
+          <a:lnRef idx="2">
+            <a:schemeClr val="accent1">
+              <a:shade val="50000"/>
+            </a:schemeClr>
+          </a:lnRef>
+          <a:fillRef idx="1">
+            <a:schemeClr val="accent1"/>
+          </a:fillRef>
+          <a:effectRef idx="0">
+            <a:schemeClr val="accent1"/>
+          </a:effectRef>
+          <a:fontRef idx="minor">
+            <a:schemeClr val="lt1"/>
+          </a:fontRef>
+        </p:style>
+        <p:txBody>
+          <a:bodyPr rtlCol="0" anchor="ctr"/>
+          <a:lstStyle/>
+          <a:p>
+            <a:pPr algn="ctr"/>
+            <a:endParaRPr lang="en-BR"/>
+          </a:p>
+        </p:txBody>
+      </p:sp>
     </p:spTree>
     <p:extLst>
       <p:ext uri="{BB962C8B-B14F-4D97-AF65-F5344CB8AC3E}">
@@ -5470,6 +6421,42 @@
           <a:chExt cx="0" cy="0"/>
         </a:xfrm>
       </p:grpSpPr>
+      <p:sp>
+        <p:nvSpPr>
+          <p:cNvPr id="2" name="TextBox 1">
+            <a:extLst>
+              <a:ext uri="{FF2B5EF4-FFF2-40B4-BE49-F238E27FC236}">
+                <a16:creationId xmlns:a16="http://schemas.microsoft.com/office/drawing/2014/main" id="{4535EBBE-13AD-0040-AF1B-9CAA75F2F711}"/>
+              </a:ext>
+            </a:extLst>
+          </p:cNvPr>
+          <p:cNvSpPr txBox="1"/>
+          <p:nvPr/>
+        </p:nvSpPr>
+        <p:spPr>
+          <a:xfrm>
+            <a:off x="4260592" y="3121223"/>
+            <a:ext cx="4223657" cy="307777"/>
+          </a:xfrm>
+          <a:prstGeom prst="rect">
+            <a:avLst/>
+          </a:prstGeom>
+          <a:noFill/>
+        </p:spPr>
+        <p:txBody>
+          <a:bodyPr wrap="square" rtlCol="0">
+            <a:spAutoFit/>
+          </a:bodyPr>
+          <a:lstStyle/>
+          <a:p>
+            <a:r>
+              <a:rPr lang="pt-BR" sz="1400" b="1" dirty="0"/>
+              <a:t>Não tem botoeira aqui. Apenas vem material.</a:t>
+            </a:r>
+            <a:endParaRPr lang="x-none" sz="1400" b="1" dirty="0"/>
+          </a:p>
+        </p:txBody>
+      </p:sp>
     </p:spTree>
     <p:extLst>
       <p:ext uri="{BB962C8B-B14F-4D97-AF65-F5344CB8AC3E}">
@@ -5505,7 +6492,7 @@
           <p:cNvPr id="2" name="TextBox 1">
             <a:extLst>
               <a:ext uri="{FF2B5EF4-FFF2-40B4-BE49-F238E27FC236}">
-                <a16:creationId xmlns:a16="http://schemas.microsoft.com/office/drawing/2014/main" xmlns="" id="{17BD675A-201F-F546-9F3B-1683770873E1}"/>
+                <a16:creationId xmlns:a16="http://schemas.microsoft.com/office/drawing/2014/main" id="{17BD675A-201F-F546-9F3B-1683770873E1}"/>
               </a:ext>
             </a:extLst>
           </p:cNvPr>
@@ -5540,7 +6527,7 @@
           <p:cNvPr id="3" name="Picture 2">
             <a:extLst>
               <a:ext uri="{FF2B5EF4-FFF2-40B4-BE49-F238E27FC236}">
-                <a16:creationId xmlns:a16="http://schemas.microsoft.com/office/drawing/2014/main" xmlns="" id="{613B1F5F-91AC-EC48-BF67-97FDB801B7EC}"/>
+                <a16:creationId xmlns:a16="http://schemas.microsoft.com/office/drawing/2014/main" id="{613B1F5F-91AC-EC48-BF67-97FDB801B7EC}"/>
               </a:ext>
             </a:extLst>
           </p:cNvPr>
@@ -5570,7 +6557,7 @@
           <p:cNvPr id="4" name="Picture 3">
             <a:extLst>
               <a:ext uri="{FF2B5EF4-FFF2-40B4-BE49-F238E27FC236}">
-                <a16:creationId xmlns:a16="http://schemas.microsoft.com/office/drawing/2014/main" xmlns="" id="{65E0D97F-5C8C-534A-807E-DC9F473C3886}"/>
+                <a16:creationId xmlns:a16="http://schemas.microsoft.com/office/drawing/2014/main" id="{65E0D97F-5C8C-534A-807E-DC9F473C3886}"/>
               </a:ext>
             </a:extLst>
           </p:cNvPr>
@@ -5595,6 +6582,98 @@
           </a:prstGeom>
         </p:spPr>
       </p:pic>
+      <p:sp>
+        <p:nvSpPr>
+          <p:cNvPr id="5" name="TextBox 4">
+            <a:extLst>
+              <a:ext uri="{FF2B5EF4-FFF2-40B4-BE49-F238E27FC236}">
+                <a16:creationId xmlns:a16="http://schemas.microsoft.com/office/drawing/2014/main" id="{26A8D30B-36E4-9D4B-BD32-9253164A4496}"/>
+              </a:ext>
+            </a:extLst>
+          </p:cNvPr>
+          <p:cNvSpPr txBox="1"/>
+          <p:nvPr/>
+        </p:nvSpPr>
+        <p:spPr>
+          <a:xfrm>
+            <a:off x="595086" y="1601500"/>
+            <a:ext cx="3119828" cy="923330"/>
+          </a:xfrm>
+          <a:prstGeom prst="rect">
+            <a:avLst/>
+          </a:prstGeom>
+          <a:noFill/>
+        </p:spPr>
+        <p:txBody>
+          <a:bodyPr wrap="none" rtlCol="0">
+            <a:spAutoFit/>
+          </a:bodyPr>
+          <a:lstStyle/>
+          <a:p>
+            <a:r>
+              <a:rPr lang="en-BR" b="1" dirty="0"/>
+              <a:t>Entrada Palete Cheio, </a:t>
+            </a:r>
+          </a:p>
+          <a:p>
+            <a:r>
+              <a:rPr lang="en-BR" b="1" dirty="0"/>
+              <a:t>VAI ENCHENDO. </a:t>
+            </a:r>
+          </a:p>
+          <a:p>
+            <a:r>
+              <a:rPr lang="en-BR" b="1" dirty="0"/>
+              <a:t>Vem das embalagens MIMI e K</a:t>
+            </a:r>
+          </a:p>
+        </p:txBody>
+      </p:sp>
+      <p:sp>
+        <p:nvSpPr>
+          <p:cNvPr id="6" name="TextBox 5">
+            <a:extLst>
+              <a:ext uri="{FF2B5EF4-FFF2-40B4-BE49-F238E27FC236}">
+                <a16:creationId xmlns:a16="http://schemas.microsoft.com/office/drawing/2014/main" id="{38595EEE-3BFF-E04E-B61E-4390C2DDADA9}"/>
+              </a:ext>
+            </a:extLst>
+          </p:cNvPr>
+          <p:cNvSpPr txBox="1"/>
+          <p:nvPr/>
+        </p:nvSpPr>
+        <p:spPr>
+          <a:xfrm>
+            <a:off x="595086" y="2607338"/>
+            <a:ext cx="3693255" cy="646331"/>
+          </a:xfrm>
+          <a:prstGeom prst="rect">
+            <a:avLst/>
+          </a:prstGeom>
+          <a:noFill/>
+        </p:spPr>
+        <p:txBody>
+          <a:bodyPr wrap="none" rtlCol="0">
+            <a:spAutoFit/>
+          </a:bodyPr>
+          <a:lstStyle/>
+          <a:p>
+            <a:r>
+              <a:rPr lang="en-BR" b="1" dirty="0"/>
+              <a:t>Cliente pediu para ir enchendo 1 fila,</a:t>
+            </a:r>
+          </a:p>
+          <a:p>
+            <a:r>
+              <a:rPr lang="en-US" b="1" dirty="0"/>
+              <a:t>D</a:t>
+            </a:r>
+            <a:r>
+              <a:rPr lang="en-BR" b="1" dirty="0"/>
+              <a:t>epois enche a outra.</a:t>
+            </a:r>
+          </a:p>
+        </p:txBody>
+      </p:sp>
     </p:spTree>
     <p:extLst>
       <p:ext uri="{BB962C8B-B14F-4D97-AF65-F5344CB8AC3E}">
@@ -5630,7 +6709,7 @@
           <p:cNvPr id="2" name="TextBox 1">
             <a:extLst>
               <a:ext uri="{FF2B5EF4-FFF2-40B4-BE49-F238E27FC236}">
-                <a16:creationId xmlns:a16="http://schemas.microsoft.com/office/drawing/2014/main" xmlns="" id="{F4AF9FCE-34FD-264C-8699-021C4384F9F5}"/>
+                <a16:creationId xmlns:a16="http://schemas.microsoft.com/office/drawing/2014/main" id="{F4AF9FCE-34FD-264C-8699-021C4384F9F5}"/>
               </a:ext>
             </a:extLst>
           </p:cNvPr>
@@ -5692,7 +6771,7 @@
           <p:cNvPr id="3" name="TextBox 2">
             <a:extLst>
               <a:ext uri="{FF2B5EF4-FFF2-40B4-BE49-F238E27FC236}">
-                <a16:creationId xmlns:a16="http://schemas.microsoft.com/office/drawing/2014/main" xmlns="" id="{71143322-F2B7-A14F-88D9-BEF08F663CBB}"/>
+                <a16:creationId xmlns:a16="http://schemas.microsoft.com/office/drawing/2014/main" id="{71143322-F2B7-A14F-88D9-BEF08F663CBB}"/>
               </a:ext>
             </a:extLst>
           </p:cNvPr>
@@ -5736,7 +6815,7 @@
           <p:cNvPr id="4" name="Rectangle 3">
             <a:extLst>
               <a:ext uri="{FF2B5EF4-FFF2-40B4-BE49-F238E27FC236}">
-                <a16:creationId xmlns:a16="http://schemas.microsoft.com/office/drawing/2014/main" xmlns="" id="{B2D498AE-31EC-A04A-8E59-ED952C0B4E08}"/>
+                <a16:creationId xmlns:a16="http://schemas.microsoft.com/office/drawing/2014/main" id="{B2D498AE-31EC-A04A-8E59-ED952C0B4E08}"/>
               </a:ext>
             </a:extLst>
           </p:cNvPr>
@@ -5774,7 +6853,7 @@
           <p:cNvPr id="5" name="TextBox 4">
             <a:extLst>
               <a:ext uri="{FF2B5EF4-FFF2-40B4-BE49-F238E27FC236}">
-                <a16:creationId xmlns:a16="http://schemas.microsoft.com/office/drawing/2014/main" xmlns="" id="{1D2BC0FD-A405-A24E-87FB-3D9E9CC13B0E}"/>
+                <a16:creationId xmlns:a16="http://schemas.microsoft.com/office/drawing/2014/main" id="{1D2BC0FD-A405-A24E-87FB-3D9E9CC13B0E}"/>
               </a:ext>
             </a:extLst>
           </p:cNvPr>
@@ -5849,6 +6928,42 @@
           <a:chExt cx="0" cy="0"/>
         </a:xfrm>
       </p:grpSpPr>
+      <p:sp>
+        <p:nvSpPr>
+          <p:cNvPr id="2" name="TextBox 1">
+            <a:extLst>
+              <a:ext uri="{FF2B5EF4-FFF2-40B4-BE49-F238E27FC236}">
+                <a16:creationId xmlns:a16="http://schemas.microsoft.com/office/drawing/2014/main" id="{1962F8CC-5C10-B542-9DEF-62A8B4DCB441}"/>
+              </a:ext>
+            </a:extLst>
+          </p:cNvPr>
+          <p:cNvSpPr txBox="1"/>
+          <p:nvPr/>
+        </p:nvSpPr>
+        <p:spPr>
+          <a:xfrm>
+            <a:off x="4260592" y="3121223"/>
+            <a:ext cx="4223657" cy="307777"/>
+          </a:xfrm>
+          <a:prstGeom prst="rect">
+            <a:avLst/>
+          </a:prstGeom>
+          <a:noFill/>
+        </p:spPr>
+        <p:txBody>
+          <a:bodyPr wrap="square" rtlCol="0">
+            <a:spAutoFit/>
+          </a:bodyPr>
+          <a:lstStyle/>
+          <a:p>
+            <a:r>
+              <a:rPr lang="pt-BR" sz="1400" b="1" dirty="0"/>
+              <a:t>Não tem botoeira aqui. Apenas vem material.</a:t>
+            </a:r>
+            <a:endParaRPr lang="x-none" sz="1400" b="1" dirty="0"/>
+          </a:p>
+        </p:txBody>
+      </p:sp>
     </p:spTree>
     <p:extLst>
       <p:ext uri="{BB962C8B-B14F-4D97-AF65-F5344CB8AC3E}">
@@ -5884,7 +6999,7 @@
           <p:cNvPr id="17" name="Picture 16">
             <a:extLst>
               <a:ext uri="{FF2B5EF4-FFF2-40B4-BE49-F238E27FC236}">
-                <a16:creationId xmlns:a16="http://schemas.microsoft.com/office/drawing/2014/main" xmlns="" id="{9467C7D9-5AA5-4942-A178-257612BDA702}"/>
+                <a16:creationId xmlns:a16="http://schemas.microsoft.com/office/drawing/2014/main" id="{9467C7D9-5AA5-4942-A178-257612BDA702}"/>
               </a:ext>
             </a:extLst>
           </p:cNvPr>
@@ -5914,7 +7029,7 @@
           <p:cNvPr id="2" name="Picture 1">
             <a:extLst>
               <a:ext uri="{FF2B5EF4-FFF2-40B4-BE49-F238E27FC236}">
-                <a16:creationId xmlns:a16="http://schemas.microsoft.com/office/drawing/2014/main" xmlns="" id="{9118D242-BC28-6344-BC58-69B5218C1EBC}"/>
+                <a16:creationId xmlns:a16="http://schemas.microsoft.com/office/drawing/2014/main" id="{9118D242-BC28-6344-BC58-69B5218C1EBC}"/>
               </a:ext>
             </a:extLst>
           </p:cNvPr>
@@ -5944,7 +7059,7 @@
           <p:cNvPr id="3" name="TextBox 2">
             <a:extLst>
               <a:ext uri="{FF2B5EF4-FFF2-40B4-BE49-F238E27FC236}">
-                <a16:creationId xmlns:a16="http://schemas.microsoft.com/office/drawing/2014/main" xmlns="" id="{3575733B-E618-5146-B465-492B8C44A40B}"/>
+                <a16:creationId xmlns:a16="http://schemas.microsoft.com/office/drawing/2014/main" id="{3575733B-E618-5146-B465-492B8C44A40B}"/>
               </a:ext>
             </a:extLst>
           </p:cNvPr>
@@ -5979,7 +7094,7 @@
           <p:cNvPr id="4" name="TextBox 3">
             <a:extLst>
               <a:ext uri="{FF2B5EF4-FFF2-40B4-BE49-F238E27FC236}">
-                <a16:creationId xmlns:a16="http://schemas.microsoft.com/office/drawing/2014/main" xmlns="" id="{0B38B3F9-AD7E-044C-81BA-F4AF2AFB343A}"/>
+                <a16:creationId xmlns:a16="http://schemas.microsoft.com/office/drawing/2014/main" id="{0B38B3F9-AD7E-044C-81BA-F4AF2AFB343A}"/>
               </a:ext>
             </a:extLst>
           </p:cNvPr>
@@ -6021,7 +7136,7 @@
           <p:cNvPr id="5" name="Right Arrow 4">
             <a:extLst>
               <a:ext uri="{FF2B5EF4-FFF2-40B4-BE49-F238E27FC236}">
-                <a16:creationId xmlns:a16="http://schemas.microsoft.com/office/drawing/2014/main" xmlns="" id="{4447E573-6F94-3349-B9C2-40CC2C34F2AE}"/>
+                <a16:creationId xmlns:a16="http://schemas.microsoft.com/office/drawing/2014/main" id="{4447E573-6F94-3349-B9C2-40CC2C34F2AE}"/>
               </a:ext>
             </a:extLst>
           </p:cNvPr>
@@ -6070,7 +7185,7 @@
           <p:cNvPr id="6" name="TextBox 5">
             <a:extLst>
               <a:ext uri="{FF2B5EF4-FFF2-40B4-BE49-F238E27FC236}">
-                <a16:creationId xmlns:a16="http://schemas.microsoft.com/office/drawing/2014/main" xmlns="" id="{EFC29354-118C-BD47-BD39-B79082A13281}"/>
+                <a16:creationId xmlns:a16="http://schemas.microsoft.com/office/drawing/2014/main" id="{EFC29354-118C-BD47-BD39-B79082A13281}"/>
               </a:ext>
             </a:extLst>
           </p:cNvPr>
@@ -6112,7 +7227,7 @@
           <p:cNvPr id="7" name="Right Arrow 6">
             <a:extLst>
               <a:ext uri="{FF2B5EF4-FFF2-40B4-BE49-F238E27FC236}">
-                <a16:creationId xmlns:a16="http://schemas.microsoft.com/office/drawing/2014/main" xmlns="" id="{48E79BE4-771C-034A-9A21-AE2DD3EF8CC0}"/>
+                <a16:creationId xmlns:a16="http://schemas.microsoft.com/office/drawing/2014/main" id="{48E79BE4-771C-034A-9A21-AE2DD3EF8CC0}"/>
               </a:ext>
             </a:extLst>
           </p:cNvPr>
@@ -6161,7 +7276,7 @@
           <p:cNvPr id="8" name="TextBox 7">
             <a:extLst>
               <a:ext uri="{FF2B5EF4-FFF2-40B4-BE49-F238E27FC236}">
-                <a16:creationId xmlns:a16="http://schemas.microsoft.com/office/drawing/2014/main" xmlns="" id="{14FB8228-8486-6C43-8409-B104703B5767}"/>
+                <a16:creationId xmlns:a16="http://schemas.microsoft.com/office/drawing/2014/main" id="{14FB8228-8486-6C43-8409-B104703B5767}"/>
               </a:ext>
             </a:extLst>
           </p:cNvPr>
@@ -6203,7 +7318,7 @@
           <p:cNvPr id="9" name="Right Arrow 8">
             <a:extLst>
               <a:ext uri="{FF2B5EF4-FFF2-40B4-BE49-F238E27FC236}">
-                <a16:creationId xmlns:a16="http://schemas.microsoft.com/office/drawing/2014/main" xmlns="" id="{B7F2A479-BAB0-9341-A891-EB66E42063FC}"/>
+                <a16:creationId xmlns:a16="http://schemas.microsoft.com/office/drawing/2014/main" id="{B7F2A479-BAB0-9341-A891-EB66E42063FC}"/>
               </a:ext>
             </a:extLst>
           </p:cNvPr>
@@ -6252,7 +7367,7 @@
           <p:cNvPr id="10" name="Right Arrow 9">
             <a:extLst>
               <a:ext uri="{FF2B5EF4-FFF2-40B4-BE49-F238E27FC236}">
-                <a16:creationId xmlns:a16="http://schemas.microsoft.com/office/drawing/2014/main" xmlns="" id="{2383C9DE-70EA-8C45-888E-5113F27F38A7}"/>
+                <a16:creationId xmlns:a16="http://schemas.microsoft.com/office/drawing/2014/main" id="{2383C9DE-70EA-8C45-888E-5113F27F38A7}"/>
               </a:ext>
             </a:extLst>
           </p:cNvPr>
@@ -6301,7 +7416,7 @@
           <p:cNvPr id="11" name="TextBox 10">
             <a:extLst>
               <a:ext uri="{FF2B5EF4-FFF2-40B4-BE49-F238E27FC236}">
-                <a16:creationId xmlns:a16="http://schemas.microsoft.com/office/drawing/2014/main" xmlns="" id="{E4B09343-1696-8F47-8237-B05DA0705641}"/>
+                <a16:creationId xmlns:a16="http://schemas.microsoft.com/office/drawing/2014/main" id="{E4B09343-1696-8F47-8237-B05DA0705641}"/>
               </a:ext>
             </a:extLst>
           </p:cNvPr>
@@ -6377,7 +7492,7 @@
           <p:cNvPr id="14" name="Frame 13">
             <a:extLst>
               <a:ext uri="{FF2B5EF4-FFF2-40B4-BE49-F238E27FC236}">
-                <a16:creationId xmlns:a16="http://schemas.microsoft.com/office/drawing/2014/main" xmlns="" id="{EF3AE748-6C13-2A46-A9FF-43084C065D9E}"/>
+                <a16:creationId xmlns:a16="http://schemas.microsoft.com/office/drawing/2014/main" id="{EF3AE748-6C13-2A46-A9FF-43084C065D9E}"/>
               </a:ext>
             </a:extLst>
           </p:cNvPr>
@@ -6429,7 +7544,7 @@
           <p:cNvPr id="15" name="TextBox 14">
             <a:extLst>
               <a:ext uri="{FF2B5EF4-FFF2-40B4-BE49-F238E27FC236}">
-                <a16:creationId xmlns:a16="http://schemas.microsoft.com/office/drawing/2014/main" xmlns="" id="{A1F0E10E-9A80-184D-9442-6E1691CC43D2}"/>
+                <a16:creationId xmlns:a16="http://schemas.microsoft.com/office/drawing/2014/main" id="{A1F0E10E-9A80-184D-9442-6E1691CC43D2}"/>
               </a:ext>
             </a:extLst>
           </p:cNvPr>
@@ -6464,7 +7579,7 @@
           <p:cNvPr id="16" name="Frame 15">
             <a:extLst>
               <a:ext uri="{FF2B5EF4-FFF2-40B4-BE49-F238E27FC236}">
-                <a16:creationId xmlns:a16="http://schemas.microsoft.com/office/drawing/2014/main" xmlns="" id="{46B7A1C1-3187-834A-B97C-D897FB8CDC51}"/>
+                <a16:creationId xmlns:a16="http://schemas.microsoft.com/office/drawing/2014/main" id="{46B7A1C1-3187-834A-B97C-D897FB8CDC51}"/>
               </a:ext>
             </a:extLst>
           </p:cNvPr>
@@ -6516,7 +7631,7 @@
           <p:cNvPr id="18" name="TextBox 17">
             <a:extLst>
               <a:ext uri="{FF2B5EF4-FFF2-40B4-BE49-F238E27FC236}">
-                <a16:creationId xmlns:a16="http://schemas.microsoft.com/office/drawing/2014/main" xmlns="" id="{8D3DC8F1-7B1D-144C-B9AD-319A9AF7202C}"/>
+                <a16:creationId xmlns:a16="http://schemas.microsoft.com/office/drawing/2014/main" id="{8D3DC8F1-7B1D-144C-B9AD-319A9AF7202C}"/>
               </a:ext>
             </a:extLst>
           </p:cNvPr>
@@ -6557,7 +7672,7 @@
           <p:cNvPr id="20" name="Rectangle 19">
             <a:extLst>
               <a:ext uri="{FF2B5EF4-FFF2-40B4-BE49-F238E27FC236}">
-                <a16:creationId xmlns:a16="http://schemas.microsoft.com/office/drawing/2014/main" xmlns="" id="{D75473D0-E5F5-404B-82C1-5792D5BE1AC0}"/>
+                <a16:creationId xmlns:a16="http://schemas.microsoft.com/office/drawing/2014/main" id="{D75473D0-E5F5-404B-82C1-5792D5BE1AC0}"/>
               </a:ext>
             </a:extLst>
           </p:cNvPr>
@@ -6668,7 +7783,7 @@
           <p:cNvPr id="2" name="TextBox 1">
             <a:extLst>
               <a:ext uri="{FF2B5EF4-FFF2-40B4-BE49-F238E27FC236}">
-                <a16:creationId xmlns:a16="http://schemas.microsoft.com/office/drawing/2014/main" xmlns="" id="{7356633B-930C-194A-9425-18C4AC07260E}"/>
+                <a16:creationId xmlns:a16="http://schemas.microsoft.com/office/drawing/2014/main" id="{7356633B-930C-194A-9425-18C4AC07260E}"/>
               </a:ext>
             </a:extLst>
           </p:cNvPr>
@@ -6730,7 +7845,7 @@
           <p:cNvPr id="3" name="TextBox 2">
             <a:extLst>
               <a:ext uri="{FF2B5EF4-FFF2-40B4-BE49-F238E27FC236}">
-                <a16:creationId xmlns:a16="http://schemas.microsoft.com/office/drawing/2014/main" xmlns="" id="{0F3D7F53-E55A-9042-8DE7-2C8F4A83A174}"/>
+                <a16:creationId xmlns:a16="http://schemas.microsoft.com/office/drawing/2014/main" id="{0F3D7F53-E55A-9042-8DE7-2C8F4A83A174}"/>
               </a:ext>
             </a:extLst>
           </p:cNvPr>
@@ -6780,7 +7895,7 @@
           <p:cNvPr id="5" name="TextBox 4">
             <a:extLst>
               <a:ext uri="{FF2B5EF4-FFF2-40B4-BE49-F238E27FC236}">
-                <a16:creationId xmlns:a16="http://schemas.microsoft.com/office/drawing/2014/main" xmlns="" id="{A17CAA21-4C96-2B4E-A881-9CB144960DE1}"/>
+                <a16:creationId xmlns:a16="http://schemas.microsoft.com/office/drawing/2014/main" id="{A17CAA21-4C96-2B4E-A881-9CB144960DE1}"/>
               </a:ext>
             </a:extLst>
           </p:cNvPr>
@@ -6830,7 +7945,7 @@
           <p:cNvPr id="6" name="TextBox 5">
             <a:extLst>
               <a:ext uri="{FF2B5EF4-FFF2-40B4-BE49-F238E27FC236}">
-                <a16:creationId xmlns:a16="http://schemas.microsoft.com/office/drawing/2014/main" xmlns="" id="{28FCAEC4-BB2A-7B49-A3C7-AF637E3C4D73}"/>
+                <a16:creationId xmlns:a16="http://schemas.microsoft.com/office/drawing/2014/main" id="{28FCAEC4-BB2A-7B49-A3C7-AF637E3C4D73}"/>
               </a:ext>
             </a:extLst>
           </p:cNvPr>
@@ -6880,7 +7995,7 @@
           <p:cNvPr id="7" name="TextBox 6">
             <a:extLst>
               <a:ext uri="{FF2B5EF4-FFF2-40B4-BE49-F238E27FC236}">
-                <a16:creationId xmlns:a16="http://schemas.microsoft.com/office/drawing/2014/main" xmlns="" id="{3DB6F31A-018D-674F-9BA7-0FE795D0FDFB}"/>
+                <a16:creationId xmlns:a16="http://schemas.microsoft.com/office/drawing/2014/main" id="{3DB6F31A-018D-674F-9BA7-0FE795D0FDFB}"/>
               </a:ext>
             </a:extLst>
           </p:cNvPr>
@@ -6945,7 +8060,7 @@
           <p:cNvPr id="8" name="TextBox 7">
             <a:extLst>
               <a:ext uri="{FF2B5EF4-FFF2-40B4-BE49-F238E27FC236}">
-                <a16:creationId xmlns:a16="http://schemas.microsoft.com/office/drawing/2014/main" xmlns="" id="{D24BE3FB-7570-5040-BCFC-B36B9BDC1669}"/>
+                <a16:creationId xmlns:a16="http://schemas.microsoft.com/office/drawing/2014/main" id="{D24BE3FB-7570-5040-BCFC-B36B9BDC1669}"/>
               </a:ext>
             </a:extLst>
           </p:cNvPr>
@@ -7016,7 +8131,7 @@
           <p:cNvPr id="9" name="TextBox 8">
             <a:extLst>
               <a:ext uri="{FF2B5EF4-FFF2-40B4-BE49-F238E27FC236}">
-                <a16:creationId xmlns:a16="http://schemas.microsoft.com/office/drawing/2014/main" xmlns="" id="{38225067-8BBD-3D4E-90A5-55CDF23FA3E9}"/>
+                <a16:creationId xmlns:a16="http://schemas.microsoft.com/office/drawing/2014/main" id="{38225067-8BBD-3D4E-90A5-55CDF23FA3E9}"/>
               </a:ext>
             </a:extLst>
           </p:cNvPr>
@@ -7072,7 +8187,7 @@
           <p:cNvPr id="10" name="Rectangle 9">
             <a:extLst>
               <a:ext uri="{FF2B5EF4-FFF2-40B4-BE49-F238E27FC236}">
-                <a16:creationId xmlns:a16="http://schemas.microsoft.com/office/drawing/2014/main" xmlns="" id="{218B0B13-AC94-6E4E-9AF7-D964E1B54DFC}"/>
+                <a16:creationId xmlns:a16="http://schemas.microsoft.com/office/drawing/2014/main" id="{218B0B13-AC94-6E4E-9AF7-D964E1B54DFC}"/>
               </a:ext>
             </a:extLst>
           </p:cNvPr>
@@ -7140,7 +8255,7 @@
           <p:cNvPr id="2" name="TextBox 1">
             <a:extLst>
               <a:ext uri="{FF2B5EF4-FFF2-40B4-BE49-F238E27FC236}">
-                <a16:creationId xmlns:a16="http://schemas.microsoft.com/office/drawing/2014/main" xmlns="" id="{A3472355-9901-AF4B-8744-CC51F1ACA6A8}"/>
+                <a16:creationId xmlns:a16="http://schemas.microsoft.com/office/drawing/2014/main" id="{A3472355-9901-AF4B-8744-CC51F1ACA6A8}"/>
               </a:ext>
             </a:extLst>
           </p:cNvPr>
@@ -7175,7 +8290,7 @@
           <p:cNvPr id="3" name="Imagem 4" descr="Diagrama&#10;&#10;Descrição gerada automaticamente">
             <a:extLst>
               <a:ext uri="{FF2B5EF4-FFF2-40B4-BE49-F238E27FC236}">
-                <a16:creationId xmlns:a16="http://schemas.microsoft.com/office/drawing/2014/main" xmlns="" id="{1346828A-9F6D-BA4F-9746-D9460E434FCA}"/>
+                <a16:creationId xmlns:a16="http://schemas.microsoft.com/office/drawing/2014/main" id="{1346828A-9F6D-BA4F-9746-D9460E434FCA}"/>
               </a:ext>
             </a:extLst>
           </p:cNvPr>
@@ -7212,7 +8327,7 @@
           <p:cNvPr id="4" name="Rectangle 3">
             <a:extLst>
               <a:ext uri="{FF2B5EF4-FFF2-40B4-BE49-F238E27FC236}">
-                <a16:creationId xmlns:a16="http://schemas.microsoft.com/office/drawing/2014/main" xmlns="" id="{85D4F4CE-36DB-DD48-B7CA-4C30935CCD14}"/>
+                <a16:creationId xmlns:a16="http://schemas.microsoft.com/office/drawing/2014/main" id="{85D4F4CE-36DB-DD48-B7CA-4C30935CCD14}"/>
               </a:ext>
             </a:extLst>
           </p:cNvPr>
@@ -7255,7 +8370,7 @@
           <p:cNvPr id="6" name="Rectangle 5">
             <a:extLst>
               <a:ext uri="{FF2B5EF4-FFF2-40B4-BE49-F238E27FC236}">
-                <a16:creationId xmlns:a16="http://schemas.microsoft.com/office/drawing/2014/main" xmlns="" id="{9F7B0F2D-87DE-7245-AC10-7FC70F458192}"/>
+                <a16:creationId xmlns:a16="http://schemas.microsoft.com/office/drawing/2014/main" id="{9F7B0F2D-87DE-7245-AC10-7FC70F458192}"/>
               </a:ext>
             </a:extLst>
           </p:cNvPr>
@@ -7310,7 +8425,7 @@
           <p:cNvPr id="5" name="Picture 4">
             <a:extLst>
               <a:ext uri="{FF2B5EF4-FFF2-40B4-BE49-F238E27FC236}">
-                <a16:creationId xmlns:a16="http://schemas.microsoft.com/office/drawing/2014/main" xmlns="" id="{3C92582F-7EC1-944E-A03A-C86896F4B36D}"/>
+                <a16:creationId xmlns:a16="http://schemas.microsoft.com/office/drawing/2014/main" id="{3C92582F-7EC1-944E-A03A-C86896F4B36D}"/>
               </a:ext>
             </a:extLst>
           </p:cNvPr>
@@ -7370,7 +8485,7 @@
           <p:cNvPr id="2" name="TextBox 1">
             <a:extLst>
               <a:ext uri="{FF2B5EF4-FFF2-40B4-BE49-F238E27FC236}">
-                <a16:creationId xmlns:a16="http://schemas.microsoft.com/office/drawing/2014/main" xmlns="" id="{A7B274A8-210A-684D-8DC3-3F1AFEC7FCAB}"/>
+                <a16:creationId xmlns:a16="http://schemas.microsoft.com/office/drawing/2014/main" id="{A7B274A8-210A-684D-8DC3-3F1AFEC7FCAB}"/>
               </a:ext>
             </a:extLst>
           </p:cNvPr>
@@ -7420,7 +8535,7 @@
           <p:cNvPr id="3" name="TextBox 2">
             <a:extLst>
               <a:ext uri="{FF2B5EF4-FFF2-40B4-BE49-F238E27FC236}">
-                <a16:creationId xmlns:a16="http://schemas.microsoft.com/office/drawing/2014/main" xmlns="" id="{5CF699A3-7A04-FA40-9A7F-839471DF239C}"/>
+                <a16:creationId xmlns:a16="http://schemas.microsoft.com/office/drawing/2014/main" id="{5CF699A3-7A04-FA40-9A7F-839471DF239C}"/>
               </a:ext>
             </a:extLst>
           </p:cNvPr>
@@ -7464,7 +8579,7 @@
           <p:cNvPr id="4" name="TextBox 3">
             <a:extLst>
               <a:ext uri="{FF2B5EF4-FFF2-40B4-BE49-F238E27FC236}">
-                <a16:creationId xmlns:a16="http://schemas.microsoft.com/office/drawing/2014/main" xmlns="" id="{BC959D6E-5F38-DA40-A0E8-AE776729CE52}"/>
+                <a16:creationId xmlns:a16="http://schemas.microsoft.com/office/drawing/2014/main" id="{BC959D6E-5F38-DA40-A0E8-AE776729CE52}"/>
               </a:ext>
             </a:extLst>
           </p:cNvPr>
@@ -7514,7 +8629,7 @@
           <p:cNvPr id="6" name="Rectangle 5">
             <a:extLst>
               <a:ext uri="{FF2B5EF4-FFF2-40B4-BE49-F238E27FC236}">
-                <a16:creationId xmlns:a16="http://schemas.microsoft.com/office/drawing/2014/main" xmlns="" id="{9EF526F7-6B28-354A-B8C8-3DE175E08A36}"/>
+                <a16:creationId xmlns:a16="http://schemas.microsoft.com/office/drawing/2014/main" id="{9EF526F7-6B28-354A-B8C8-3DE175E08A36}"/>
               </a:ext>
             </a:extLst>
           </p:cNvPr>
@@ -7609,7 +8724,7 @@
           <p:cNvPr id="2" name="TextBox 1">
             <a:extLst>
               <a:ext uri="{FF2B5EF4-FFF2-40B4-BE49-F238E27FC236}">
-                <a16:creationId xmlns:a16="http://schemas.microsoft.com/office/drawing/2014/main" xmlns="" id="{A3472355-9901-AF4B-8744-CC51F1ACA6A8}"/>
+                <a16:creationId xmlns:a16="http://schemas.microsoft.com/office/drawing/2014/main" id="{A3472355-9901-AF4B-8744-CC51F1ACA6A8}"/>
               </a:ext>
             </a:extLst>
           </p:cNvPr>
@@ -7644,7 +8759,7 @@
           <p:cNvPr id="3" name="Imagem 4" descr="Diagrama&#10;&#10;Descrição gerada automaticamente">
             <a:extLst>
               <a:ext uri="{FF2B5EF4-FFF2-40B4-BE49-F238E27FC236}">
-                <a16:creationId xmlns:a16="http://schemas.microsoft.com/office/drawing/2014/main" xmlns="" id="{1346828A-9F6D-BA4F-9746-D9460E434FCA}"/>
+                <a16:creationId xmlns:a16="http://schemas.microsoft.com/office/drawing/2014/main" id="{1346828A-9F6D-BA4F-9746-D9460E434FCA}"/>
               </a:ext>
             </a:extLst>
           </p:cNvPr>
@@ -7681,7 +8796,7 @@
           <p:cNvPr id="4" name="Rectangle 3">
             <a:extLst>
               <a:ext uri="{FF2B5EF4-FFF2-40B4-BE49-F238E27FC236}">
-                <a16:creationId xmlns:a16="http://schemas.microsoft.com/office/drawing/2014/main" xmlns="" id="{147033F2-F93A-8C4E-BBFC-398C9D60D07F}"/>
+                <a16:creationId xmlns:a16="http://schemas.microsoft.com/office/drawing/2014/main" id="{147033F2-F93A-8C4E-BBFC-398C9D60D07F}"/>
               </a:ext>
             </a:extLst>
           </p:cNvPr>
@@ -7724,7 +8839,7 @@
           <p:cNvPr id="5" name="Picture 4">
             <a:extLst>
               <a:ext uri="{FF2B5EF4-FFF2-40B4-BE49-F238E27FC236}">
-                <a16:creationId xmlns:a16="http://schemas.microsoft.com/office/drawing/2014/main" xmlns="" id="{01B878B7-4BC0-0141-AD8E-B8481FB6C78B}"/>
+                <a16:creationId xmlns:a16="http://schemas.microsoft.com/office/drawing/2014/main" id="{01B878B7-4BC0-0141-AD8E-B8481FB6C78B}"/>
               </a:ext>
             </a:extLst>
           </p:cNvPr>
@@ -7757,8 +8872,8 @@
         </p:nvSpPr>
         <p:spPr>
           <a:xfrm>
-            <a:off x="1800394" y="4879279"/>
-            <a:ext cx="5065105" cy="646331"/>
+            <a:off x="827379" y="5185062"/>
+            <a:ext cx="6042345" cy="646331"/>
           </a:xfrm>
           <a:prstGeom prst="rect">
             <a:avLst/>
@@ -7766,7 +8881,7 @@
           <a:noFill/>
         </p:spPr>
         <p:txBody>
-          <a:bodyPr wrap="none" rtlCol="0">
+          <a:bodyPr wrap="square" rtlCol="0">
             <a:spAutoFit/>
           </a:bodyPr>
           <a:lstStyle/>
@@ -7832,7 +8947,7 @@
           <p:cNvPr id="2" name="TextBox 1">
             <a:extLst>
               <a:ext uri="{FF2B5EF4-FFF2-40B4-BE49-F238E27FC236}">
-                <a16:creationId xmlns:a16="http://schemas.microsoft.com/office/drawing/2014/main" xmlns="" id="{269A2356-F197-3240-903F-C582753EBC25}"/>
+                <a16:creationId xmlns:a16="http://schemas.microsoft.com/office/drawing/2014/main" id="{269A2356-F197-3240-903F-C582753EBC25}"/>
               </a:ext>
             </a:extLst>
           </p:cNvPr>
@@ -7882,7 +8997,7 @@
           <p:cNvPr id="3" name="TextBox 2">
             <a:extLst>
               <a:ext uri="{FF2B5EF4-FFF2-40B4-BE49-F238E27FC236}">
-                <a16:creationId xmlns:a16="http://schemas.microsoft.com/office/drawing/2014/main" xmlns="" id="{288F55AC-C5F8-9347-A272-1FDF814644AA}"/>
+                <a16:creationId xmlns:a16="http://schemas.microsoft.com/office/drawing/2014/main" id="{288F55AC-C5F8-9347-A272-1FDF814644AA}"/>
               </a:ext>
             </a:extLst>
           </p:cNvPr>
@@ -7926,7 +9041,7 @@
           <p:cNvPr id="4" name="TextBox 3">
             <a:extLst>
               <a:ext uri="{FF2B5EF4-FFF2-40B4-BE49-F238E27FC236}">
-                <a16:creationId xmlns:a16="http://schemas.microsoft.com/office/drawing/2014/main" xmlns="" id="{8B25F24F-2EDD-A841-B082-C4BB725C1316}"/>
+                <a16:creationId xmlns:a16="http://schemas.microsoft.com/office/drawing/2014/main" id="{8B25F24F-2EDD-A841-B082-C4BB725C1316}"/>
               </a:ext>
             </a:extLst>
           </p:cNvPr>
@@ -7976,7 +9091,7 @@
           <p:cNvPr id="5" name="Rectangle 4">
             <a:extLst>
               <a:ext uri="{FF2B5EF4-FFF2-40B4-BE49-F238E27FC236}">
-                <a16:creationId xmlns:a16="http://schemas.microsoft.com/office/drawing/2014/main" xmlns="" id="{EE465442-4FCE-C54A-8AF9-372F2FC29677}"/>
+                <a16:creationId xmlns:a16="http://schemas.microsoft.com/office/drawing/2014/main" id="{EE465442-4FCE-C54A-8AF9-372F2FC29677}"/>
               </a:ext>
             </a:extLst>
           </p:cNvPr>
@@ -8071,7 +9186,7 @@
           <p:cNvPr id="2" name="TextBox 1">
             <a:extLst>
               <a:ext uri="{FF2B5EF4-FFF2-40B4-BE49-F238E27FC236}">
-                <a16:creationId xmlns:a16="http://schemas.microsoft.com/office/drawing/2014/main" xmlns="" id="{A3472355-9901-AF4B-8744-CC51F1ACA6A8}"/>
+                <a16:creationId xmlns:a16="http://schemas.microsoft.com/office/drawing/2014/main" id="{A3472355-9901-AF4B-8744-CC51F1ACA6A8}"/>
               </a:ext>
             </a:extLst>
           </p:cNvPr>
@@ -8106,7 +9221,7 @@
           <p:cNvPr id="4" name="Picture 3">
             <a:extLst>
               <a:ext uri="{FF2B5EF4-FFF2-40B4-BE49-F238E27FC236}">
-                <a16:creationId xmlns:a16="http://schemas.microsoft.com/office/drawing/2014/main" xmlns="" id="{9811E48C-204B-4C4E-BC3E-C1AA2CAA80D1}"/>
+                <a16:creationId xmlns:a16="http://schemas.microsoft.com/office/drawing/2014/main" id="{9811E48C-204B-4C4E-BC3E-C1AA2CAA80D1}"/>
               </a:ext>
             </a:extLst>
           </p:cNvPr>
@@ -8136,7 +9251,7 @@
           <p:cNvPr id="3" name="TextBox 2">
             <a:extLst>
               <a:ext uri="{FF2B5EF4-FFF2-40B4-BE49-F238E27FC236}">
-                <a16:creationId xmlns:a16="http://schemas.microsoft.com/office/drawing/2014/main" xmlns="" id="{991AC24C-653D-5E45-8BEE-7EA643F8C79D}"/>
+                <a16:creationId xmlns:a16="http://schemas.microsoft.com/office/drawing/2014/main" id="{991AC24C-653D-5E45-8BEE-7EA643F8C79D}"/>
               </a:ext>
             </a:extLst>
           </p:cNvPr>
@@ -8175,7 +9290,7 @@
           <p:cNvPr id="5" name="TextBox 4">
             <a:extLst>
               <a:ext uri="{FF2B5EF4-FFF2-40B4-BE49-F238E27FC236}">
-                <a16:creationId xmlns:a16="http://schemas.microsoft.com/office/drawing/2014/main" xmlns="" id="{AE62DE9A-7462-B846-8403-C100E7731E67}"/>
+                <a16:creationId xmlns:a16="http://schemas.microsoft.com/office/drawing/2014/main" id="{AE62DE9A-7462-B846-8403-C100E7731E67}"/>
               </a:ext>
             </a:extLst>
           </p:cNvPr>
@@ -8211,7 +9326,7 @@
           <p:cNvPr id="6" name="TextBox 5">
             <a:extLst>
               <a:ext uri="{FF2B5EF4-FFF2-40B4-BE49-F238E27FC236}">
-                <a16:creationId xmlns:a16="http://schemas.microsoft.com/office/drawing/2014/main" xmlns="" id="{80A7945C-2ABF-384C-9FB9-CDBE46D449DC}"/>
+                <a16:creationId xmlns:a16="http://schemas.microsoft.com/office/drawing/2014/main" id="{80A7945C-2ABF-384C-9FB9-CDBE46D449DC}"/>
               </a:ext>
             </a:extLst>
           </p:cNvPr>
@@ -8255,7 +9370,7 @@
           <p:cNvPr id="7" name="Picture 6">
             <a:extLst>
               <a:ext uri="{FF2B5EF4-FFF2-40B4-BE49-F238E27FC236}">
-                <a16:creationId xmlns:a16="http://schemas.microsoft.com/office/drawing/2014/main" xmlns="" id="{147A1232-91E7-5749-8624-370DE52C147F}"/>
+                <a16:creationId xmlns:a16="http://schemas.microsoft.com/office/drawing/2014/main" id="{147A1232-91E7-5749-8624-370DE52C147F}"/>
               </a:ext>
             </a:extLst>
           </p:cNvPr>

</xml_diff>